<commit_message>
check fill.type is Picture
</commit_message>
<xml_diff>
--- a/motiongo科技1_sub2_new.pptx
+++ b/motiongo科技1_sub2_new.pptx
@@ -12,7 +12,7 @@
     <p:notesMasterId r:id="rId7"/>
   </p:notesMasterIdLst>
   <p:sldIdLst>
-    <p:sldId id="260" r:id="rId6"/>
+    <p:sldId id="11090056" r:id="rId6"/>
   </p:sldIdLst>
   <p:sldSz cx="12192000" cy="6858000"/>
   <p:notesSz cx="6858000" cy="9144000"/>
@@ -204,7 +204,7 @@
           <a:p>
             <a:fld id="{56713314-8D94-4802-B4B9-CDBD3559437F}" type="datetimeFigureOut">
               <a:rPr lang="zh-CN" altLang="en-US" smtClean="0"/>
-              <a:t>2023/10/13</a:t>
+              <a:t>2023/10/14</a:t>
             </a:fld>
             <a:endParaRPr lang="zh-CN" altLang="en-US"/>
           </a:p>
@@ -600,7 +600,7 @@
           <a:p>
             <a:fld id="{D997B5FA-0921-464F-AAE1-844C04324D75}" type="datetimeFigureOut">
               <a:rPr lang="zh-CN" altLang="en-US" smtClean="0"/>
-              <a:t>2023/10/13</a:t>
+              <a:t>2023/10/14</a:t>
             </a:fld>
             <a:endParaRPr lang="zh-CN" altLang="en-US"/>
           </a:p>
@@ -768,7 +768,7 @@
           <a:p>
             <a:fld id="{D997B5FA-0921-464F-AAE1-844C04324D75}" type="datetimeFigureOut">
               <a:rPr lang="zh-CN" altLang="en-US" smtClean="0"/>
-              <a:t>2023/10/13</a:t>
+              <a:t>2023/10/14</a:t>
             </a:fld>
             <a:endParaRPr lang="zh-CN" altLang="en-US"/>
           </a:p>
@@ -946,7 +946,7 @@
           <a:p>
             <a:fld id="{D997B5FA-0921-464F-AAE1-844C04324D75}" type="datetimeFigureOut">
               <a:rPr lang="zh-CN" altLang="en-US" smtClean="0"/>
-              <a:t>2023/10/13</a:t>
+              <a:t>2023/10/14</a:t>
             </a:fld>
             <a:endParaRPr lang="zh-CN" altLang="en-US"/>
           </a:p>
@@ -1136,7 +1136,7 @@
           <a:p>
             <a:fld id="{D997B5FA-0921-464F-AAE1-844C04324D75}" type="datetimeFigureOut">
               <a:rPr lang="zh-CN" altLang="en-US" smtClean="0"/>
-              <a:t>2023/10/13</a:t>
+              <a:t>2023/10/14</a:t>
             </a:fld>
             <a:endParaRPr lang="zh-CN" altLang="en-US"/>
           </a:p>
@@ -1304,7 +1304,7 @@
           <a:p>
             <a:fld id="{D997B5FA-0921-464F-AAE1-844C04324D75}" type="datetimeFigureOut">
               <a:rPr lang="zh-CN" altLang="en-US" smtClean="0"/>
-              <a:t>2023/10/13</a:t>
+              <a:t>2023/10/14</a:t>
             </a:fld>
             <a:endParaRPr lang="zh-CN" altLang="en-US"/>
           </a:p>
@@ -1549,7 +1549,7 @@
           <a:p>
             <a:fld id="{D997B5FA-0921-464F-AAE1-844C04324D75}" type="datetimeFigureOut">
               <a:rPr lang="zh-CN" altLang="en-US" smtClean="0"/>
-              <a:t>2023/10/13</a:t>
+              <a:t>2023/10/14</a:t>
             </a:fld>
             <a:endParaRPr lang="zh-CN" altLang="en-US"/>
           </a:p>
@@ -1778,7 +1778,7 @@
           <a:p>
             <a:fld id="{D997B5FA-0921-464F-AAE1-844C04324D75}" type="datetimeFigureOut">
               <a:rPr lang="zh-CN" altLang="en-US" smtClean="0"/>
-              <a:t>2023/10/13</a:t>
+              <a:t>2023/10/14</a:t>
             </a:fld>
             <a:endParaRPr lang="zh-CN" altLang="en-US"/>
           </a:p>
@@ -2142,7 +2142,7 @@
           <a:p>
             <a:fld id="{D997B5FA-0921-464F-AAE1-844C04324D75}" type="datetimeFigureOut">
               <a:rPr lang="zh-CN" altLang="en-US" smtClean="0"/>
-              <a:t>2023/10/13</a:t>
+              <a:t>2023/10/14</a:t>
             </a:fld>
             <a:endParaRPr lang="zh-CN" altLang="en-US"/>
           </a:p>
@@ -2259,7 +2259,7 @@
           <a:p>
             <a:fld id="{D997B5FA-0921-464F-AAE1-844C04324D75}" type="datetimeFigureOut">
               <a:rPr lang="zh-CN" altLang="en-US" smtClean="0"/>
-              <a:t>2023/10/13</a:t>
+              <a:t>2023/10/14</a:t>
             </a:fld>
             <a:endParaRPr lang="zh-CN" altLang="en-US"/>
           </a:p>
@@ -2354,7 +2354,7 @@
           <a:p>
             <a:fld id="{D997B5FA-0921-464F-AAE1-844C04324D75}" type="datetimeFigureOut">
               <a:rPr lang="zh-CN" altLang="en-US" smtClean="0"/>
-              <a:t>2023/10/13</a:t>
+              <a:t>2023/10/14</a:t>
             </a:fld>
             <a:endParaRPr lang="zh-CN" altLang="en-US"/>
           </a:p>
@@ -2629,7 +2629,7 @@
           <a:p>
             <a:fld id="{D997B5FA-0921-464F-AAE1-844C04324D75}" type="datetimeFigureOut">
               <a:rPr lang="zh-CN" altLang="en-US" smtClean="0"/>
-              <a:t>2023/10/13</a:t>
+              <a:t>2023/10/14</a:t>
             </a:fld>
             <a:endParaRPr lang="zh-CN" altLang="en-US"/>
           </a:p>
@@ -2797,7 +2797,7 @@
           <a:p>
             <a:fld id="{D997B5FA-0921-464F-AAE1-844C04324D75}" type="datetimeFigureOut">
               <a:rPr lang="zh-CN" altLang="en-US" smtClean="0"/>
-              <a:t>2023/10/13</a:t>
+              <a:t>2023/10/14</a:t>
             </a:fld>
             <a:endParaRPr lang="zh-CN" altLang="en-US"/>
           </a:p>
@@ -3049,7 +3049,7 @@
           <a:p>
             <a:fld id="{D997B5FA-0921-464F-AAE1-844C04324D75}" type="datetimeFigureOut">
               <a:rPr lang="zh-CN" altLang="en-US" smtClean="0"/>
-              <a:t>2023/10/13</a:t>
+              <a:t>2023/10/14</a:t>
             </a:fld>
             <a:endParaRPr lang="zh-CN" altLang="en-US"/>
           </a:p>
@@ -3217,7 +3217,7 @@
           <a:p>
             <a:fld id="{D997B5FA-0921-464F-AAE1-844C04324D75}" type="datetimeFigureOut">
               <a:rPr lang="zh-CN" altLang="en-US" smtClean="0"/>
-              <a:t>2023/10/13</a:t>
+              <a:t>2023/10/14</a:t>
             </a:fld>
             <a:endParaRPr lang="zh-CN" altLang="en-US"/>
           </a:p>
@@ -3395,7 +3395,7 @@
           <a:p>
             <a:fld id="{D997B5FA-0921-464F-AAE1-844C04324D75}" type="datetimeFigureOut">
               <a:rPr lang="zh-CN" altLang="en-US" smtClean="0"/>
-              <a:t>2023/10/13</a:t>
+              <a:t>2023/10/14</a:t>
             </a:fld>
             <a:endParaRPr lang="zh-CN" altLang="en-US"/>
           </a:p>
@@ -3498,7 +3498,7 @@
           <a:p>
             <a:fld id="{61E3B8A3-A6A6-4182-BF03-C7222DD023B0}" type="datetimeFigureOut">
               <a:rPr lang="zh-CN" altLang="en-US" smtClean="0"/>
-              <a:t>2023/10/13</a:t>
+              <a:t>2023/10/14</a:t>
             </a:fld>
             <a:endParaRPr lang="zh-CN" altLang="en-US"/>
           </a:p>
@@ -3639,7 +3639,7 @@
           <a:p>
             <a:fld id="{61E3B8A3-A6A6-4182-BF03-C7222DD023B0}" type="datetimeFigureOut">
               <a:rPr lang="zh-CN" altLang="en-US" smtClean="0"/>
-              <a:t>2023/10/13</a:t>
+              <a:t>2023/10/14</a:t>
             </a:fld>
             <a:endParaRPr lang="zh-CN" altLang="en-US"/>
           </a:p>
@@ -3780,7 +3780,7 @@
           <a:p>
             <a:fld id="{61E3B8A3-A6A6-4182-BF03-C7222DD023B0}" type="datetimeFigureOut">
               <a:rPr lang="zh-CN" altLang="en-US" smtClean="0"/>
-              <a:t>2023/10/13</a:t>
+              <a:t>2023/10/14</a:t>
             </a:fld>
             <a:endParaRPr lang="zh-CN" altLang="en-US"/>
           </a:p>
@@ -3921,7 +3921,7 @@
           <a:p>
             <a:fld id="{61E3B8A3-A6A6-4182-BF03-C7222DD023B0}" type="datetimeFigureOut">
               <a:rPr lang="zh-CN" altLang="en-US" smtClean="0"/>
-              <a:t>2023/10/13</a:t>
+              <a:t>2023/10/14</a:t>
             </a:fld>
             <a:endParaRPr lang="zh-CN" altLang="en-US"/>
           </a:p>
@@ -4054,7 +4054,7 @@
           <a:p>
             <a:fld id="{D997B5FA-0921-464F-AAE1-844C04324D75}" type="datetimeFigureOut">
               <a:rPr lang="zh-CN" altLang="en-US" smtClean="0"/>
-              <a:t>2023/10/13</a:t>
+              <a:t>2023/10/14</a:t>
             </a:fld>
             <a:endParaRPr lang="zh-CN" altLang="en-US"/>
           </a:p>
@@ -4299,7 +4299,7 @@
           <a:p>
             <a:fld id="{D997B5FA-0921-464F-AAE1-844C04324D75}" type="datetimeFigureOut">
               <a:rPr lang="zh-CN" altLang="en-US" smtClean="0"/>
-              <a:t>2023/10/13</a:t>
+              <a:t>2023/10/14</a:t>
             </a:fld>
             <a:endParaRPr lang="zh-CN" altLang="en-US"/>
           </a:p>
@@ -4759,7 +4759,7 @@
           <a:p>
             <a:fld id="{D997B5FA-0921-464F-AAE1-844C04324D75}" type="datetimeFigureOut">
               <a:rPr lang="zh-CN" altLang="en-US" smtClean="0"/>
-              <a:t>2023/10/13</a:t>
+              <a:t>2023/10/14</a:t>
             </a:fld>
             <a:endParaRPr lang="zh-CN" altLang="en-US"/>
           </a:p>
@@ -4927,7 +4927,7 @@
           <a:p>
             <a:fld id="{D997B5FA-0921-464F-AAE1-844C04324D75}" type="datetimeFigureOut">
               <a:rPr lang="zh-CN" altLang="en-US" smtClean="0"/>
-              <a:t>2023/10/13</a:t>
+              <a:t>2023/10/14</a:t>
             </a:fld>
             <a:endParaRPr lang="zh-CN" altLang="en-US"/>
           </a:p>
@@ -5172,7 +5172,7 @@
           <a:p>
             <a:fld id="{D997B5FA-0921-464F-AAE1-844C04324D75}" type="datetimeFigureOut">
               <a:rPr lang="zh-CN" altLang="en-US" smtClean="0"/>
-              <a:t>2023/10/13</a:t>
+              <a:t>2023/10/14</a:t>
             </a:fld>
             <a:endParaRPr lang="zh-CN" altLang="en-US"/>
           </a:p>
@@ -5401,7 +5401,7 @@
           <a:p>
             <a:fld id="{D997B5FA-0921-464F-AAE1-844C04324D75}" type="datetimeFigureOut">
               <a:rPr lang="zh-CN" altLang="en-US" smtClean="0"/>
-              <a:t>2023/10/13</a:t>
+              <a:t>2023/10/14</a:t>
             </a:fld>
             <a:endParaRPr lang="zh-CN" altLang="en-US"/>
           </a:p>
@@ -5630,7 +5630,7 @@
           <a:p>
             <a:fld id="{D997B5FA-0921-464F-AAE1-844C04324D75}" type="datetimeFigureOut">
               <a:rPr lang="zh-CN" altLang="en-US" smtClean="0"/>
-              <a:t>2023/10/13</a:t>
+              <a:t>2023/10/14</a:t>
             </a:fld>
             <a:endParaRPr lang="zh-CN" altLang="en-US"/>
           </a:p>
@@ -5994,7 +5994,7 @@
           <a:p>
             <a:fld id="{D997B5FA-0921-464F-AAE1-844C04324D75}" type="datetimeFigureOut">
               <a:rPr lang="zh-CN" altLang="en-US" smtClean="0"/>
-              <a:t>2023/10/13</a:t>
+              <a:t>2023/10/14</a:t>
             </a:fld>
             <a:endParaRPr lang="zh-CN" altLang="en-US"/>
           </a:p>
@@ -6111,7 +6111,7 @@
           <a:p>
             <a:fld id="{D997B5FA-0921-464F-AAE1-844C04324D75}" type="datetimeFigureOut">
               <a:rPr lang="zh-CN" altLang="en-US" smtClean="0"/>
-              <a:t>2023/10/13</a:t>
+              <a:t>2023/10/14</a:t>
             </a:fld>
             <a:endParaRPr lang="zh-CN" altLang="en-US"/>
           </a:p>
@@ -6206,7 +6206,7 @@
           <a:p>
             <a:fld id="{D997B5FA-0921-464F-AAE1-844C04324D75}" type="datetimeFigureOut">
               <a:rPr lang="zh-CN" altLang="en-US" smtClean="0"/>
-              <a:t>2023/10/13</a:t>
+              <a:t>2023/10/14</a:t>
             </a:fld>
             <a:endParaRPr lang="zh-CN" altLang="en-US"/>
           </a:p>
@@ -6481,7 +6481,7 @@
           <a:p>
             <a:fld id="{D997B5FA-0921-464F-AAE1-844C04324D75}" type="datetimeFigureOut">
               <a:rPr lang="zh-CN" altLang="en-US" smtClean="0"/>
-              <a:t>2023/10/13</a:t>
+              <a:t>2023/10/14</a:t>
             </a:fld>
             <a:endParaRPr lang="zh-CN" altLang="en-US"/>
           </a:p>
@@ -6733,7 +6733,7 @@
           <a:p>
             <a:fld id="{D997B5FA-0921-464F-AAE1-844C04324D75}" type="datetimeFigureOut">
               <a:rPr lang="zh-CN" altLang="en-US" smtClean="0"/>
-              <a:t>2023/10/13</a:t>
+              <a:t>2023/10/14</a:t>
             </a:fld>
             <a:endParaRPr lang="zh-CN" altLang="en-US"/>
           </a:p>
@@ -6901,7 +6901,7 @@
           <a:p>
             <a:fld id="{D997B5FA-0921-464F-AAE1-844C04324D75}" type="datetimeFigureOut">
               <a:rPr lang="zh-CN" altLang="en-US" smtClean="0"/>
-              <a:t>2023/10/13</a:t>
+              <a:t>2023/10/14</a:t>
             </a:fld>
             <a:endParaRPr lang="zh-CN" altLang="en-US"/>
           </a:p>
@@ -7079,7 +7079,7 @@
           <a:p>
             <a:fld id="{D997B5FA-0921-464F-AAE1-844C04324D75}" type="datetimeFigureOut">
               <a:rPr lang="zh-CN" altLang="en-US" smtClean="0"/>
-              <a:t>2023/10/13</a:t>
+              <a:t>2023/10/14</a:t>
             </a:fld>
             <a:endParaRPr lang="zh-CN" altLang="en-US"/>
           </a:p>
@@ -7443,7 +7443,7 @@
           <a:p>
             <a:fld id="{D997B5FA-0921-464F-AAE1-844C04324D75}" type="datetimeFigureOut">
               <a:rPr lang="zh-CN" altLang="en-US" smtClean="0"/>
-              <a:t>2023/10/13</a:t>
+              <a:t>2023/10/14</a:t>
             </a:fld>
             <a:endParaRPr lang="zh-CN" altLang="en-US"/>
           </a:p>
@@ -7560,7 +7560,7 @@
           <a:p>
             <a:fld id="{D997B5FA-0921-464F-AAE1-844C04324D75}" type="datetimeFigureOut">
               <a:rPr lang="zh-CN" altLang="en-US" smtClean="0"/>
-              <a:t>2023/10/13</a:t>
+              <a:t>2023/10/14</a:t>
             </a:fld>
             <a:endParaRPr lang="zh-CN" altLang="en-US"/>
           </a:p>
@@ -7655,7 +7655,7 @@
           <a:p>
             <a:fld id="{D997B5FA-0921-464F-AAE1-844C04324D75}" type="datetimeFigureOut">
               <a:rPr lang="zh-CN" altLang="en-US" smtClean="0"/>
-              <a:t>2023/10/13</a:t>
+              <a:t>2023/10/14</a:t>
             </a:fld>
             <a:endParaRPr lang="zh-CN" altLang="en-US"/>
           </a:p>
@@ -7930,7 +7930,7 @@
           <a:p>
             <a:fld id="{D997B5FA-0921-464F-AAE1-844C04324D75}" type="datetimeFigureOut">
               <a:rPr lang="zh-CN" altLang="en-US" smtClean="0"/>
-              <a:t>2023/10/13</a:t>
+              <a:t>2023/10/14</a:t>
             </a:fld>
             <a:endParaRPr lang="zh-CN" altLang="en-US"/>
           </a:p>
@@ -8182,7 +8182,7 @@
           <a:p>
             <a:fld id="{D997B5FA-0921-464F-AAE1-844C04324D75}" type="datetimeFigureOut">
               <a:rPr lang="zh-CN" altLang="en-US" smtClean="0"/>
-              <a:t>2023/10/13</a:t>
+              <a:t>2023/10/14</a:t>
             </a:fld>
             <a:endParaRPr lang="zh-CN" altLang="en-US"/>
           </a:p>
@@ -8393,7 +8393,7 @@
           <a:p>
             <a:fld id="{D997B5FA-0921-464F-AAE1-844C04324D75}" type="datetimeFigureOut">
               <a:rPr lang="zh-CN" altLang="en-US" smtClean="0"/>
-              <a:t>2023/10/13</a:t>
+              <a:t>2023/10/14</a:t>
             </a:fld>
             <a:endParaRPr lang="zh-CN" altLang="en-US"/>
           </a:p>
@@ -8931,7 +8931,7 @@
           <a:p>
             <a:fld id="{D997B5FA-0921-464F-AAE1-844C04324D75}" type="datetimeFigureOut">
               <a:rPr lang="zh-CN" altLang="en-US" smtClean="0"/>
-              <a:t>2023/10/13</a:t>
+              <a:t>2023/10/14</a:t>
             </a:fld>
             <a:endParaRPr lang="zh-CN" altLang="en-US"/>
           </a:p>
@@ -9474,7 +9474,7 @@
           <a:p>
             <a:fld id="{61E3B8A3-A6A6-4182-BF03-C7222DD023B0}" type="datetimeFigureOut">
               <a:rPr lang="zh-CN" altLang="en-US" smtClean="0"/>
-              <a:t>2023/10/13</a:t>
+              <a:t>2023/10/14</a:t>
             </a:fld>
             <a:endParaRPr lang="zh-CN" altLang="en-US"/>
           </a:p>
@@ -10012,7 +10012,7 @@
           <a:p>
             <a:fld id="{D997B5FA-0921-464F-AAE1-844C04324D75}" type="datetimeFigureOut">
               <a:rPr lang="zh-CN" altLang="en-US" smtClean="0"/>
-              <a:t>2023/10/13</a:t>
+              <a:t>2023/10/14</a:t>
             </a:fld>
             <a:endParaRPr lang="zh-CN" altLang="en-US"/>
           </a:p>
@@ -10546,7 +10546,7 @@
           <a:p>
             <a:fld id="{D997B5FA-0921-464F-AAE1-844C04324D75}" type="datetimeFigureOut">
               <a:rPr lang="zh-CN" altLang="en-US" smtClean="0"/>
-              <a:t>2023/10/13</a:t>
+              <a:t>2023/10/14</a:t>
             </a:fld>
             <a:endParaRPr lang="zh-CN" altLang="en-US"/>
           </a:p>
@@ -10944,20 +10944,11 @@
             <a:gs pos="0">
               <a:srgbClr val="FF0000"/>
             </a:gs>
-            <a:gs pos="25000">
+            <a:gs pos="100000">
               <a:srgbClr val="00FF00"/>
             </a:gs>
-            <a:gs pos="50000">
-              <a:srgbClr val="FF8080"/>
-            </a:gs>
-            <a:gs pos="75000">
-              <a:srgbClr val="FF80FF"/>
-            </a:gs>
-            <a:gs pos="100000">
-              <a:srgbClr val="80FFFF"/>
-            </a:gs>
           </a:gsLst>
-          <a:lin scaled="0" ang="0"/>
+          <a:lin scaled="0" ang="16200000"/>
         </a:gradFill>
         <a:effectLst/>
       </p:bgPr>
@@ -10976,106 +10967,934 @@
           <a:chExt cx="0" cy="0"/>
         </a:xfrm>
       </p:grpSpPr>
-      <p:pic>
-        <p:nvPicPr>
-          <p:cNvPr id="7" name="png素材2">
+      <p:sp>
+        <p:nvSpPr>
+          <p:cNvPr id="10" name="任意多边形: 形状 9">
             <a:extLst>
               <a:ext uri="{FF2B5EF4-FFF2-40B4-BE49-F238E27FC236}">
-                <a16:creationId xmlns:a16="http://schemas.microsoft.com/office/drawing/2014/main" id="{590F313E-28A7-825B-6D36-5187DC9EAA85}"/>
+                <a16:creationId xmlns:a16="http://schemas.microsoft.com/office/drawing/2014/main" id="{2E103254-E189-A79A-3E30-259FB4208D29}"/>
               </a:ext>
             </a:extLst>
           </p:cNvPr>
-          <p:cNvPicPr>
-            <a:picLocks noChangeAspect="1"/>
-          </p:cNvPicPr>
+          <p:cNvSpPr/>
           <p:nvPr/>
-        </p:nvPicPr>
-        <p:blipFill>
-          <a:blip r:embed="rId13" cstate="email">
-            <a:duotone>
-              <a:schemeClr val="accent1">
-                <a:shade val="45000"/>
-                <a:satMod val="135000"/>
-              </a:schemeClr>
-              <a:prstClr val="white"/>
-            </a:duotone>
-            <a:extLst>
-              <a:ext uri="{28A0092B-C50C-407E-A947-70E740481C1C}">
-                <a14:useLocalDpi xmlns:a14="http://schemas.microsoft.com/office/drawing/2010/main"/>
-              </a:ext>
-            </a:extLst>
-          </a:blip>
-          <a:stretch>
-            <a:fillRect/>
-          </a:stretch>
-        </p:blipFill>
+        </p:nvSpPr>
         <p:spPr>
-          <a:xfrm rot="16200000">
-            <a:off x="9333465" y="4039564"/>
-            <a:ext cx="1444577" cy="4272499"/>
+          <a:xfrm>
+            <a:off x="11529319" y="5893850"/>
+            <a:ext cx="662681" cy="964150"/>
           </a:xfrm>
-          <a:prstGeom prst="rect">
+          <a:custGeom>
             <a:avLst/>
-          </a:prstGeom>
-          <a:noFill/>
+            <a:gdLst>
+              <a:gd name="connsiteX0" fmla="*/ 662681 w 662681"/>
+              <a:gd name="connsiteY0" fmla="*/ 0 h 964150"/>
+              <a:gd name="connsiteX1" fmla="*/ 662681 w 662681"/>
+              <a:gd name="connsiteY1" fmla="*/ 964150 h 964150"/>
+              <a:gd name="connsiteX2" fmla="*/ 0 w 662681"/>
+              <a:gd name="connsiteY2" fmla="*/ 964150 h 964150"/>
+              <a:gd name="connsiteX3" fmla="*/ 42976 w 662681"/>
+              <a:gd name="connsiteY3" fmla="*/ 930998 h 964150"/>
+              <a:gd name="connsiteX4" fmla="*/ 648392 w 662681"/>
+              <a:gd name="connsiteY4" fmla="*/ 48603 h 964150"/>
+            </a:gdLst>
+            <a:ahLst/>
+            <a:cxnLst>
+              <a:cxn ang="0">
+                <a:pos x="connsiteX0" y="connsiteY0"/>
+              </a:cxn>
+              <a:cxn ang="0">
+                <a:pos x="connsiteX1" y="connsiteY1"/>
+              </a:cxn>
+              <a:cxn ang="0">
+                <a:pos x="connsiteX2" y="connsiteY2"/>
+              </a:cxn>
+              <a:cxn ang="0">
+                <a:pos x="connsiteX3" y="connsiteY3"/>
+              </a:cxn>
+              <a:cxn ang="0">
+                <a:pos x="connsiteX4" y="connsiteY4"/>
+              </a:cxn>
+            </a:cxnLst>
+            <a:rect l="l" t="t" r="r" b="b"/>
+            <a:pathLst>
+              <a:path w="662681" h="964150">
+                <a:moveTo>
+                  <a:pt x="662681" y="0"/>
+                </a:moveTo>
+                <a:lnTo>
+                  <a:pt x="662681" y="964150"/>
+                </a:lnTo>
+                <a:lnTo>
+                  <a:pt x="0" y="964150"/>
+                </a:lnTo>
+                <a:lnTo>
+                  <a:pt x="42976" y="930998"/>
+                </a:lnTo>
+                <a:cubicBezTo>
+                  <a:pt x="318774" y="700608"/>
+                  <a:pt x="530719" y="396336"/>
+                  <a:pt x="648392" y="48603"/>
+                </a:cubicBezTo>
+                <a:close/>
+              </a:path>
+            </a:pathLst>
+          </a:custGeom>
+          <a:gradFill rotWithShape="1">
+            <a:gsLst>
+              <a:gs pos="0">
+                <a:srgbClr val="FF0000"/>
+              </a:gs>
+              <a:gs pos="100000">
+                <a:srgbClr val="00FF00"/>
+              </a:gs>
+            </a:gsLst>
+            <a:lin scaled="0" ang="16200000"/>
+          </a:gradFill>
           <a:ln>
-            <a:noFill/>
+            <a:solidFill>
+              <a:srgbClr val="000000"/>
+            </a:solidFill>
           </a:ln>
         </p:spPr>
-      </p:pic>
-      <p:pic>
-        <p:nvPicPr>
-          <p:cNvPr id="6" name="png素材">
+        <p:style>
+          <a:lnRef idx="2">
+            <a:schemeClr val="accent1">
+              <a:shade val="15000"/>
+            </a:schemeClr>
+          </a:lnRef>
+          <a:fillRef idx="1">
+            <a:schemeClr val="accent1"/>
+          </a:fillRef>
+          <a:effectRef idx="0">
+            <a:schemeClr val="accent1"/>
+          </a:effectRef>
+          <a:fontRef idx="minor">
+            <a:schemeClr val="lt1"/>
+          </a:fontRef>
+        </p:style>
+        <p:txBody>
+          <a:bodyPr wrap="square" rtlCol="0" anchor="ctr">
+            <a:noAutofit/>
+          </a:bodyPr>
+          <a:lstStyle/>
+          <a:p>
+            <a:pPr algn="ctr"/>
+            <a:endParaRPr lang="zh-CN" altLang="en-US"/>
+          </a:p>
+        </p:txBody>
+      </p:sp>
+      <p:sp>
+        <p:nvSpPr>
+          <p:cNvPr id="9" name="任意多边形: 形状 8">
             <a:extLst>
               <a:ext uri="{FF2B5EF4-FFF2-40B4-BE49-F238E27FC236}">
-                <a16:creationId xmlns:a16="http://schemas.microsoft.com/office/drawing/2014/main" id="{89A68DD7-A55E-E6C0-25C7-FCA5D490A9AD}"/>
+                <a16:creationId xmlns:a16="http://schemas.microsoft.com/office/drawing/2014/main" id="{CC25A6A2-C3F9-3C41-4F93-E25EDD5AC2ED}"/>
               </a:ext>
             </a:extLst>
           </p:cNvPr>
-          <p:cNvPicPr>
-            <a:picLocks noChangeAspect="1"/>
-          </p:cNvPicPr>
+          <p:cNvSpPr/>
           <p:nvPr/>
-        </p:nvPicPr>
-        <p:blipFill>
-          <a:blip r:embed="rId14" cstate="email">
-            <a:duotone>
-              <a:schemeClr val="accent1">
-                <a:shade val="45000"/>
-                <a:satMod val="135000"/>
-              </a:schemeClr>
-              <a:prstClr val="white"/>
-            </a:duotone>
+        </p:nvSpPr>
+        <p:spPr>
+          <a:xfrm>
+            <a:off x="6878746" y="4802253"/>
+            <a:ext cx="2207779" cy="2055747"/>
+          </a:xfrm>
+          <a:custGeom>
+            <a:avLst/>
+            <a:gdLst>
+              <a:gd name="connsiteX0" fmla="*/ 41603 w 2207779"/>
+              <a:gd name="connsiteY0" fmla="*/ 0 h 2055747"/>
+              <a:gd name="connsiteX1" fmla="*/ 1523571 w 2207779"/>
+              <a:gd name="connsiteY1" fmla="*/ 0 h 2055747"/>
+              <a:gd name="connsiteX2" fmla="*/ 1495435 w 2207779"/>
+              <a:gd name="connsiteY2" fmla="*/ 109427 h 2055747"/>
+              <a:gd name="connsiteX3" fmla="*/ 1455336 w 2207779"/>
+              <a:gd name="connsiteY3" fmla="*/ 507189 h 2055747"/>
+              <a:gd name="connsiteX4" fmla="*/ 2173567 w 2207779"/>
+              <a:gd name="connsiteY4" fmla="*/ 2030164 h 2055747"/>
+              <a:gd name="connsiteX5" fmla="*/ 2207779 w 2207779"/>
+              <a:gd name="connsiteY5" fmla="*/ 2055747 h 2055747"/>
+              <a:gd name="connsiteX6" fmla="*/ 372479 w 2207779"/>
+              <a:gd name="connsiteY6" fmla="*/ 2055747 h 2055747"/>
+              <a:gd name="connsiteX7" fmla="*/ 269468 w 2207779"/>
+              <a:gd name="connsiteY7" fmla="*/ 1841910 h 2055747"/>
+              <a:gd name="connsiteX8" fmla="*/ 0 w 2207779"/>
+              <a:gd name="connsiteY8" fmla="*/ 507189 h 2055747"/>
+              <a:gd name="connsiteX9" fmla="*/ 17704 w 2207779"/>
+              <a:gd name="connsiteY9" fmla="*/ 156594 h 2055747"/>
+            </a:gdLst>
+            <a:ahLst/>
+            <a:cxnLst>
+              <a:cxn ang="0">
+                <a:pos x="connsiteX0" y="connsiteY0"/>
+              </a:cxn>
+              <a:cxn ang="0">
+                <a:pos x="connsiteX1" y="connsiteY1"/>
+              </a:cxn>
+              <a:cxn ang="0">
+                <a:pos x="connsiteX2" y="connsiteY2"/>
+              </a:cxn>
+              <a:cxn ang="0">
+                <a:pos x="connsiteX3" y="connsiteY3"/>
+              </a:cxn>
+              <a:cxn ang="0">
+                <a:pos x="connsiteX4" y="connsiteY4"/>
+              </a:cxn>
+              <a:cxn ang="0">
+                <a:pos x="connsiteX5" y="connsiteY5"/>
+              </a:cxn>
+              <a:cxn ang="0">
+                <a:pos x="connsiteX6" y="connsiteY6"/>
+              </a:cxn>
+              <a:cxn ang="0">
+                <a:pos x="connsiteX7" y="connsiteY7"/>
+              </a:cxn>
+              <a:cxn ang="0">
+                <a:pos x="connsiteX8" y="connsiteY8"/>
+              </a:cxn>
+              <a:cxn ang="0">
+                <a:pos x="connsiteX9" y="connsiteY9"/>
+              </a:cxn>
+            </a:cxnLst>
+            <a:rect l="l" t="t" r="r" b="b"/>
+            <a:pathLst>
+              <a:path w="2207779" h="2055747">
+                <a:moveTo>
+                  <a:pt x="41603" y="0"/>
+                </a:moveTo>
+                <a:lnTo>
+                  <a:pt x="1523571" y="0"/>
+                </a:lnTo>
+                <a:lnTo>
+                  <a:pt x="1495435" y="109427"/>
+                </a:lnTo>
+                <a:cubicBezTo>
+                  <a:pt x="1469143" y="237907"/>
+                  <a:pt x="1455336" y="370936"/>
+                  <a:pt x="1455336" y="507189"/>
+                </a:cubicBezTo>
+                <a:cubicBezTo>
+                  <a:pt x="1455336" y="1120328"/>
+                  <a:pt x="1734925" y="1668165"/>
+                  <a:pt x="2173567" y="2030164"/>
+                </a:cubicBezTo>
+                <a:lnTo>
+                  <a:pt x="2207779" y="2055747"/>
+                </a:lnTo>
+                <a:lnTo>
+                  <a:pt x="372479" y="2055747"/>
+                </a:lnTo>
+                <a:lnTo>
+                  <a:pt x="269468" y="1841910"/>
+                </a:lnTo>
+                <a:cubicBezTo>
+                  <a:pt x="95951" y="1431670"/>
+                  <a:pt x="0" y="980635"/>
+                  <a:pt x="0" y="507189"/>
+                </a:cubicBezTo>
+                <a:cubicBezTo>
+                  <a:pt x="0" y="388827"/>
+                  <a:pt x="5998" y="271867"/>
+                  <a:pt x="17704" y="156594"/>
+                </a:cubicBezTo>
+                <a:close/>
+              </a:path>
+            </a:pathLst>
+          </a:custGeom>
+          <a:gradFill flip="none" rotWithShape="1">
+            <a:gsLst>
+              <a:gs pos="0">
+                <a:schemeClr val="accent1">
+                  <a:alpha val="70000"/>
+                </a:schemeClr>
+              </a:gs>
+              <a:gs pos="100000">
+                <a:schemeClr val="accent1">
+                  <a:alpha val="77000"/>
+                  <a:lumMod val="62000"/>
+                </a:schemeClr>
+              </a:gs>
+            </a:gsLst>
+            <a:path path="shape">
+              <a:fillToRect l="50000" t="50000" r="50000" b="50000"/>
+            </a:path>
+            <a:tileRect/>
+          </a:gradFill>
+          <a:ln>
+            <a:solidFill>
+              <a:srgbClr val="000000"/>
+            </a:solidFill>
+          </a:ln>
+        </p:spPr>
+        <p:style>
+          <a:lnRef idx="2">
+            <a:schemeClr val="accent1">
+              <a:shade val="15000"/>
+            </a:schemeClr>
+          </a:lnRef>
+          <a:fillRef idx="1">
+            <a:schemeClr val="accent1"/>
+          </a:fillRef>
+          <a:effectRef idx="0">
+            <a:schemeClr val="accent1"/>
+          </a:effectRef>
+          <a:fontRef idx="minor">
+            <a:schemeClr val="lt1"/>
+          </a:fontRef>
+        </p:style>
+        <p:txBody>
+          <a:bodyPr wrap="square" rtlCol="0" anchor="ctr">
+            <a:noAutofit/>
+          </a:bodyPr>
+          <a:lstStyle/>
+          <a:p>
+            <a:pPr algn="ctr"/>
+            <a:endParaRPr lang="zh-CN" altLang="en-US" dirty="0">
+              <a:solidFill>
+                <a:schemeClr val="tx1"/>
+              </a:solidFill>
+            </a:endParaRPr>
+          </a:p>
+        </p:txBody>
+      </p:sp>
+      <p:sp>
+        <p:nvSpPr>
+          <p:cNvPr id="8" name="任意多边形: 形状 7">
             <a:extLst>
-              <a:ext uri="{28A0092B-C50C-407E-A947-70E740481C1C}">
-                <a14:useLocalDpi xmlns:a14="http://schemas.microsoft.com/office/drawing/2010/main"/>
+              <a:ext uri="{FF2B5EF4-FFF2-40B4-BE49-F238E27FC236}">
+                <a16:creationId xmlns:a16="http://schemas.microsoft.com/office/drawing/2014/main" id="{3DD16A4E-A29E-C617-646F-11AE3F069908}"/>
               </a:ext>
             </a:extLst>
-          </a:blip>
-          <a:stretch>
-            <a:fillRect/>
-          </a:stretch>
-        </p:blipFill>
+          </p:cNvPr>
+          <p:cNvSpPr/>
+          <p:nvPr/>
+        </p:nvSpPr>
         <p:spPr>
-          <a:xfrm rot="16200000" flipV="1">
-            <a:off x="3242868" y="2205430"/>
-            <a:ext cx="1433763" cy="7919502"/>
+          <a:xfrm>
+            <a:off x="9775143" y="1880442"/>
+            <a:ext cx="2410885" cy="2823922"/>
           </a:xfrm>
-          <a:prstGeom prst="rect">
+          <a:custGeom>
             <a:avLst/>
-          </a:prstGeom>
-          <a:noFill/>
+            <a:gdLst>
+              <a:gd name="connsiteX0" fmla="*/ 532603 w 2410885"/>
+              <a:gd name="connsiteY0" fmla="*/ 0 h 2823922"/>
+              <a:gd name="connsiteX1" fmla="*/ 2167068 w 2410885"/>
+              <a:gd name="connsiteY1" fmla="*/ 413862 h 2823922"/>
+              <a:gd name="connsiteX2" fmla="*/ 2410885 w 2410885"/>
+              <a:gd name="connsiteY2" fmla="*/ 561985 h 2823922"/>
+              <a:gd name="connsiteX3" fmla="*/ 2410885 w 2410885"/>
+              <a:gd name="connsiteY3" fmla="*/ 2823922 h 2823922"/>
+              <a:gd name="connsiteX4" fmla="*/ 2351168 w 2410885"/>
+              <a:gd name="connsiteY4" fmla="*/ 2660762 h 2823922"/>
+              <a:gd name="connsiteX5" fmla="*/ 532603 w 2410885"/>
+              <a:gd name="connsiteY5" fmla="*/ 1455336 h 2823922"/>
+              <a:gd name="connsiteX6" fmla="*/ 134841 w 2410885"/>
+              <a:gd name="connsiteY6" fmla="*/ 1495433 h 2823922"/>
+              <a:gd name="connsiteX7" fmla="*/ 0 w 2410885"/>
+              <a:gd name="connsiteY7" fmla="*/ 1530104 h 2823922"/>
+              <a:gd name="connsiteX8" fmla="*/ 0 w 2410885"/>
+              <a:gd name="connsiteY8" fmla="*/ 45481 h 2823922"/>
+              <a:gd name="connsiteX9" fmla="*/ 182008 w 2410885"/>
+              <a:gd name="connsiteY9" fmla="*/ 17704 h 2823922"/>
+              <a:gd name="connsiteX10" fmla="*/ 532603 w 2410885"/>
+              <a:gd name="connsiteY10" fmla="*/ 0 h 2823922"/>
+            </a:gdLst>
+            <a:ahLst/>
+            <a:cxnLst>
+              <a:cxn ang="0">
+                <a:pos x="connsiteX0" y="connsiteY0"/>
+              </a:cxn>
+              <a:cxn ang="0">
+                <a:pos x="connsiteX1" y="connsiteY1"/>
+              </a:cxn>
+              <a:cxn ang="0">
+                <a:pos x="connsiteX2" y="connsiteY2"/>
+              </a:cxn>
+              <a:cxn ang="0">
+                <a:pos x="connsiteX3" y="connsiteY3"/>
+              </a:cxn>
+              <a:cxn ang="0">
+                <a:pos x="connsiteX4" y="connsiteY4"/>
+              </a:cxn>
+              <a:cxn ang="0">
+                <a:pos x="connsiteX5" y="connsiteY5"/>
+              </a:cxn>
+              <a:cxn ang="0">
+                <a:pos x="connsiteX6" y="connsiteY6"/>
+              </a:cxn>
+              <a:cxn ang="0">
+                <a:pos x="connsiteX7" y="connsiteY7"/>
+              </a:cxn>
+              <a:cxn ang="0">
+                <a:pos x="connsiteX8" y="connsiteY8"/>
+              </a:cxn>
+              <a:cxn ang="0">
+                <a:pos x="connsiteX9" y="connsiteY9"/>
+              </a:cxn>
+              <a:cxn ang="0">
+                <a:pos x="connsiteX10" y="connsiteY10"/>
+              </a:cxn>
+            </a:cxnLst>
+            <a:rect l="l" t="t" r="r" b="b"/>
+            <a:pathLst>
+              <a:path w="2410885" h="2823922">
+                <a:moveTo>
+                  <a:pt x="532603" y="0"/>
+                </a:moveTo>
+                <a:cubicBezTo>
+                  <a:pt x="1124411" y="0"/>
+                  <a:pt x="1681202" y="149924"/>
+                  <a:pt x="2167068" y="413862"/>
+                </a:cubicBezTo>
+                <a:lnTo>
+                  <a:pt x="2410885" y="561985"/>
+                </a:lnTo>
+                <a:lnTo>
+                  <a:pt x="2410885" y="2823922"/>
+                </a:lnTo>
+                <a:lnTo>
+                  <a:pt x="2351168" y="2660762"/>
+                </a:lnTo>
+                <a:cubicBezTo>
+                  <a:pt x="2051549" y="1952384"/>
+                  <a:pt x="1350122" y="1455336"/>
+                  <a:pt x="532603" y="1455336"/>
+                </a:cubicBezTo>
+                <a:cubicBezTo>
+                  <a:pt x="396350" y="1455336"/>
+                  <a:pt x="263321" y="1469143"/>
+                  <a:pt x="134841" y="1495433"/>
+                </a:cubicBezTo>
+                <a:lnTo>
+                  <a:pt x="0" y="1530104"/>
+                </a:lnTo>
+                <a:lnTo>
+                  <a:pt x="0" y="45481"/>
+                </a:lnTo>
+                <a:lnTo>
+                  <a:pt x="182008" y="17704"/>
+                </a:lnTo>
+                <a:cubicBezTo>
+                  <a:pt x="297280" y="5997"/>
+                  <a:pt x="414241" y="0"/>
+                  <a:pt x="532603" y="0"/>
+                </a:cubicBezTo>
+                <a:close/>
+              </a:path>
+            </a:pathLst>
+          </a:custGeom>
+          <a:gradFill>
+            <a:gsLst>
+              <a:gs pos="0">
+                <a:schemeClr val="accent1">
+                  <a:alpha val="70000"/>
+                </a:schemeClr>
+              </a:gs>
+              <a:gs pos="100000">
+                <a:schemeClr val="accent1">
+                  <a:alpha val="77000"/>
+                  <a:lumMod val="62000"/>
+                </a:schemeClr>
+              </a:gs>
+            </a:gsLst>
+            <a:path path="shape">
+              <a:fillToRect l="50000" t="50000" r="50000" b="50000"/>
+            </a:path>
+          </a:gradFill>
           <a:ln>
-            <a:noFill/>
+            <a:solidFill>
+              <a:srgbClr val="000000"/>
+            </a:solidFill>
           </a:ln>
         </p:spPr>
-      </p:pic>
+        <p:style>
+          <a:lnRef idx="2">
+            <a:schemeClr val="accent1">
+              <a:shade val="15000"/>
+            </a:schemeClr>
+          </a:lnRef>
+          <a:fillRef idx="1">
+            <a:schemeClr val="accent1"/>
+          </a:fillRef>
+          <a:effectRef idx="0">
+            <a:schemeClr val="accent1"/>
+          </a:effectRef>
+          <a:fontRef idx="minor">
+            <a:schemeClr val="lt1"/>
+          </a:fontRef>
+        </p:style>
+        <p:txBody>
+          <a:bodyPr wrap="square" rtlCol="0" anchor="ctr">
+            <a:noAutofit/>
+          </a:bodyPr>
+          <a:lstStyle/>
+          <a:p>
+            <a:pPr algn="ctr"/>
+            <a:endParaRPr lang="zh-CN" altLang="en-US"/>
+          </a:p>
+        </p:txBody>
+      </p:sp>
+      <p:sp>
+        <p:nvSpPr>
+          <p:cNvPr id="7" name="任意多边形: 形状 6">
+            <a:extLst>
+              <a:ext uri="{FF2B5EF4-FFF2-40B4-BE49-F238E27FC236}">
+                <a16:creationId xmlns:a16="http://schemas.microsoft.com/office/drawing/2014/main" id="{2B89314D-00EE-1EB9-DEB5-C4C0362EFDCD}"/>
+              </a:ext>
+            </a:extLst>
+          </p:cNvPr>
+          <p:cNvSpPr/>
+          <p:nvPr/>
+        </p:nvSpPr>
+        <p:spPr>
+          <a:xfrm>
+            <a:off x="6920348" y="1880442"/>
+            <a:ext cx="4073631" cy="2921812"/>
+          </a:xfrm>
+          <a:custGeom>
+            <a:avLst/>
+            <a:gdLst>
+              <a:gd name="connsiteX0" fmla="*/ 2659734 w 3198554"/>
+              <a:gd name="connsiteY0" fmla="*/ 0 h 2294163"/>
+              <a:gd name="connsiteX1" fmla="*/ 2935016 w 3198554"/>
+              <a:gd name="connsiteY1" fmla="*/ 13901 h 2294163"/>
+              <a:gd name="connsiteX2" fmla="*/ 3198554 w 3198554"/>
+              <a:gd name="connsiteY2" fmla="*/ 54122 h 2294163"/>
+              <a:gd name="connsiteX3" fmla="*/ 3198554 w 3198554"/>
+              <a:gd name="connsiteY3" fmla="*/ 1240924 h 2294163"/>
+              <a:gd name="connsiteX4" fmla="*/ 3120565 w 3198554"/>
+              <a:gd name="connsiteY4" fmla="*/ 1212379 h 2294163"/>
+              <a:gd name="connsiteX5" fmla="*/ 2659734 w 3198554"/>
+              <a:gd name="connsiteY5" fmla="*/ 1142708 h 2294163"/>
+              <a:gd name="connsiteX6" fmla="*/ 1179713 w 3198554"/>
+              <a:gd name="connsiteY6" fmla="*/ 2231569 h 2294163"/>
+              <a:gd name="connsiteX7" fmla="*/ 1163619 w 3198554"/>
+              <a:gd name="connsiteY7" fmla="*/ 2294163 h 2294163"/>
+              <a:gd name="connsiteX8" fmla="*/ 0 w 3198554"/>
+              <a:gd name="connsiteY8" fmla="*/ 2294163 h 2294163"/>
+              <a:gd name="connsiteX9" fmla="*/ 22034 w 3198554"/>
+              <a:gd name="connsiteY9" fmla="*/ 2149788 h 2294163"/>
+              <a:gd name="connsiteX10" fmla="*/ 2659734 w 3198554"/>
+              <a:gd name="connsiteY10" fmla="*/ 0 h 2294163"/>
+            </a:gdLst>
+            <a:ahLst/>
+            <a:cxnLst>
+              <a:cxn ang="0">
+                <a:pos x="connsiteX0" y="connsiteY0"/>
+              </a:cxn>
+              <a:cxn ang="0">
+                <a:pos x="connsiteX1" y="connsiteY1"/>
+              </a:cxn>
+              <a:cxn ang="0">
+                <a:pos x="connsiteX2" y="connsiteY2"/>
+              </a:cxn>
+              <a:cxn ang="0">
+                <a:pos x="connsiteX3" y="connsiteY3"/>
+              </a:cxn>
+              <a:cxn ang="0">
+                <a:pos x="connsiteX4" y="connsiteY4"/>
+              </a:cxn>
+              <a:cxn ang="0">
+                <a:pos x="connsiteX5" y="connsiteY5"/>
+              </a:cxn>
+              <a:cxn ang="0">
+                <a:pos x="connsiteX6" y="connsiteY6"/>
+              </a:cxn>
+              <a:cxn ang="0">
+                <a:pos x="connsiteX7" y="connsiteY7"/>
+              </a:cxn>
+              <a:cxn ang="0">
+                <a:pos x="connsiteX8" y="connsiteY8"/>
+              </a:cxn>
+              <a:cxn ang="0">
+                <a:pos x="connsiteX9" y="connsiteY9"/>
+              </a:cxn>
+              <a:cxn ang="0">
+                <a:pos x="connsiteX10" y="connsiteY10"/>
+              </a:cxn>
+            </a:cxnLst>
+            <a:rect l="l" t="t" r="r" b="b"/>
+            <a:pathLst>
+              <a:path w="3198554" h="2294163">
+                <a:moveTo>
+                  <a:pt x="2659734" y="0"/>
+                </a:moveTo>
+                <a:cubicBezTo>
+                  <a:pt x="2752670" y="0"/>
+                  <a:pt x="2844506" y="4709"/>
+                  <a:pt x="2935016" y="13901"/>
+                </a:cubicBezTo>
+                <a:lnTo>
+                  <a:pt x="3198554" y="54122"/>
+                </a:lnTo>
+                <a:lnTo>
+                  <a:pt x="3198554" y="1240924"/>
+                </a:lnTo>
+                <a:lnTo>
+                  <a:pt x="3120565" y="1212379"/>
+                </a:lnTo>
+                <a:cubicBezTo>
+                  <a:pt x="2974989" y="1167100"/>
+                  <a:pt x="2820210" y="1142708"/>
+                  <a:pt x="2659734" y="1142708"/>
+                </a:cubicBezTo>
+                <a:cubicBezTo>
+                  <a:pt x="1964339" y="1142708"/>
+                  <a:pt x="1375922" y="1600739"/>
+                  <a:pt x="1179713" y="2231569"/>
+                </a:cubicBezTo>
+                <a:lnTo>
+                  <a:pt x="1163619" y="2294163"/>
+                </a:lnTo>
+                <a:lnTo>
+                  <a:pt x="0" y="2294163"/>
+                </a:lnTo>
+                <a:lnTo>
+                  <a:pt x="22034" y="2149788"/>
+                </a:lnTo>
+                <a:cubicBezTo>
+                  <a:pt x="273091" y="922907"/>
+                  <a:pt x="1358635" y="0"/>
+                  <a:pt x="2659734" y="0"/>
+                </a:cubicBezTo>
+                <a:close/>
+              </a:path>
+            </a:pathLst>
+          </a:custGeom>
+          <a:ln>
+            <a:solidFill>
+              <a:srgbClr val="000000"/>
+            </a:solidFill>
+          </a:ln>
+        </p:spPr>
+        <p:style>
+          <a:lnRef idx="2">
+            <a:schemeClr val="accent1">
+              <a:shade val="15000"/>
+            </a:schemeClr>
+          </a:lnRef>
+          <a:fillRef idx="1">
+            <a:schemeClr val="accent1"/>
+          </a:fillRef>
+          <a:effectRef idx="0">
+            <a:schemeClr val="accent1"/>
+          </a:effectRef>
+          <a:fontRef idx="minor">
+            <a:schemeClr val="lt1"/>
+          </a:fontRef>
+        </p:style>
+        <p:txBody>
+          <a:bodyPr wrap="square" rtlCol="0" anchor="ctr">
+            <a:noAutofit/>
+          </a:bodyPr>
+          <a:lstStyle/>
+          <a:p>
+            <a:pPr algn="ctr"/>
+            <a:endParaRPr lang="zh-CN" altLang="en-US">
+              <a:solidFill>
+                <a:schemeClr val="tx1"/>
+              </a:solidFill>
+            </a:endParaRPr>
+          </a:p>
+        </p:txBody>
+      </p:sp>
+      <p:sp>
+        <p:nvSpPr>
+          <p:cNvPr id="6" name="任意多边形: 形状 5">
+            <a:extLst>
+              <a:ext uri="{FF2B5EF4-FFF2-40B4-BE49-F238E27FC236}">
+                <a16:creationId xmlns:a16="http://schemas.microsoft.com/office/drawing/2014/main" id="{D9D56249-279F-EE14-E8AF-D2C6FF66AF1D}"/>
+              </a:ext>
+            </a:extLst>
+          </p:cNvPr>
+          <p:cNvSpPr/>
+          <p:nvPr/>
+        </p:nvSpPr>
+        <p:spPr>
+          <a:xfrm rot="1518949">
+            <a:off x="-332167" y="-610048"/>
+            <a:ext cx="2675851" cy="3225464"/>
+          </a:xfrm>
+          <a:custGeom>
+            <a:avLst/>
+            <a:gdLst>
+              <a:gd name="connsiteX0" fmla="*/ 0 w 2675851"/>
+              <a:gd name="connsiteY0" fmla="*/ 1136411 h 3225464"/>
+              <a:gd name="connsiteX1" fmla="*/ 2402378 w 2675851"/>
+              <a:gd name="connsiteY1" fmla="*/ 0 h 3225464"/>
+              <a:gd name="connsiteX2" fmla="*/ 2407322 w 2675851"/>
+              <a:gd name="connsiteY2" fmla="*/ 8138 h 3225464"/>
+              <a:gd name="connsiteX3" fmla="*/ 2675851 w 2675851"/>
+              <a:gd name="connsiteY3" fmla="*/ 1068640 h 3225464"/>
+              <a:gd name="connsiteX4" fmla="*/ 1112593 w 2675851"/>
+              <a:gd name="connsiteY4" fmla="*/ 3193478 h 3225464"/>
+              <a:gd name="connsiteX5" fmla="*/ 988197 w 2675851"/>
+              <a:gd name="connsiteY5" fmla="*/ 3225464 h 3225464"/>
+            </a:gdLst>
+            <a:ahLst/>
+            <a:cxnLst>
+              <a:cxn ang="0">
+                <a:pos x="connsiteX0" y="connsiteY0"/>
+              </a:cxn>
+              <a:cxn ang="0">
+                <a:pos x="connsiteX1" y="connsiteY1"/>
+              </a:cxn>
+              <a:cxn ang="0">
+                <a:pos x="connsiteX2" y="connsiteY2"/>
+              </a:cxn>
+              <a:cxn ang="0">
+                <a:pos x="connsiteX3" y="connsiteY3"/>
+              </a:cxn>
+              <a:cxn ang="0">
+                <a:pos x="connsiteX4" y="connsiteY4"/>
+              </a:cxn>
+              <a:cxn ang="0">
+                <a:pos x="connsiteX5" y="connsiteY5"/>
+              </a:cxn>
+            </a:cxnLst>
+            <a:rect l="l" t="t" r="r" b="b"/>
+            <a:pathLst>
+              <a:path w="2675851" h="3225464">
+                <a:moveTo>
+                  <a:pt x="0" y="1136411"/>
+                </a:moveTo>
+                <a:lnTo>
+                  <a:pt x="2402378" y="0"/>
+                </a:lnTo>
+                <a:lnTo>
+                  <a:pt x="2407322" y="8138"/>
+                </a:lnTo>
+                <a:cubicBezTo>
+                  <a:pt x="2578575" y="323386"/>
+                  <a:pt x="2675851" y="684653"/>
+                  <a:pt x="2675851" y="1068640"/>
+                </a:cubicBezTo>
+                <a:cubicBezTo>
+                  <a:pt x="2675851" y="2067006"/>
+                  <a:pt x="2018266" y="2911785"/>
+                  <a:pt x="1112593" y="3193478"/>
+                </a:cubicBezTo>
+                <a:lnTo>
+                  <a:pt x="988197" y="3225464"/>
+                </a:lnTo>
+                <a:close/>
+              </a:path>
+            </a:pathLst>
+          </a:custGeom>
+          <a:gradFill flip="none" rotWithShape="1">
+            <a:gsLst>
+              <a:gs pos="0">
+                <a:schemeClr val="accent1">
+                  <a:lumMod val="20000"/>
+                  <a:lumOff val="80000"/>
+                  <a:alpha val="80000"/>
+                </a:schemeClr>
+              </a:gs>
+              <a:gs pos="100000">
+                <a:schemeClr val="accent1">
+                  <a:lumMod val="50000"/>
+                  <a:alpha val="50000"/>
+                </a:schemeClr>
+              </a:gs>
+            </a:gsLst>
+            <a:lin ang="5400000" scaled="0"/>
+            <a:tileRect/>
+          </a:gradFill>
+          <a:ln>
+            <a:solidFill>
+              <a:srgbClr val="000000"/>
+            </a:solidFill>
+          </a:ln>
+          <a:effectLst/>
+        </p:spPr>
+        <p:style>
+          <a:lnRef idx="2">
+            <a:schemeClr val="accent1">
+              <a:shade val="15000"/>
+            </a:schemeClr>
+          </a:lnRef>
+          <a:fillRef idx="1">
+            <a:schemeClr val="accent1"/>
+          </a:fillRef>
+          <a:effectRef idx="0">
+            <a:schemeClr val="accent1"/>
+          </a:effectRef>
+          <a:fontRef idx="minor">
+            <a:schemeClr val="lt1"/>
+          </a:fontRef>
+        </p:style>
+        <p:txBody>
+          <a:bodyPr wrap="square" rtlCol="0" anchor="ctr">
+            <a:noAutofit/>
+          </a:bodyPr>
+          <a:lstStyle/>
+          <a:p>
+            <a:pPr algn="ctr"/>
+            <a:endParaRPr lang="zh-CN" altLang="en-US"/>
+          </a:p>
+        </p:txBody>
+      </p:sp>
+      <p:sp>
+        <p:nvSpPr>
+          <p:cNvPr id="5" name="任意多边形: 形状 4">
+            <a:extLst>
+              <a:ext uri="{FF2B5EF4-FFF2-40B4-BE49-F238E27FC236}">
+                <a16:creationId xmlns:a16="http://schemas.microsoft.com/office/drawing/2014/main" id="{25DC7269-113F-D721-329A-7622D1561A7F}"/>
+              </a:ext>
+            </a:extLst>
+          </p:cNvPr>
+          <p:cNvSpPr/>
+          <p:nvPr/>
+        </p:nvSpPr>
+        <p:spPr>
+          <a:xfrm>
+            <a:off x="0" y="5171436"/>
+            <a:ext cx="1929491" cy="1686564"/>
+          </a:xfrm>
+          <a:custGeom>
+            <a:avLst/>
+            <a:gdLst>
+              <a:gd name="connsiteX0" fmla="*/ 529309 w 1929491"/>
+              <a:gd name="connsiteY0" fmla="*/ 1365 h 1686564"/>
+              <a:gd name="connsiteX1" fmla="*/ 1218759 w 1929491"/>
+              <a:gd name="connsiteY1" fmla="*/ 209235 h 1686564"/>
+              <a:gd name="connsiteX2" fmla="*/ 1915085 w 1929491"/>
+              <a:gd name="connsiteY2" fmla="*/ 1670787 h 1686564"/>
+              <a:gd name="connsiteX3" fmla="*/ 1912051 w 1929491"/>
+              <a:gd name="connsiteY3" fmla="*/ 1686564 h 1686564"/>
+              <a:gd name="connsiteX4" fmla="*/ 0 w 1929491"/>
+              <a:gd name="connsiteY4" fmla="*/ 1686564 h 1686564"/>
+              <a:gd name="connsiteX5" fmla="*/ 0 w 1929491"/>
+              <a:gd name="connsiteY5" fmla="*/ 76943 h 1686564"/>
+              <a:gd name="connsiteX6" fmla="*/ 110144 w 1929491"/>
+              <a:gd name="connsiteY6" fmla="*/ 43802 h 1686564"/>
+              <a:gd name="connsiteX7" fmla="*/ 529309 w 1929491"/>
+              <a:gd name="connsiteY7" fmla="*/ 1365 h 1686564"/>
+            </a:gdLst>
+            <a:ahLst/>
+            <a:cxnLst>
+              <a:cxn ang="0">
+                <a:pos x="connsiteX0" y="connsiteY0"/>
+              </a:cxn>
+              <a:cxn ang="0">
+                <a:pos x="connsiteX1" y="connsiteY1"/>
+              </a:cxn>
+              <a:cxn ang="0">
+                <a:pos x="connsiteX2" y="connsiteY2"/>
+              </a:cxn>
+              <a:cxn ang="0">
+                <a:pos x="connsiteX3" y="connsiteY3"/>
+              </a:cxn>
+              <a:cxn ang="0">
+                <a:pos x="connsiteX4" y="connsiteY4"/>
+              </a:cxn>
+              <a:cxn ang="0">
+                <a:pos x="connsiteX5" y="connsiteY5"/>
+              </a:cxn>
+              <a:cxn ang="0">
+                <a:pos x="connsiteX6" y="connsiteY6"/>
+              </a:cxn>
+              <a:cxn ang="0">
+                <a:pos x="connsiteX7" y="connsiteY7"/>
+              </a:cxn>
+            </a:cxnLst>
+            <a:rect l="l" t="t" r="r" b="b"/>
+            <a:pathLst>
+              <a:path w="1929491" h="1686564">
+                <a:moveTo>
+                  <a:pt x="529309" y="1365"/>
+                </a:moveTo>
+                <a:cubicBezTo>
+                  <a:pt x="765242" y="11563"/>
+                  <a:pt x="1002074" y="79103"/>
+                  <a:pt x="1218759" y="209235"/>
+                </a:cubicBezTo>
+                <a:cubicBezTo>
+                  <a:pt x="1738805" y="521553"/>
+                  <a:pt x="1995113" y="1105706"/>
+                  <a:pt x="1915085" y="1670787"/>
+                </a:cubicBezTo>
+                <a:lnTo>
+                  <a:pt x="1912051" y="1686564"/>
+                </a:lnTo>
+                <a:lnTo>
+                  <a:pt x="0" y="1686564"/>
+                </a:lnTo>
+                <a:lnTo>
+                  <a:pt x="0" y="76943"/>
+                </a:lnTo>
+                <a:lnTo>
+                  <a:pt x="110144" y="43802"/>
+                </a:lnTo>
+                <a:cubicBezTo>
+                  <a:pt x="246512" y="9769"/>
+                  <a:pt x="387749" y="-4754"/>
+                  <a:pt x="529309" y="1365"/>
+                </a:cubicBezTo>
+                <a:close/>
+              </a:path>
+            </a:pathLst>
+          </a:custGeom>
+          <a:gradFill>
+            <a:gsLst>
+              <a:gs pos="0">
+                <a:schemeClr val="accent1">
+                  <a:lumMod val="20000"/>
+                  <a:lumOff val="80000"/>
+                  <a:alpha val="90000"/>
+                </a:schemeClr>
+              </a:gs>
+              <a:gs pos="100000">
+                <a:schemeClr val="accent1">
+                  <a:lumMod val="70000"/>
+                  <a:alpha val="70000"/>
+                </a:schemeClr>
+              </a:gs>
+            </a:gsLst>
+            <a:lin ang="5400000" scaled="0"/>
+          </a:gradFill>
+          <a:ln>
+            <a:solidFill>
+              <a:srgbClr val="000000"/>
+            </a:solidFill>
+          </a:ln>
+        </p:spPr>
+        <p:style>
+          <a:lnRef idx="2">
+            <a:schemeClr val="accent1">
+              <a:shade val="15000"/>
+            </a:schemeClr>
+          </a:lnRef>
+          <a:fillRef idx="1">
+            <a:schemeClr val="accent1"/>
+          </a:fillRef>
+          <a:effectRef idx="0">
+            <a:schemeClr val="accent1"/>
+          </a:effectRef>
+          <a:fontRef idx="minor">
+            <a:schemeClr val="lt1"/>
+          </a:fontRef>
+        </p:style>
+        <p:txBody>
+          <a:bodyPr wrap="square" rtlCol="0" anchor="ctr">
+            <a:noAutofit/>
+          </a:bodyPr>
+          <a:lstStyle/>
+          <a:p>
+            <a:pPr algn="ctr"/>
+            <a:endParaRPr lang="zh-CN" altLang="en-US"/>
+          </a:p>
+        </p:txBody>
+      </p:sp>
       <p:sp>
         <p:nvSpPr>
           <p:cNvPr id="4" name="矩形 3">
             <a:extLst>
               <a:ext uri="{FF2B5EF4-FFF2-40B4-BE49-F238E27FC236}">
-                <a16:creationId xmlns:a16="http://schemas.microsoft.com/office/drawing/2014/main" id="{937D2332-3866-AE92-91D2-2399E962501D}"/>
+                <a16:creationId xmlns:a16="http://schemas.microsoft.com/office/drawing/2014/main" id="{18497136-1861-A1D5-995C-143F71B59B00}"/>
               </a:ext>
             </a:extLst>
           </p:cNvPr>
@@ -11095,20 +11914,11 @@
               <a:gs pos="0">
                 <a:srgbClr val="FF0000"/>
               </a:gs>
-              <a:gs pos="25000">
+              <a:gs pos="100000">
                 <a:srgbClr val="00FF00"/>
               </a:gs>
-              <a:gs pos="50000">
-                <a:srgbClr val="FF8080"/>
-              </a:gs>
-              <a:gs pos="75000">
-                <a:srgbClr val="FF80FF"/>
-              </a:gs>
-              <a:gs pos="100000">
-                <a:srgbClr val="80FFFF"/>
-              </a:gs>
             </a:gsLst>
-            <a:lin scaled="0" ang="0"/>
+            <a:lin scaled="0" ang="16200000"/>
           </a:gradFill>
           <a:ln>
             <a:noFill/>
@@ -11141,8 +11951,8 @@
       </p:sp>
       <p:sp>
         <p:nvSpPr>
-          <p:cNvPr id="11" name="子内容3"/>
-          <p:cNvSpPr txBox="1"/>
+          <p:cNvPr id="12" name="图片"/>
+          <p:cNvSpPr/>
           <p:nvPr>
             <p:custDataLst>
               <p:tags r:id="rId2"/>
@@ -11151,8 +11961,68 @@
         </p:nvSpPr>
         <p:spPr>
           <a:xfrm>
-            <a:off x="8276026" y="4279395"/>
-            <a:ext cx="3046727" cy="2238728"/>
+            <a:off x="0" y="3908505"/>
+            <a:ext cx="12203512" cy="2949495"/>
+          </a:xfrm>
+          <a:prstGeom prst="rect">
+            <a:avLst/>
+          </a:prstGeom>
+          <a:blipFill dpi="0" rotWithShape="0">
+            <a:blip r:embed="rId6"/>
+            <a:srcRect/>
+            <a:stretch>
+              <a:fillRect t="-156874" b="-156874"/>
+            </a:stretch>
+          </a:blipFill>
+          <a:ln>
+            <a:noFill/>
+          </a:ln>
+        </p:spPr>
+        <p:style>
+          <a:lnRef idx="2">
+            <a:schemeClr val="accent1">
+              <a:shade val="50000"/>
+            </a:schemeClr>
+          </a:lnRef>
+          <a:fillRef idx="1">
+            <a:schemeClr val="accent1"/>
+          </a:fillRef>
+          <a:effectRef idx="0">
+            <a:schemeClr val="accent1"/>
+          </a:effectRef>
+          <a:fontRef idx="minor">
+            <a:schemeClr val="lt1"/>
+          </a:fontRef>
+        </p:style>
+        <p:txBody>
+          <a:bodyPr rtlCol="0" anchor="ctr"/>
+          <a:lstStyle/>
+          <a:p>
+            <a:pPr algn="ctr"/>
+            <a:endParaRPr lang="zh-CN" altLang="en-US"/>
+          </a:p>
+        </p:txBody>
+      </p:sp>
+      <p:sp>
+        <p:nvSpPr>
+          <p:cNvPr id="2" name="标题">
+            <a:extLst>
+              <a:ext uri="{FF2B5EF4-FFF2-40B4-BE49-F238E27FC236}">
+                <a16:creationId xmlns:a16="http://schemas.microsoft.com/office/drawing/2014/main" id="{E5B56C06-2655-1113-F2B8-349BD84B478D}"/>
+              </a:ext>
+            </a:extLst>
+          </p:cNvPr>
+          <p:cNvSpPr txBox="1"/>
+          <p:nvPr>
+            <p:custDataLst>
+              <p:tags r:id="rId3"/>
+            </p:custDataLst>
+          </p:nvPr>
+        </p:nvSpPr>
+        <p:spPr>
+          <a:xfrm>
+            <a:off x="377129" y="381124"/>
+            <a:ext cx="11441213" cy="750885"/>
           </a:xfrm>
           <a:prstGeom prst="rect">
             <a:avLst/>
@@ -11160,788 +12030,12 @@
           <a:noFill/>
         </p:spPr>
         <p:txBody>
-          <a:bodyPr wrap="square" rtlCol="0">
-            <a:normAutofit fontScale="77500" lnSpcReduction="20000"/>
-          </a:bodyPr>
-          <a:lstStyle/>
-          <a:p>
-            <a:pPr algn="just" fontAlgn="auto">
-              <a:lnSpc>
-                <a:spcPct val="150000"/>
-              </a:lnSpc>
-              <a:spcBef>
-                <a:spcPts val="150"/>
-              </a:spcBef>
-              <a:spcAft>
-                <a:spcPts val="150"/>
-              </a:spcAft>
-              <a:buClrTx/>
-              <a:buSzTx/>
-              <a:buFontTx/>
-            </a:pPr>
-            <a:r>
-              <a:rPr lang="zh-CN" altLang="en-US" sz="1400">
-                <a:solidFill>
-                  <a:srgbClr val="000000"/>
-                </a:solidFill>
-                <a:latin typeface="微软雅黑" panose="020B0503020204020204" charset="-122"/>
-                <a:ea typeface="微软雅黑" panose="020B0503020204020204" charset="-122"/>
-                <a:sym typeface="+mn-ea"/>
-              </a:rPr>
-              <a:t>科技改变商业未来 </a:t>
-            </a:r>
-            <a:r>
-              <a:rPr lang="en-US" altLang="zh-CN" sz="1400">
-                <a:solidFill>
-                  <a:srgbClr val="000000"/>
-                </a:solidFill>
-                <a:latin typeface="微软雅黑" panose="020B0503020204020204" charset="-122"/>
-                <a:ea typeface="微软雅黑" panose="020B0503020204020204" charset="-122"/>
-                <a:sym typeface="+mn-ea"/>
-              </a:rPr>
-              <a:t>- </a:t>
-            </a:r>
-            <a:r>
-              <a:rPr lang="zh-CN" altLang="en-US" sz="1400">
-                <a:solidFill>
-                  <a:srgbClr val="000000"/>
-                </a:solidFill>
-                <a:latin typeface="微软雅黑" panose="020B0503020204020204" charset="-122"/>
-                <a:ea typeface="微软雅黑" panose="020B0503020204020204" charset="-122"/>
-                <a:sym typeface="+mn-ea"/>
-              </a:rPr>
-              <a:t>背景介绍
-科技对商业的影响是深远且广泛的，这种影响主要体现在以下几个方面。
-首先，科技推动了商业模式的创新。随着大数据、人工智能、云计算等技术的发展，企业可以更有效地收集和分析数据，以更好地理解客户需求，优化业务流程，提高效率。这些技术也使得企业能够更好地与消费者互动，提供个性化的产品和服务。</a:t>
-            </a:r>
-            <a:endParaRPr lang="en-ID" sz="1400" dirty="0">
-              <a:solidFill>
-                <a:schemeClr val="bg2"/>
-              </a:solidFill>
-              <a:latin typeface="微软雅黑" panose="020B0503020204020204" charset="-122"/>
-              <a:ea typeface="微软雅黑" panose="020B0503020204020204" charset="-122"/>
-              <a:cs typeface="Muli" charset="0"/>
-            </a:endParaRPr>
-          </a:p>
-        </p:txBody>
-      </p:sp>
-      <p:sp>
-        <p:nvSpPr>
-          <p:cNvPr id="8" name="子内容2"/>
-          <p:cNvSpPr txBox="1"/>
-          <p:nvPr>
-            <p:custDataLst>
-              <p:tags r:id="rId3"/>
-            </p:custDataLst>
-          </p:nvPr>
-        </p:nvSpPr>
-        <p:spPr>
-          <a:xfrm flipH="1">
-            <a:off x="4559071" y="4279395"/>
-            <a:ext cx="3046727" cy="2238728"/>
-          </a:xfrm>
-          <a:prstGeom prst="rect">
-            <a:avLst/>
-          </a:prstGeom>
-          <a:noFill/>
-        </p:spPr>
-        <p:txBody>
-          <a:bodyPr wrap="square" rtlCol="0">
-            <a:normAutofit fontScale="77500" lnSpcReduction="20000"/>
-          </a:bodyPr>
-          <a:lstStyle/>
-          <a:p>
-            <a:pPr algn="just" fontAlgn="auto">
-              <a:lnSpc>
-                <a:spcPct val="150000"/>
-              </a:lnSpc>
-              <a:spcBef>
-                <a:spcPts val="150"/>
-              </a:spcBef>
-              <a:spcAft>
-                <a:spcPts val="150"/>
-              </a:spcAft>
-              <a:buClrTx/>
-              <a:buSzTx/>
-              <a:buFontTx/>
-            </a:pPr>
-            <a:r>
-              <a:rPr lang="en-US" altLang="zh-CN" sz="1400" b="1">
-                <a:solidFill>
-                  <a:srgbClr val="000000"/>
-                </a:solidFill>
-                <a:latin typeface="微软雅黑" panose="020B0503020204020204" charset="-122"/>
-                <a:ea typeface="微软雅黑" panose="020B0503020204020204" charset="-122"/>
-                <a:sym typeface="+mn-ea"/>
-              </a:rPr>
-              <a:t>1. </a:t>
-            </a:r>
-            <a:r>
-              <a:rPr lang="zh-CN" altLang="en-US" sz="1400" b="1">
-                <a:solidFill>
-                  <a:srgbClr val="000000"/>
-                </a:solidFill>
-                <a:latin typeface="微软雅黑" panose="020B0503020204020204" charset="-122"/>
-                <a:ea typeface="微软雅黑" panose="020B0503020204020204" charset="-122"/>
-                <a:sym typeface="+mn-ea"/>
-              </a:rPr>
-              <a:t>改变商业模式：</a:t>
-            </a:r>
-            <a:r>
-              <a:rPr lang="zh-CN" altLang="en-US" sz="1400">
-                <a:solidFill>
-                  <a:srgbClr val="000000"/>
-                </a:solidFill>
-                <a:latin typeface="微软雅黑" panose="020B0503020204020204" charset="-122"/>
-                <a:ea typeface="微软雅黑" panose="020B0503020204020204" charset="-122"/>
-                <a:sym typeface="+mn-ea"/>
-              </a:rPr>
-              <a:t>随着互联网和移动设备的普及，传统的商业模式正在逐渐被电子商务、社交电商等新型商业模式所取代。
-</a:t>
-            </a:r>
-            <a:r>
-              <a:rPr lang="en-US" altLang="zh-CN" sz="1400" b="1">
-                <a:solidFill>
-                  <a:srgbClr val="000000"/>
-                </a:solidFill>
-                <a:latin typeface="微软雅黑" panose="020B0503020204020204" charset="-122"/>
-                <a:ea typeface="微软雅黑" panose="020B0503020204020204" charset="-122"/>
-                <a:sym typeface="+mn-ea"/>
-              </a:rPr>
-              <a:t>2. </a:t>
-            </a:r>
-            <a:r>
-              <a:rPr lang="zh-CN" altLang="en-US" sz="1400" b="1">
-                <a:solidFill>
-                  <a:srgbClr val="000000"/>
-                </a:solidFill>
-                <a:latin typeface="微软雅黑" panose="020B0503020204020204" charset="-122"/>
-                <a:ea typeface="微软雅黑" panose="020B0503020204020204" charset="-122"/>
-                <a:sym typeface="+mn-ea"/>
-              </a:rPr>
-              <a:t>提升竞争力：</a:t>
-            </a:r>
-            <a:r>
-              <a:rPr lang="zh-CN" altLang="en-US" sz="1400">
-                <a:solidFill>
-                  <a:srgbClr val="000000"/>
-                </a:solidFill>
-                <a:latin typeface="微软雅黑" panose="020B0503020204020204" charset="-122"/>
-                <a:ea typeface="微软雅黑" panose="020B0503020204020204" charset="-122"/>
-                <a:sym typeface="+mn-ea"/>
-              </a:rPr>
-              <a:t>科技能够提高企业的生产效率、降低成本、提升产品质量和服务水平，从而增强企业的竞争力。
-</a:t>
-            </a:r>
-            <a:r>
-              <a:rPr lang="en-US" altLang="zh-CN" sz="1400" b="1">
-                <a:solidFill>
-                  <a:srgbClr val="000000"/>
-                </a:solidFill>
-                <a:latin typeface="微软雅黑" panose="020B0503020204020204" charset="-122"/>
-                <a:ea typeface="微软雅黑" panose="020B0503020204020204" charset="-122"/>
-                <a:sym typeface="+mn-ea"/>
-              </a:rPr>
-              <a:t>3. </a:t>
-            </a:r>
-            <a:r>
-              <a:rPr lang="zh-CN" altLang="en-US" sz="1400" b="1">
-                <a:solidFill>
-                  <a:srgbClr val="000000"/>
-                </a:solidFill>
-                <a:latin typeface="微软雅黑" panose="020B0503020204020204" charset="-122"/>
-                <a:ea typeface="微软雅黑" panose="020B0503020204020204" charset="-122"/>
-                <a:sym typeface="+mn-ea"/>
-              </a:rPr>
-              <a:t>拓展市场：</a:t>
-            </a:r>
-            <a:r>
-              <a:rPr lang="zh-CN" altLang="en-US" sz="1400">
-                <a:solidFill>
-                  <a:srgbClr val="000000"/>
-                </a:solidFill>
-                <a:latin typeface="微软雅黑" panose="020B0503020204020204" charset="-122"/>
-                <a:ea typeface="微软雅黑" panose="020B0503020204020204" charset="-122"/>
-                <a:sym typeface="+mn-ea"/>
-              </a:rPr>
-              <a:t>科技能够打破地域限制，使企业能够更广泛地接触和吸引潜在客户，扩大市场份额。</a:t>
-            </a:r>
-            <a:endParaRPr lang="en-ID" sz="1400" dirty="0">
-              <a:solidFill>
-                <a:schemeClr val="bg2"/>
-              </a:solidFill>
-              <a:latin typeface="微软雅黑" panose="020B0503020204020204" charset="-122"/>
-              <a:ea typeface="微软雅黑" panose="020B0503020204020204" charset="-122"/>
-              <a:cs typeface="Muli" charset="0"/>
-            </a:endParaRPr>
-          </a:p>
-        </p:txBody>
-      </p:sp>
-      <p:sp>
-        <p:nvSpPr>
-          <p:cNvPr id="16" name="子内容1"/>
-          <p:cNvSpPr txBox="1"/>
-          <p:nvPr>
-            <p:custDataLst>
-              <p:tags r:id="rId4"/>
-            </p:custDataLst>
-          </p:nvPr>
-        </p:nvSpPr>
-        <p:spPr>
-          <a:xfrm>
-            <a:off x="842116" y="4279395"/>
-            <a:ext cx="3046727" cy="2238728"/>
-          </a:xfrm>
-          <a:prstGeom prst="rect">
-            <a:avLst/>
-          </a:prstGeom>
-          <a:noFill/>
-        </p:spPr>
-        <p:txBody>
-          <a:bodyPr wrap="square" rtlCol="0">
-            <a:normAutofit fontScale="77500" lnSpcReduction="20000"/>
-          </a:bodyPr>
-          <a:lstStyle/>
-          <a:p>
-            <a:pPr algn="just" fontAlgn="auto">
-              <a:lnSpc>
-                <a:spcPct val="150000"/>
-              </a:lnSpc>
-              <a:spcBef>
-                <a:spcPts val="150"/>
-              </a:spcBef>
-              <a:spcAft>
-                <a:spcPts val="150"/>
-              </a:spcAft>
-              <a:buClrTx/>
-              <a:buSzTx/>
-              <a:buFontTx/>
-            </a:pPr>
-            <a:r>
-              <a:rPr lang="zh-CN" altLang="en-US" sz="1400">
-                <a:solidFill>
-                  <a:srgbClr val="000000"/>
-                </a:solidFill>
-                <a:latin typeface="微软雅黑" panose="020B0503020204020204" charset="-122"/>
-                <a:ea typeface="微软雅黑" panose="020B0503020204020204" charset="-122"/>
-                <a:sym typeface="+mn-ea"/>
-              </a:rPr>
-              <a:t>科技是指通过使用各种工具、设备、软件等手段来提高生产效率、降低成本、优化产品和服务的过程。在商业领域，科技的重要性主要体现在以下几个方面：
-</a:t>
-            </a:r>
-            <a:r>
-              <a:rPr lang="en-US" altLang="zh-CN" sz="1400" b="1">
-                <a:solidFill>
-                  <a:srgbClr val="000000"/>
-                </a:solidFill>
-                <a:latin typeface="微软雅黑" panose="020B0503020204020204" charset="-122"/>
-                <a:ea typeface="微软雅黑" panose="020B0503020204020204" charset="-122"/>
-                <a:sym typeface="+mn-ea"/>
-              </a:rPr>
-              <a:t>1. </a:t>
-            </a:r>
-            <a:r>
-              <a:rPr lang="zh-CN" altLang="en-US" sz="1400" b="1">
-                <a:solidFill>
-                  <a:srgbClr val="000000"/>
-                </a:solidFill>
-                <a:latin typeface="微软雅黑" panose="020B0503020204020204" charset="-122"/>
-                <a:ea typeface="微软雅黑" panose="020B0503020204020204" charset="-122"/>
-                <a:sym typeface="+mn-ea"/>
-              </a:rPr>
-              <a:t>提高生产效率：</a:t>
-            </a:r>
-            <a:r>
-              <a:rPr lang="zh-CN" altLang="en-US" sz="1400">
-                <a:solidFill>
-                  <a:srgbClr val="000000"/>
-                </a:solidFill>
-                <a:latin typeface="微软雅黑" panose="020B0503020204020204" charset="-122"/>
-                <a:ea typeface="微软雅黑" panose="020B0503020204020204" charset="-122"/>
-                <a:sym typeface="+mn-ea"/>
-              </a:rPr>
-              <a:t>科技能够使生产流程更加自动化和智能化，减少人工干预，降低人力成本。
-</a:t>
-            </a:r>
-            <a:r>
-              <a:rPr lang="en-US" altLang="zh-CN" sz="1400" b="1">
-                <a:solidFill>
-                  <a:srgbClr val="000000"/>
-                </a:solidFill>
-                <a:latin typeface="微软雅黑" panose="020B0503020204020204" charset="-122"/>
-                <a:ea typeface="微软雅黑" panose="020B0503020204020204" charset="-122"/>
-                <a:sym typeface="+mn-ea"/>
-              </a:rPr>
-              <a:t>2. </a:t>
-            </a:r>
-            <a:r>
-              <a:rPr lang="zh-CN" altLang="en-US" sz="1400" b="1">
-                <a:solidFill>
-                  <a:srgbClr val="000000"/>
-                </a:solidFill>
-                <a:latin typeface="微软雅黑" panose="020B0503020204020204" charset="-122"/>
-                <a:ea typeface="微软雅黑" panose="020B0503020204020204" charset="-122"/>
-                <a:sym typeface="+mn-ea"/>
-              </a:rPr>
-              <a:t>提升用户体验：</a:t>
-            </a:r>
-            <a:r>
-              <a:rPr lang="zh-CN" altLang="en-US" sz="1400">
-                <a:solidFill>
-                  <a:srgbClr val="000000"/>
-                </a:solidFill>
-                <a:latin typeface="微软雅黑" panose="020B0503020204020204" charset="-122"/>
-                <a:ea typeface="微软雅黑" panose="020B0503020204020204" charset="-122"/>
-                <a:sym typeface="+mn-ea"/>
-              </a:rPr>
-              <a:t>通过技术创新，可以为用户提供更加便捷、个性化的产品和服务，提升客户满意度。</a:t>
-            </a:r>
-            <a:endParaRPr lang="en-ID" sz="1400" dirty="0">
-              <a:solidFill>
-                <a:schemeClr val="bg2"/>
-              </a:solidFill>
-              <a:latin typeface="微软雅黑" panose="020B0503020204020204" charset="-122"/>
-              <a:ea typeface="微软雅黑" panose="020B0503020204020204" charset="-122"/>
-              <a:cs typeface="Muli" charset="0"/>
-            </a:endParaRPr>
-          </a:p>
-        </p:txBody>
-      </p:sp>
-      <p:sp>
-        <p:nvSpPr>
-          <p:cNvPr id="10" name="子标题3"/>
-          <p:cNvSpPr txBox="1"/>
-          <p:nvPr>
-            <p:custDataLst>
-              <p:tags r:id="rId5"/>
-            </p:custDataLst>
-          </p:nvPr>
-        </p:nvSpPr>
-        <p:spPr>
-          <a:xfrm>
-            <a:off x="8276026" y="3786000"/>
-            <a:ext cx="3046726" cy="355600"/>
-          </a:xfrm>
-          <a:prstGeom prst="rect">
-            <a:avLst/>
-          </a:prstGeom>
-          <a:noFill/>
-        </p:spPr>
-        <p:txBody>
-          <a:bodyPr wrap="square" rtlCol="0" anchor="ctr" anchorCtr="0">
-            <a:normAutofit lnSpcReduction="10000"/>
-          </a:bodyPr>
-          <a:lstStyle/>
-          <a:p>
-            <a:pPr algn="ctr" fontAlgn="auto">
-              <a:lnSpc>
-                <a:spcPct val="100000"/>
-              </a:lnSpc>
-            </a:pPr>
-            <a:r>
-              <a:rPr lang="zh-CN" altLang="en-US" b="1">
-                <a:solidFill>
-                  <a:srgbClr val="000000"/>
-                </a:solidFill>
-                <a:latin typeface="微软雅黑" panose="020B0503020204020204" charset="-122"/>
-                <a:ea typeface="微软雅黑" panose="020B0503020204020204" charset="-122"/>
-                <a:sym typeface="+mn-ea"/>
-              </a:rPr>
-              <a:t>科技改变商业未来</a:t>
-            </a:r>
-            <a:endParaRPr lang="en-US" b="1" dirty="0">
-              <a:latin typeface="微软雅黑" panose="020B0503020204020204" charset="-122"/>
-              <a:ea typeface="微软雅黑" panose="020B0503020204020204" charset="-122"/>
-              <a:cs typeface="Poppins" pitchFamily="2" charset="0"/>
-              <a:sym typeface="+mn-ea"/>
-            </a:endParaRPr>
-          </a:p>
-        </p:txBody>
-      </p:sp>
-      <p:sp>
-        <p:nvSpPr>
-          <p:cNvPr id="5" name="子标题2"/>
-          <p:cNvSpPr txBox="1"/>
-          <p:nvPr>
-            <p:custDataLst>
-              <p:tags r:id="rId6"/>
-            </p:custDataLst>
-          </p:nvPr>
-        </p:nvSpPr>
-        <p:spPr>
-          <a:xfrm>
-            <a:off x="4559071" y="3786000"/>
-            <a:ext cx="3046727" cy="355600"/>
-          </a:xfrm>
-          <a:prstGeom prst="rect">
-            <a:avLst/>
-          </a:prstGeom>
-          <a:noFill/>
-        </p:spPr>
-        <p:txBody>
-          <a:bodyPr wrap="square" rtlCol="0" anchor="ctr" anchorCtr="0">
-            <a:normAutofit lnSpcReduction="10000"/>
-          </a:bodyPr>
-          <a:lstStyle/>
-          <a:p>
-            <a:pPr algn="ctr" fontAlgn="auto">
-              <a:lnSpc>
-                <a:spcPct val="100000"/>
-              </a:lnSpc>
-            </a:pPr>
-            <a:r>
-              <a:rPr lang="zh-CN" altLang="en-US" b="1">
-                <a:solidFill>
-                  <a:srgbClr val="000000"/>
-                </a:solidFill>
-                <a:latin typeface="微软雅黑" panose="020B0503020204020204" charset="-122"/>
-                <a:ea typeface="微软雅黑" panose="020B0503020204020204" charset="-122"/>
-                <a:sym typeface="+mn-ea"/>
-              </a:rPr>
-              <a:t>科技对商业的影响</a:t>
-            </a:r>
-            <a:endParaRPr lang="en-US" b="1" dirty="0">
-              <a:latin typeface="微软雅黑" panose="020B0503020204020204" charset="-122"/>
-              <a:ea typeface="微软雅黑" panose="020B0503020204020204" charset="-122"/>
-              <a:cs typeface="Poppins" pitchFamily="2" charset="0"/>
-              <a:sym typeface="+mn-ea"/>
-            </a:endParaRPr>
-          </a:p>
-        </p:txBody>
-      </p:sp>
-      <p:sp>
-        <p:nvSpPr>
-          <p:cNvPr id="13" name="子标题1"/>
-          <p:cNvSpPr txBox="1"/>
-          <p:nvPr>
-            <p:custDataLst>
-              <p:tags r:id="rId7"/>
-            </p:custDataLst>
-          </p:nvPr>
-        </p:nvSpPr>
-        <p:spPr>
-          <a:xfrm>
-            <a:off x="842115" y="3786000"/>
-            <a:ext cx="3046728" cy="355600"/>
-          </a:xfrm>
-          <a:prstGeom prst="rect">
-            <a:avLst/>
-          </a:prstGeom>
-          <a:noFill/>
-        </p:spPr>
-        <p:txBody>
-          <a:bodyPr wrap="square" rtlCol="0" anchor="ctr" anchorCtr="0">
-            <a:normAutofit lnSpcReduction="10000"/>
-          </a:bodyPr>
-          <a:lstStyle/>
-          <a:p>
-            <a:pPr algn="ctr" fontAlgn="auto">
-              <a:lnSpc>
-                <a:spcPct val="100000"/>
-              </a:lnSpc>
-            </a:pPr>
-            <a:r>
-              <a:rPr lang="zh-CN" altLang="en-US" b="1">
-                <a:solidFill>
-                  <a:srgbClr val="000000"/>
-                </a:solidFill>
-                <a:latin typeface="微软雅黑" panose="020B0503020204020204" charset="-122"/>
-                <a:ea typeface="微软雅黑" panose="020B0503020204020204" charset="-122"/>
-                <a:sym typeface="+mn-ea"/>
-              </a:rPr>
-              <a:t>科技的定义和重要性</a:t>
-            </a:r>
-            <a:endParaRPr lang="en-US" b="1" dirty="0">
-              <a:latin typeface="微软雅黑" panose="020B0503020204020204" charset="-122"/>
-              <a:ea typeface="微软雅黑" panose="020B0503020204020204" charset="-122"/>
-              <a:cs typeface="Poppins" pitchFamily="2" charset="0"/>
-              <a:sym typeface="+mn-ea"/>
-            </a:endParaRPr>
-          </a:p>
-        </p:txBody>
-      </p:sp>
-      <p:sp>
-        <p:nvSpPr>
-          <p:cNvPr id="21" name="子图片3"/>
-          <p:cNvSpPr/>
-          <p:nvPr>
-            <p:custDataLst>
-              <p:tags r:id="rId8"/>
-            </p:custDataLst>
-          </p:nvPr>
-        </p:nvSpPr>
-        <p:spPr>
-          <a:xfrm>
-            <a:off x="8276026" y="1595025"/>
-            <a:ext cx="3046728" cy="1835331"/>
-          </a:xfrm>
-          <a:prstGeom prst="roundRect">
-            <a:avLst>
-              <a:gd name="adj" fmla="val 11946"/>
-            </a:avLst>
-          </a:prstGeom>
-          <a:gradFill rotWithShape="1">
-            <a:gsLst>
-              <a:gs pos="0">
-                <a:srgbClr val="FF0000"/>
-              </a:gs>
-              <a:gs pos="25000">
-                <a:srgbClr val="00FF00"/>
-              </a:gs>
-              <a:gs pos="50000">
-                <a:srgbClr val="FF8080"/>
-              </a:gs>
-              <a:gs pos="75000">
-                <a:srgbClr val="FF80FF"/>
-              </a:gs>
-              <a:gs pos="100000">
-                <a:srgbClr val="80FFFF"/>
-              </a:gs>
-            </a:gsLst>
-            <a:lin scaled="0" ang="0"/>
-          </a:gradFill>
-          <a:ln w="38100" cap="flat" cmpd="sng" algn="ctr">
-            <a:noFill/>
-            <a:prstDash val="solid"/>
-            <a:round/>
-          </a:ln>
-          <a:effectLst/>
-        </p:spPr>
-        <p:txBody>
-          <a:bodyPr rot="0" spcFirstLastPara="0" vert="horz" wrap="square" lIns="91440" tIns="45720" rIns="91440" bIns="45720" numCol="1" spcCol="0" rtlCol="0" fromWordArt="0" anchor="ctr" anchorCtr="0" forceAA="0" compatLnSpc="1">
-            <a:noAutofit/>
-          </a:bodyPr>
-          <a:lstStyle/>
-          <a:p>
-            <a:pPr marL="0" marR="0" lvl="0" indent="0" algn="ctr" defTabSz="914400" rtl="0" eaLnBrk="1" fontAlgn="auto" latinLnBrk="0" hangingPunct="1">
-              <a:lnSpc>
-                <a:spcPct val="100000"/>
-              </a:lnSpc>
-              <a:spcBef>
-                <a:spcPts val="0"/>
-              </a:spcBef>
-              <a:spcAft>
-                <a:spcPts val="0"/>
-              </a:spcAft>
-              <a:buClrTx/>
-              <a:buSzTx/>
-              <a:buFontTx/>
-              <a:buNone/>
-              <a:defRPr/>
-            </a:pPr>
-            <a:endParaRPr kumimoji="0" lang="zh-CN" altLang="en-US" sz="1600" b="1" i="1" u="none" strike="noStrike" kern="0" cap="none" spc="0" normalizeH="0" baseline="0" noProof="0">
-              <a:ln>
-                <a:noFill/>
-              </a:ln>
-              <a:solidFill>
-                <a:prstClr val="black"/>
-              </a:solidFill>
-              <a:effectLst/>
-              <a:uLnTx/>
-              <a:uFillTx/>
-            </a:endParaRPr>
-          </a:p>
-        </p:txBody>
-      </p:sp>
-      <p:sp>
-        <p:nvSpPr>
-          <p:cNvPr id="20" name="子图片2"/>
-          <p:cNvSpPr/>
-          <p:nvPr>
-            <p:custDataLst>
-              <p:tags r:id="rId9"/>
-            </p:custDataLst>
-          </p:nvPr>
-        </p:nvSpPr>
-        <p:spPr>
-          <a:xfrm>
-            <a:off x="4559072" y="1595025"/>
-            <a:ext cx="3046728" cy="1835331"/>
-          </a:xfrm>
-          <a:prstGeom prst="roundRect">
-            <a:avLst>
-              <a:gd name="adj" fmla="val 10373"/>
-            </a:avLst>
-          </a:prstGeom>
-          <a:gradFill rotWithShape="1">
-            <a:gsLst>
-              <a:gs pos="0">
-                <a:srgbClr val="FF0000"/>
-              </a:gs>
-              <a:gs pos="25000">
-                <a:srgbClr val="00FF00"/>
-              </a:gs>
-              <a:gs pos="50000">
-                <a:srgbClr val="FF8080"/>
-              </a:gs>
-              <a:gs pos="75000">
-                <a:srgbClr val="FF80FF"/>
-              </a:gs>
-              <a:gs pos="100000">
-                <a:srgbClr val="80FFFF"/>
-              </a:gs>
-            </a:gsLst>
-            <a:lin scaled="0" ang="0"/>
-          </a:gradFill>
-          <a:ln w="38100" cap="flat" cmpd="sng" algn="ctr">
-            <a:noFill/>
-            <a:prstDash val="solid"/>
-            <a:round/>
-          </a:ln>
-          <a:effectLst/>
-        </p:spPr>
-        <p:txBody>
-          <a:bodyPr rot="0" spcFirstLastPara="0" vert="horz" wrap="square" lIns="91440" tIns="45720" rIns="91440" bIns="45720" numCol="1" spcCol="0" rtlCol="0" fromWordArt="0" anchor="ctr" anchorCtr="0" forceAA="0" compatLnSpc="1">
-            <a:noAutofit/>
-          </a:bodyPr>
-          <a:lstStyle/>
-          <a:p>
-            <a:pPr marL="0" marR="0" lvl="0" indent="0" algn="ctr" defTabSz="914400" rtl="0" eaLnBrk="1" fontAlgn="auto" latinLnBrk="0" hangingPunct="1">
-              <a:lnSpc>
-                <a:spcPct val="100000"/>
-              </a:lnSpc>
-              <a:spcBef>
-                <a:spcPts val="0"/>
-              </a:spcBef>
-              <a:spcAft>
-                <a:spcPts val="0"/>
-              </a:spcAft>
-              <a:buClrTx/>
-              <a:buSzTx/>
-              <a:buFontTx/>
-              <a:buNone/>
-              <a:defRPr/>
-            </a:pPr>
-            <a:endParaRPr kumimoji="0" lang="zh-CN" altLang="en-US" sz="1600" b="1" i="1" u="none" strike="noStrike" kern="0" cap="none" spc="0" normalizeH="0" baseline="0" noProof="0">
-              <a:ln>
-                <a:noFill/>
-              </a:ln>
-              <a:solidFill>
-                <a:prstClr val="black"/>
-              </a:solidFill>
-              <a:effectLst/>
-              <a:uLnTx/>
-              <a:uFillTx/>
-            </a:endParaRPr>
-          </a:p>
-        </p:txBody>
-      </p:sp>
-      <p:sp>
-        <p:nvSpPr>
-          <p:cNvPr id="2" name="子图片1"/>
-          <p:cNvSpPr/>
-          <p:nvPr>
-            <p:custDataLst>
-              <p:tags r:id="rId10"/>
-            </p:custDataLst>
-          </p:nvPr>
-        </p:nvSpPr>
-        <p:spPr>
-          <a:xfrm>
-            <a:off x="842117" y="1595025"/>
-            <a:ext cx="3046728" cy="1835331"/>
-          </a:xfrm>
-          <a:prstGeom prst="roundRect">
-            <a:avLst>
-              <a:gd name="adj" fmla="val 9848"/>
-            </a:avLst>
-          </a:prstGeom>
-          <a:gradFill rotWithShape="1">
-            <a:gsLst>
-              <a:gs pos="0">
-                <a:srgbClr val="FF0000"/>
-              </a:gs>
-              <a:gs pos="25000">
-                <a:srgbClr val="00FF00"/>
-              </a:gs>
-              <a:gs pos="50000">
-                <a:srgbClr val="FF8080"/>
-              </a:gs>
-              <a:gs pos="75000">
-                <a:srgbClr val="FF80FF"/>
-              </a:gs>
-              <a:gs pos="100000">
-                <a:srgbClr val="80FFFF"/>
-              </a:gs>
-            </a:gsLst>
-            <a:lin scaled="0" ang="0"/>
-          </a:gradFill>
-          <a:ln w="38100" cap="flat" cmpd="sng" algn="ctr">
-            <a:noFill/>
-            <a:prstDash val="solid"/>
-            <a:round/>
-          </a:ln>
-          <a:effectLst/>
-        </p:spPr>
-        <p:txBody>
-          <a:bodyPr rot="0" spcFirstLastPara="0" vert="horz" wrap="square" lIns="91440" tIns="45720" rIns="91440" bIns="45720" numCol="1" spcCol="0" rtlCol="0" fromWordArt="0" anchor="ctr" anchorCtr="0" forceAA="0" compatLnSpc="1">
-            <a:noAutofit/>
-          </a:bodyPr>
-          <a:lstStyle/>
-          <a:p>
-            <a:pPr marL="0" marR="0" lvl="0" indent="0" algn="ctr" defTabSz="914400" rtl="0" eaLnBrk="1" fontAlgn="auto" latinLnBrk="0" hangingPunct="1">
-              <a:lnSpc>
-                <a:spcPct val="100000"/>
-              </a:lnSpc>
-              <a:spcBef>
-                <a:spcPts val="0"/>
-              </a:spcBef>
-              <a:spcAft>
-                <a:spcPts val="0"/>
-              </a:spcAft>
-              <a:buClrTx/>
-              <a:buSzTx/>
-              <a:buFontTx/>
-              <a:buNone/>
-              <a:defRPr/>
-            </a:pPr>
-            <a:endParaRPr kumimoji="0" lang="zh-CN" altLang="en-US" sz="1600" b="1" i="1" u="none" strike="noStrike" kern="0" cap="none" spc="0" normalizeH="0" baseline="0" noProof="0">
-              <a:ln>
-                <a:noFill/>
-              </a:ln>
-              <a:solidFill>
-                <a:prstClr val="black"/>
-              </a:solidFill>
-              <a:effectLst/>
-              <a:uLnTx/>
-              <a:uFillTx/>
-            </a:endParaRPr>
-          </a:p>
-        </p:txBody>
-      </p:sp>
-      <p:sp>
-        <p:nvSpPr>
-          <p:cNvPr id="3" name="标题">
-            <a:extLst>
-              <a:ext uri="{FF2B5EF4-FFF2-40B4-BE49-F238E27FC236}">
-                <a16:creationId xmlns:a16="http://schemas.microsoft.com/office/drawing/2014/main" id="{8ED13B76-66BE-841C-C04D-A84E397EB287}"/>
-              </a:ext>
-            </a:extLst>
-          </p:cNvPr>
-          <p:cNvSpPr txBox="1"/>
-          <p:nvPr>
-            <p:custDataLst>
-              <p:tags r:id="rId11"/>
-            </p:custDataLst>
-          </p:nvPr>
-        </p:nvSpPr>
-        <p:spPr>
-          <a:xfrm>
-            <a:off x="347808" y="339877"/>
-            <a:ext cx="11496384" cy="720348"/>
-          </a:xfrm>
-          <a:prstGeom prst="rect">
-            <a:avLst/>
-          </a:prstGeom>
-          <a:noFill/>
-        </p:spPr>
-        <p:txBody>
-          <a:bodyPr wrap="square" rtlCol="0" anchor="ctr" anchorCtr="0">
+          <a:bodyPr wrap="square" rtlCol="0" anchor="b" anchorCtr="0">
             <a:normAutofit/>
           </a:bodyPr>
           <a:lstStyle/>
           <a:p>
-            <a:pPr marL="0" marR="0" lvl="0" defTabSz="914400" rtl="0" eaLnBrk="1" fontAlgn="auto" latinLnBrk="0" hangingPunct="1">
+            <a:pPr marL="0" marR="0" lvl="0" algn="l" defTabSz="914400" rtl="0" eaLnBrk="1" fontAlgn="auto" latinLnBrk="0" hangingPunct="1">
               <a:lnSpc>
                 <a:spcPct val="120000"/>
               </a:lnSpc>
@@ -11973,48 +12067,422 @@
                 <a:cs typeface="微软雅黑" panose="020B0503020204020204" charset="-122"/>
                 <a:sym typeface="思源黑体 CN" panose="020B0500000000000000" pitchFamily="34" charset="-122"/>
               </a:rPr>
-              <a:t>科技对商业的影响 </a:t>
-            </a:r>
-            <a:r>
-              <a:rPr lang="en-US" altLang="zh-CN" sz="3200" b="1" noProof="0">
+              <a:t>科技发展现状大纲</a:t>
+            </a:r>
+            <a:endParaRPr lang="zh-CN" altLang="en-US" sz="3200" b="1" dirty="0">
+              <a:latin typeface="+mj-ea"/>
+              <a:ea typeface="+mj-ea"/>
+              <a:cs typeface="微软雅黑" panose="020B0503020204020204" charset="-122"/>
+              <a:sym typeface="思源黑体 CN" panose="020B0500000000000000" pitchFamily="34" charset="-122"/>
+            </a:endParaRPr>
+          </a:p>
+        </p:txBody>
+      </p:sp>
+      <p:sp>
+        <p:nvSpPr>
+          <p:cNvPr id="3" name="内容">
+            <a:extLst>
+              <a:ext uri="{FF2B5EF4-FFF2-40B4-BE49-F238E27FC236}">
+                <a16:creationId xmlns:a16="http://schemas.microsoft.com/office/drawing/2014/main" id="{4F81AFAB-C7AE-FA9E-D0F4-E661252501B9}"/>
+              </a:ext>
+            </a:extLst>
+          </p:cNvPr>
+          <p:cNvSpPr txBox="1"/>
+          <p:nvPr>
+            <p:custDataLst>
+              <p:tags r:id="rId4"/>
+            </p:custDataLst>
+          </p:nvPr>
+        </p:nvSpPr>
+        <p:spPr>
+          <a:xfrm>
+            <a:off x="397273" y="1275997"/>
+            <a:ext cx="11420479" cy="1586047"/>
+          </a:xfrm>
+          <a:prstGeom prst="rect">
+            <a:avLst/>
+          </a:prstGeom>
+          <a:noFill/>
+          <a:ln>
+            <a:noFill/>
+          </a:ln>
+        </p:spPr>
+        <p:txBody>
+          <a:bodyPr spcFirstLastPara="1" wrap="square" lIns="60950" tIns="30466" rIns="60950" bIns="30466" anchor="t" anchorCtr="0">
+            <a:normAutofit/>
+          </a:bodyPr>
+          <a:lstStyle/>
+          <a:p>
+            <a:pPr marL="228600" marR="0" lvl="0" indent="-228600" algn="just" defTabSz="914400" rtl="0" eaLnBrk="1" fontAlgn="ctr" latinLnBrk="0" hangingPunct="1">
+              <a:lnSpc>
+                <a:spcPct val="130000"/>
+              </a:lnSpc>
+              <a:spcBef>
+                <a:spcPts val="750"/>
+              </a:spcBef>
+              <a:spcAft>
+                <a:spcPts val="250"/>
+              </a:spcAft>
+              <a:buClrTx/>
+              <a:buSzTx/>
+              <a:buFontTx/>
+              <a:buAutoNum type="arabicPeriod"/>
+              <a:defRPr/>
+            </a:pPr>
+            <a:r>
+              <a:rPr kumimoji="0" lang="zh-CN" altLang="en-US" sz="1200" b="1" i="0" u="none" strike="noStrike" kern="1200" cap="none" spc="0" normalizeH="0" baseline="0" noProof="0" dirty="0">
                 <a:ln>
                   <a:noFill/>
                 </a:ln>
                 <a:solidFill>
-                  <a:srgbClr val="000000"/>
+                  <a:srgbClr val="00BCA7"/>
                 </a:solidFill>
                 <a:effectLst/>
                 <a:uLnTx/>
                 <a:uFillTx/>
                 <a:latin typeface="+mj-ea"/>
                 <a:ea typeface="+mj-ea"/>
-                <a:cs typeface="微软雅黑" panose="020B0503020204020204" charset="-122"/>
+                <a:cs typeface="+mn-ea"/>
                 <a:sym typeface="思源黑体 CN" panose="020B0500000000000000" pitchFamily="34" charset="-122"/>
               </a:rPr>
-              <a:t>- </a:t>
-            </a:r>
-            <a:r>
-              <a:rPr lang="zh-CN" altLang="en-US" sz="3200" b="1" noProof="0">
+              <a:t>人工智能</a:t>
+            </a:r>
+            <a:r>
+              <a:rPr kumimoji="0" lang="zh-CN" altLang="en-US" sz="1200" i="0" u="none" strike="noStrike" kern="1200" cap="none" spc="0" normalizeH="0" baseline="0" noProof="0" dirty="0">
                 <a:ln>
                   <a:noFill/>
                 </a:ln>
                 <a:solidFill>
-                  <a:srgbClr val="000000"/>
+                  <a:srgbClr val="00584E"/>
                 </a:solidFill>
                 <a:effectLst/>
                 <a:uLnTx/>
                 <a:uFillTx/>
                 <a:latin typeface="+mj-ea"/>
                 <a:ea typeface="+mj-ea"/>
-                <a:cs typeface="微软雅黑" panose="020B0503020204020204" charset="-122"/>
+                <a:cs typeface="+mn-ea"/>
                 <a:sym typeface="思源黑体 CN" panose="020B0500000000000000" pitchFamily="34" charset="-122"/>
               </a:rPr>
-              <a:t>背景介绍</a:t>
-            </a:r>
-            <a:endParaRPr lang="zh-CN" altLang="en-US" sz="3200" b="1" dirty="0">
+              <a:t>：</a:t>
+            </a:r>
+            <a:r>
+              <a:rPr kumimoji="0" lang="en-US" altLang="zh-CN" sz="1200" i="0" u="none" strike="noStrike" kern="1200" cap="none" spc="0" normalizeH="0" baseline="0" noProof="0" dirty="0">
+                <a:ln>
+                  <a:noFill/>
+                </a:ln>
+                <a:solidFill>
+                  <a:srgbClr val="00584E"/>
+                </a:solidFill>
+                <a:effectLst/>
+                <a:uLnTx/>
+                <a:uFillTx/>
+                <a:latin typeface="+mj-ea"/>
+                <a:ea typeface="+mj-ea"/>
+                <a:cs typeface="+mn-ea"/>
+                <a:sym typeface="思源黑体 CN" panose="020B0500000000000000" pitchFamily="34" charset="-122"/>
+              </a:rPr>
+              <a:t>AI</a:t>
+            </a:r>
+            <a:r>
+              <a:rPr kumimoji="0" lang="zh-CN" altLang="en-US" sz="1200" i="0" u="none" strike="noStrike" kern="1200" cap="none" spc="0" normalizeH="0" baseline="0" noProof="0" dirty="0">
+                <a:ln>
+                  <a:noFill/>
+                </a:ln>
+                <a:solidFill>
+                  <a:srgbClr val="00584E"/>
+                </a:solidFill>
+                <a:effectLst/>
+                <a:uLnTx/>
+                <a:uFillTx/>
+                <a:latin typeface="+mj-ea"/>
+                <a:ea typeface="+mj-ea"/>
+                <a:cs typeface="+mn-ea"/>
+                <a:sym typeface="思源黑体 CN" panose="020B0500000000000000" pitchFamily="34" charset="-122"/>
+              </a:rPr>
+              <a:t>在商业中的应用越来越广泛，如自然语言处理、计算机视觉、深度学习等。</a:t>
+            </a:r>
+            <a:r>
+              <a:rPr kumimoji="0" lang="en-US" altLang="zh-CN" sz="1200" i="0" u="none" strike="noStrike" kern="1200" cap="none" spc="0" normalizeH="0" baseline="0" noProof="0" dirty="0">
+                <a:ln>
+                  <a:noFill/>
+                </a:ln>
+                <a:solidFill>
+                  <a:srgbClr val="00584E"/>
+                </a:solidFill>
+                <a:effectLst/>
+                <a:uLnTx/>
+                <a:uFillTx/>
+                <a:latin typeface="+mj-ea"/>
+                <a:ea typeface="+mj-ea"/>
+                <a:cs typeface="+mn-ea"/>
+                <a:sym typeface="思源黑体 CN" panose="020B0500000000000000" pitchFamily="34" charset="-122"/>
+              </a:rPr>
+              <a:t>AI</a:t>
+            </a:r>
+            <a:r>
+              <a:rPr kumimoji="0" lang="zh-CN" altLang="en-US" sz="1200" i="0" u="none" strike="noStrike" kern="1200" cap="none" spc="0" normalizeH="0" baseline="0" noProof="0" dirty="0">
+                <a:ln>
+                  <a:noFill/>
+                </a:ln>
+                <a:solidFill>
+                  <a:srgbClr val="00584E"/>
+                </a:solidFill>
+                <a:effectLst/>
+                <a:uLnTx/>
+                <a:uFillTx/>
+                <a:latin typeface="+mj-ea"/>
+                <a:ea typeface="+mj-ea"/>
+                <a:cs typeface="+mn-ea"/>
+                <a:sym typeface="思源黑体 CN" panose="020B0500000000000000" pitchFamily="34" charset="-122"/>
+              </a:rPr>
+              <a:t>技术在语音识别、智能客服、自动驾驶等领域有显著应用。</a:t>
+            </a:r>
+            <a:r>
+              <a:rPr kumimoji="0" lang="zh-CN" altLang="en-US" sz="1200" b="0" i="0" u="none" strike="noStrike" kern="1200" cap="none" spc="0" normalizeH="0" baseline="0" noProof="0" dirty="0">
+                <a:ln>
+                  <a:noFill/>
+                </a:ln>
+                <a:solidFill>
+                  <a:srgbClr val="00584E"/>
+                </a:solidFill>
+                <a:effectLst/>
+                <a:uLnTx/>
+                <a:uFillTx/>
+                <a:latin typeface="+mj-ea"/>
+                <a:ea typeface="+mj-ea"/>
+                <a:cs typeface="+mn-ea"/>
+                <a:sym typeface="思源黑体 CN" panose="020B0500000000000000" pitchFamily="34" charset="-122"/>
+              </a:rPr>
+              <a:t>
+</a:t>
+            </a:r>
+            <a:r>
+              <a:rPr kumimoji="0" lang="en-US" altLang="zh-CN" sz="1200" b="1" i="0" u="none" strike="noStrike" kern="1200" cap="none" spc="0" normalizeH="0" baseline="0" noProof="0" dirty="0">
+                <a:ln>
+                  <a:noFill/>
+                </a:ln>
+                <a:solidFill>
+                  <a:srgbClr val="00BCA7"/>
+                </a:solidFill>
+                <a:effectLst/>
+                <a:uLnTx/>
+                <a:uFillTx/>
+                <a:latin typeface="+mj-ea"/>
+                <a:ea typeface="+mj-ea"/>
+                <a:cs typeface="+mn-ea"/>
+                <a:sym typeface="思源黑体 CN" panose="020B0500000000000000" pitchFamily="34" charset="-122"/>
+              </a:rPr>
+              <a:t>2. </a:t>
+            </a:r>
+            <a:r>
+              <a:rPr kumimoji="0" lang="zh-CN" altLang="en-US" sz="1200" b="1" i="0" u="none" strike="noStrike" kern="1200" cap="none" spc="0" normalizeH="0" baseline="0" noProof="0" dirty="0">
+                <a:ln>
+                  <a:noFill/>
+                </a:ln>
+                <a:solidFill>
+                  <a:srgbClr val="00BCA7"/>
+                </a:solidFill>
+                <a:effectLst/>
+                <a:uLnTx/>
+                <a:uFillTx/>
+                <a:latin typeface="+mj-ea"/>
+                <a:ea typeface="+mj-ea"/>
+                <a:cs typeface="+mn-ea"/>
+                <a:sym typeface="思源黑体 CN" panose="020B0500000000000000" pitchFamily="34" charset="-122"/>
+              </a:rPr>
+              <a:t>物联网</a:t>
+            </a:r>
+            <a:r>
+              <a:rPr kumimoji="0" lang="zh-CN" altLang="en-US" sz="1200" i="0" u="none" strike="noStrike" kern="1200" cap="none" spc="0" normalizeH="0" baseline="0" noProof="0" dirty="0">
+                <a:ln>
+                  <a:noFill/>
+                </a:ln>
+                <a:solidFill>
+                  <a:srgbClr val="00584E"/>
+                </a:solidFill>
+                <a:effectLst/>
+                <a:uLnTx/>
+                <a:uFillTx/>
+                <a:latin typeface="+mj-ea"/>
+                <a:ea typeface="+mj-ea"/>
+                <a:cs typeface="+mn-ea"/>
+                <a:sym typeface="思源黑体 CN" panose="020B0500000000000000" pitchFamily="34" charset="-122"/>
+              </a:rPr>
+              <a:t>：随着</a:t>
+            </a:r>
+            <a:r>
+              <a:rPr kumimoji="0" lang="en-US" altLang="zh-CN" sz="1200" i="0" u="none" strike="noStrike" kern="1200" cap="none" spc="0" normalizeH="0" baseline="0" noProof="0" dirty="0">
+                <a:ln>
+                  <a:noFill/>
+                </a:ln>
+                <a:solidFill>
+                  <a:srgbClr val="00584E"/>
+                </a:solidFill>
+                <a:effectLst/>
+                <a:uLnTx/>
+                <a:uFillTx/>
+                <a:latin typeface="+mj-ea"/>
+                <a:ea typeface="+mj-ea"/>
+                <a:cs typeface="+mn-ea"/>
+                <a:sym typeface="思源黑体 CN" panose="020B0500000000000000" pitchFamily="34" charset="-122"/>
+              </a:rPr>
+              <a:t>5G</a:t>
+            </a:r>
+            <a:r>
+              <a:rPr kumimoji="0" lang="zh-CN" altLang="en-US" sz="1200" i="0" u="none" strike="noStrike" kern="1200" cap="none" spc="0" normalizeH="0" baseline="0" noProof="0" dirty="0">
+                <a:ln>
+                  <a:noFill/>
+                </a:ln>
+                <a:solidFill>
+                  <a:srgbClr val="00584E"/>
+                </a:solidFill>
+                <a:effectLst/>
+                <a:uLnTx/>
+                <a:uFillTx/>
+                <a:latin typeface="+mj-ea"/>
+                <a:ea typeface="+mj-ea"/>
+                <a:cs typeface="+mn-ea"/>
+                <a:sym typeface="思源黑体 CN" panose="020B0500000000000000" pitchFamily="34" charset="-122"/>
+              </a:rPr>
+              <a:t>网络的普及，物联网技术在智能家居、智能物流、智慧城市等领域得到了广泛应用。</a:t>
+            </a:r>
+            <a:r>
+              <a:rPr kumimoji="0" lang="zh-CN" altLang="en-US" sz="1200" b="0" i="0" u="none" strike="noStrike" kern="1200" cap="none" spc="0" normalizeH="0" baseline="0" noProof="0" dirty="0">
+                <a:ln>
+                  <a:noFill/>
+                </a:ln>
+                <a:solidFill>
+                  <a:srgbClr val="00584E"/>
+                </a:solidFill>
+                <a:effectLst/>
+                <a:uLnTx/>
+                <a:uFillTx/>
+                <a:latin typeface="+mj-ea"/>
+                <a:ea typeface="+mj-ea"/>
+                <a:cs typeface="+mn-ea"/>
+                <a:sym typeface="思源黑体 CN" panose="020B0500000000000000" pitchFamily="34" charset="-122"/>
+              </a:rPr>
+              <a:t>
+</a:t>
+            </a:r>
+            <a:r>
+              <a:rPr kumimoji="0" lang="en-US" altLang="zh-CN" sz="1200" b="1" i="0" u="none" strike="noStrike" kern="1200" cap="none" spc="0" normalizeH="0" baseline="0" noProof="0" dirty="0">
+                <a:ln>
+                  <a:noFill/>
+                </a:ln>
+                <a:solidFill>
+                  <a:srgbClr val="00BCA7"/>
+                </a:solidFill>
+                <a:effectLst/>
+                <a:uLnTx/>
+                <a:uFillTx/>
+                <a:latin typeface="+mj-ea"/>
+                <a:ea typeface="+mj-ea"/>
+                <a:cs typeface="+mn-ea"/>
+                <a:sym typeface="思源黑体 CN" panose="020B0500000000000000" pitchFamily="34" charset="-122"/>
+              </a:rPr>
+              <a:t>3. </a:t>
+            </a:r>
+            <a:r>
+              <a:rPr kumimoji="0" lang="zh-CN" altLang="en-US" sz="1200" b="1" i="0" u="none" strike="noStrike" kern="1200" cap="none" spc="0" normalizeH="0" baseline="0" noProof="0" dirty="0">
+                <a:ln>
+                  <a:noFill/>
+                </a:ln>
+                <a:solidFill>
+                  <a:srgbClr val="00BCA7"/>
+                </a:solidFill>
+                <a:effectLst/>
+                <a:uLnTx/>
+                <a:uFillTx/>
+                <a:latin typeface="+mj-ea"/>
+                <a:ea typeface="+mj-ea"/>
+                <a:cs typeface="+mn-ea"/>
+                <a:sym typeface="思源黑体 CN" panose="020B0500000000000000" pitchFamily="34" charset="-122"/>
+              </a:rPr>
+              <a:t>区块链技术</a:t>
+            </a:r>
+            <a:r>
+              <a:rPr kumimoji="0" lang="zh-CN" altLang="en-US" sz="1200" i="0" u="none" strike="noStrike" kern="1200" cap="none" spc="0" normalizeH="0" baseline="0" noProof="0" dirty="0">
+                <a:ln>
+                  <a:noFill/>
+                </a:ln>
+                <a:solidFill>
+                  <a:srgbClr val="00584E"/>
+                </a:solidFill>
+                <a:effectLst/>
+                <a:uLnTx/>
+                <a:uFillTx/>
+                <a:latin typeface="+mj-ea"/>
+                <a:ea typeface="+mj-ea"/>
+                <a:cs typeface="+mn-ea"/>
+                <a:sym typeface="思源黑体 CN" panose="020B0500000000000000" pitchFamily="34" charset="-122"/>
+              </a:rPr>
+              <a:t>：区块链技术的去中心化、不可篡改特性使其在数字货币、供应链管理、投票系统等领域具有巨大潜力</a:t>
+            </a:r>
+            <a:endParaRPr kumimoji="0" lang="en-US" altLang="zh-CN" sz="1200" i="0" u="none" strike="noStrike" kern="1200" cap="none" spc="0" normalizeH="0" baseline="0" noProof="0" dirty="0">
+              <a:ln>
+                <a:noFill/>
+              </a:ln>
+              <a:solidFill>
+                <a:schemeClr val="bg2"/>
+              </a:solidFill>
+              <a:effectLst/>
+              <a:uLnTx/>
+              <a:uFillTx/>
               <a:latin typeface="+mj-ea"/>
               <a:ea typeface="+mj-ea"/>
-              <a:cs typeface="微软雅黑" panose="020B0503020204020204" charset="-122"/>
+              <a:cs typeface="+mn-ea"/>
+              <a:sym typeface="思源黑体 CN" panose="020B0500000000000000" pitchFamily="34" charset="-122"/>
+            </a:endParaRPr>
+          </a:p>
+          <a:p>
+            <a:pPr marL="228600" marR="0" lvl="0" indent="-228600" algn="just" defTabSz="914400" rtl="0" eaLnBrk="1" fontAlgn="ctr" latinLnBrk="0" hangingPunct="1">
+              <a:lnSpc>
+                <a:spcPct val="130000"/>
+              </a:lnSpc>
+              <a:spcBef>
+                <a:spcPts val="750"/>
+              </a:spcBef>
+              <a:spcAft>
+                <a:spcPts val="250"/>
+              </a:spcAft>
+              <a:buClrTx/>
+              <a:buSzTx/>
+              <a:buFontTx/>
+              <a:buAutoNum type="arabicPeriod"/>
+              <a:defRPr/>
+            </a:pPr>
+            <a:r>
+              <a:rPr lang="en-US" altLang="zh-CN" sz="1200" dirty="0">
+                <a:solidFill>
+                  <a:srgbClr val="00584E"/>
+                </a:solidFill>
+                <a:latin typeface="+mj-ea"/>
+                <a:ea typeface="+mj-ea"/>
+                <a:cs typeface="+mn-ea"/>
+                <a:sym typeface="思源黑体 CN" panose="020B0500000000000000" pitchFamily="34" charset="-122"/>
+              </a:rPr>
+              <a:t>4.</a:t>
+            </a:r>
+            <a:r>
+              <a:rPr lang="zh-CN" altLang="en-US" sz="1200" dirty="0">
+                <a:solidFill>
+                  <a:srgbClr val="00584E"/>
+                </a:solidFill>
+                <a:latin typeface="+mj-ea"/>
+                <a:ea typeface="+mj-ea"/>
+                <a:cs typeface="+mn-ea"/>
+                <a:sym typeface="思源黑体 CN" panose="020B0500000000000000" pitchFamily="34" charset="-122"/>
+              </a:rPr>
+              <a:t>第三方分段收费吗：大司马</a:t>
+            </a:r>
+            <a:endParaRPr lang="en-US" altLang="zh-CN" sz="1200" dirty="0">
+              <a:solidFill>
+                <a:schemeClr val="bg2"/>
+              </a:solidFill>
+              <a:latin typeface="+mj-ea"/>
+              <a:ea typeface="+mj-ea"/>
+              <a:cs typeface="+mn-ea"/>
               <a:sym typeface="思源黑体 CN" panose="020B0500000000000000" pitchFamily="34" charset="-122"/>
             </a:endParaRPr>
           </a:p>
@@ -12024,385 +12492,27 @@
     <p:custDataLst>
       <p:tags r:id="rId1"/>
     </p:custDataLst>
+    <p:extLst>
+      <p:ext uri="{BB962C8B-B14F-4D97-AF65-F5344CB8AC3E}">
+        <p14:creationId xmlns:p14="http://schemas.microsoft.com/office/powerpoint/2010/main" val="668566479"/>
+      </p:ext>
+    </p:extLst>
   </p:cSld>
   <p:clrMapOvr>
-    <a:overrideClrMapping bg1="lt1" tx1="dk1" bg2="lt2" tx2="dk2" accent1="accent1" accent2="accent2" accent3="accent3" accent4="accent4" accent5="accent5" accent6="accent6" hlink="hlink" folHlink="folHlink"/>
+    <a:masterClrMapping/>
   </p:clrMapOvr>
-  <p:timing>
-    <p:tnLst>
-      <p:par>
-        <p:cTn id="1" dur="indefinite" restart="never" nodeType="tmRoot">
-          <p:childTnLst>
-            <p:seq concurrent="1" nextAc="seek">
-              <p:cTn id="2" dur="indefinite" nodeType="mainSeq">
-                <p:childTnLst>
-                  <p:par>
-                    <p:cTn id="3" fill="hold">
-                      <p:stCondLst>
-                        <p:cond delay="indefinite"/>
-                        <p:cond evt="onBegin" delay="0">
-                          <p:tn val="2"/>
-                        </p:cond>
-                      </p:stCondLst>
-                      <p:childTnLst>
-                        <p:par>
-                          <p:cTn id="4" fill="hold">
-                            <p:stCondLst>
-                              <p:cond delay="0"/>
-                            </p:stCondLst>
-                            <p:childTnLst>
-                              <p:par>
-                                <p:cTn id="5" presetID="0" presetClass="entr" presetSubtype="0" fill="hold" nodeType="withEffect">
-                                  <p:stCondLst>
-                                    <p:cond delay="0"/>
-                                  </p:stCondLst>
-                                  <p:childTnLst>
-                                    <p:set>
-                                      <p:cBhvr>
-                                        <p:cTn id="6" dur="1" fill="hold">
-                                          <p:stCondLst>
-                                            <p:cond delay="0"/>
-                                          </p:stCondLst>
-                                        </p:cTn>
-                                        <p:tgtEl>
-                                          <p:spTgt spid="6"/>
-                                        </p:tgtEl>
-                                        <p:attrNameLst>
-                                          <p:attrName>style.visibility</p:attrName>
-                                        </p:attrNameLst>
-                                      </p:cBhvr>
-                                      <p:to>
-                                        <p:strVal val="visible"/>
-                                      </p:to>
-                                    </p:set>
-                                    <p:anim to="" calcmode="lin" valueType="num">
-                                      <p:cBhvr>
-                                        <p:cTn id="7" dur="500" fill="hold">
-                                          <p:stCondLst>
-                                            <p:cond delay="0"/>
-                                          </p:stCondLst>
-                                        </p:cTn>
-                                        <p:tgtEl>
-                                          <p:spTgt spid="6"/>
-                                        </p:tgtEl>
-                                        <p:attrNameLst>
-                                          <p:attrName>ppt_x</p:attrName>
-                                        </p:attrNameLst>
-                                      </p:cBhvr>
-                                      <p:tavLst>
-                                        <p:tav tm="0" fmla="((floor(#ppt_x-0.5)+ceil(#ppt_x-0.5))*0.5+0.5)+(#ppt_x- ((floor(#ppt_x-0.5)+ceil(#ppt_x-0.5))*0.5+0.5))*$">
-                                          <p:val>
-                                            <p:strVal val="0"/>
-                                          </p:val>
-                                        </p:tav>
-                                        <p:tav tm="100000">
-                                          <p:val>
-                                            <p:strVal val="1"/>
-                                          </p:val>
-                                        </p:tav>
-                                      </p:tavLst>
-                                    </p:anim>
-                                    <p:anim to="" calcmode="lin" valueType="num">
-                                      <p:cBhvr>
-                                        <p:cTn id="8" dur="500" fill="hold">
-                                          <p:stCondLst>
-                                            <p:cond delay="0"/>
-                                          </p:stCondLst>
-                                        </p:cTn>
-                                        <p:tgtEl>
-                                          <p:spTgt spid="6"/>
-                                        </p:tgtEl>
-                                        <p:attrNameLst>
-                                          <p:attrName>ppt_y</p:attrName>
-                                        </p:attrNameLst>
-                                      </p:cBhvr>
-                                      <p:tavLst>
-                                        <p:tav tm="0" fmla="((floor(#ppt_y-0.5)+ceil(#ppt_y-0.5))*0.5+0.5)+(#ppt_y- ((floor(#ppt_y-0.5)+ceil(#ppt_y-0.5))*0.5+0.5))*$">
-                                          <p:val>
-                                            <p:strVal val="0"/>
-                                          </p:val>
-                                        </p:tav>
-                                        <p:tav tm="100000">
-                                          <p:val>
-                                            <p:strVal val="1"/>
-                                          </p:val>
-                                        </p:tav>
-                                      </p:tavLst>
-                                    </p:anim>
-                                    <p:anim to="" calcmode="lin" valueType="num">
-                                      <p:cBhvr>
-                                        <p:cTn id="9" dur="500" fill="hold">
-                                          <p:stCondLst>
-                                            <p:cond delay="0"/>
-                                          </p:stCondLst>
-                                        </p:cTn>
-                                        <p:tgtEl>
-                                          <p:spTgt spid="6"/>
-                                        </p:tgtEl>
-                                        <p:attrNameLst>
-                                          <p:attrName>style.opacity</p:attrName>
-                                        </p:attrNameLst>
-                                      </p:cBhvr>
-                                      <p:tavLst>
-                                        <p:tav tm="0">
-                                          <p:val>
-                                            <p:strVal val="0"/>
-                                          </p:val>
-                                        </p:tav>
-                                        <p:tav tm="100000">
-                                          <p:val>
-                                            <p:strVal val="1"/>
-                                          </p:val>
-                                        </p:tav>
-                                      </p:tavLst>
-                                    </p:anim>
-                                    <p:anim to="" calcmode="lin" valueType="num">
-                                      <p:cBhvr>
-                                        <p:cTn id="10" dur="500" fill="hold">
-                                          <p:stCondLst>
-                                            <p:cond delay="0"/>
-                                          </p:stCondLst>
-                                        </p:cTn>
-                                        <p:tgtEl>
-                                          <p:spTgt spid="6"/>
-                                        </p:tgtEl>
-                                        <p:attrNameLst>
-                                          <p:attrName>ppt_w</p:attrName>
-                                        </p:attrNameLst>
-                                      </p:cBhvr>
-                                      <p:tavLst>
-                                        <p:tav tm="0">
-                                          <p:val>
-                                            <p:strVal val="#ppt_w*2"/>
-                                          </p:val>
-                                        </p:tav>
-                                        <p:tav tm="100000">
-                                          <p:val>
-                                            <p:strVal val="#ppt_w"/>
-                                          </p:val>
-                                        </p:tav>
-                                      </p:tavLst>
-                                    </p:anim>
-                                    <p:anim to="" calcmode="lin" valueType="num">
-                                      <p:cBhvr>
-                                        <p:cTn id="11" dur="500" fill="hold">
-                                          <p:stCondLst>
-                                            <p:cond delay="0"/>
-                                          </p:stCondLst>
-                                        </p:cTn>
-                                        <p:tgtEl>
-                                          <p:spTgt spid="6"/>
-                                        </p:tgtEl>
-                                        <p:attrNameLst>
-                                          <p:attrName>ppt_h</p:attrName>
-                                        </p:attrNameLst>
-                                      </p:cBhvr>
-                                      <p:tavLst>
-                                        <p:tav tm="0">
-                                          <p:val>
-                                            <p:strVal val="#ppt_h*2"/>
-                                          </p:val>
-                                        </p:tav>
-                                        <p:tav tm="100000">
-                                          <p:val>
-                                            <p:strVal val="#ppt_h"/>
-                                          </p:val>
-                                        </p:tav>
-                                      </p:tavLst>
-                                    </p:anim>
-                                  </p:childTnLst>
-                                </p:cTn>
-                              </p:par>
-                              <p:par>
-                                <p:cTn id="12" presetID="0" presetClass="entr" presetSubtype="0" fill="hold" nodeType="withEffect">
-                                  <p:stCondLst>
-                                    <p:cond delay="0"/>
-                                  </p:stCondLst>
-                                  <p:childTnLst>
-                                    <p:set>
-                                      <p:cBhvr>
-                                        <p:cTn id="13" dur="1" fill="hold">
-                                          <p:stCondLst>
-                                            <p:cond delay="0"/>
-                                          </p:stCondLst>
-                                        </p:cTn>
-                                        <p:tgtEl>
-                                          <p:spTgt spid="7"/>
-                                        </p:tgtEl>
-                                        <p:attrNameLst>
-                                          <p:attrName>style.visibility</p:attrName>
-                                        </p:attrNameLst>
-                                      </p:cBhvr>
-                                      <p:to>
-                                        <p:strVal val="visible"/>
-                                      </p:to>
-                                    </p:set>
-                                    <p:anim to="" calcmode="lin" valueType="num">
-                                      <p:cBhvr>
-                                        <p:cTn id="14" dur="500" fill="hold">
-                                          <p:stCondLst>
-                                            <p:cond delay="0"/>
-                                          </p:stCondLst>
-                                        </p:cTn>
-                                        <p:tgtEl>
-                                          <p:spTgt spid="7"/>
-                                        </p:tgtEl>
-                                        <p:attrNameLst>
-                                          <p:attrName>ppt_x</p:attrName>
-                                        </p:attrNameLst>
-                                      </p:cBhvr>
-                                      <p:tavLst>
-                                        <p:tav tm="0" fmla="((floor(#ppt_x-0.5)+ceil(#ppt_x-0.5))*0.5+0.5)+(#ppt_x- ((floor(#ppt_x-0.5)+ceil(#ppt_x-0.5))*0.5+0.5))*$">
-                                          <p:val>
-                                            <p:strVal val="0"/>
-                                          </p:val>
-                                        </p:tav>
-                                        <p:tav tm="100000">
-                                          <p:val>
-                                            <p:strVal val="1"/>
-                                          </p:val>
-                                        </p:tav>
-                                      </p:tavLst>
-                                    </p:anim>
-                                    <p:anim to="" calcmode="lin" valueType="num">
-                                      <p:cBhvr>
-                                        <p:cTn id="15" dur="500" fill="hold">
-                                          <p:stCondLst>
-                                            <p:cond delay="0"/>
-                                          </p:stCondLst>
-                                        </p:cTn>
-                                        <p:tgtEl>
-                                          <p:spTgt spid="7"/>
-                                        </p:tgtEl>
-                                        <p:attrNameLst>
-                                          <p:attrName>ppt_y</p:attrName>
-                                        </p:attrNameLst>
-                                      </p:cBhvr>
-                                      <p:tavLst>
-                                        <p:tav tm="0" fmla="((floor(#ppt_y-0.5)+ceil(#ppt_y-0.5))*0.5+0.5)+(#ppt_y- ((floor(#ppt_y-0.5)+ceil(#ppt_y-0.5))*0.5+0.5))*$">
-                                          <p:val>
-                                            <p:strVal val="0"/>
-                                          </p:val>
-                                        </p:tav>
-                                        <p:tav tm="100000">
-                                          <p:val>
-                                            <p:strVal val="1"/>
-                                          </p:val>
-                                        </p:tav>
-                                      </p:tavLst>
-                                    </p:anim>
-                                    <p:anim to="" calcmode="lin" valueType="num">
-                                      <p:cBhvr>
-                                        <p:cTn id="16" dur="500" fill="hold">
-                                          <p:stCondLst>
-                                            <p:cond delay="0"/>
-                                          </p:stCondLst>
-                                        </p:cTn>
-                                        <p:tgtEl>
-                                          <p:spTgt spid="7"/>
-                                        </p:tgtEl>
-                                        <p:attrNameLst>
-                                          <p:attrName>style.opacity</p:attrName>
-                                        </p:attrNameLst>
-                                      </p:cBhvr>
-                                      <p:tavLst>
-                                        <p:tav tm="0">
-                                          <p:val>
-                                            <p:strVal val="0"/>
-                                          </p:val>
-                                        </p:tav>
-                                        <p:tav tm="100000">
-                                          <p:val>
-                                            <p:strVal val="1"/>
-                                          </p:val>
-                                        </p:tav>
-                                      </p:tavLst>
-                                    </p:anim>
-                                    <p:anim to="" calcmode="lin" valueType="num">
-                                      <p:cBhvr>
-                                        <p:cTn id="17" dur="500" fill="hold">
-                                          <p:stCondLst>
-                                            <p:cond delay="0"/>
-                                          </p:stCondLst>
-                                        </p:cTn>
-                                        <p:tgtEl>
-                                          <p:spTgt spid="7"/>
-                                        </p:tgtEl>
-                                        <p:attrNameLst>
-                                          <p:attrName>ppt_w</p:attrName>
-                                        </p:attrNameLst>
-                                      </p:cBhvr>
-                                      <p:tavLst>
-                                        <p:tav tm="0">
-                                          <p:val>
-                                            <p:strVal val="#ppt_w*2"/>
-                                          </p:val>
-                                        </p:tav>
-                                        <p:tav tm="100000">
-                                          <p:val>
-                                            <p:strVal val="#ppt_w"/>
-                                          </p:val>
-                                        </p:tav>
-                                      </p:tavLst>
-                                    </p:anim>
-                                    <p:anim to="" calcmode="lin" valueType="num">
-                                      <p:cBhvr>
-                                        <p:cTn id="18" dur="500" fill="hold">
-                                          <p:stCondLst>
-                                            <p:cond delay="0"/>
-                                          </p:stCondLst>
-                                        </p:cTn>
-                                        <p:tgtEl>
-                                          <p:spTgt spid="7"/>
-                                        </p:tgtEl>
-                                        <p:attrNameLst>
-                                          <p:attrName>ppt_h</p:attrName>
-                                        </p:attrNameLst>
-                                      </p:cBhvr>
-                                      <p:tavLst>
-                                        <p:tav tm="0">
-                                          <p:val>
-                                            <p:strVal val="#ppt_h*2"/>
-                                          </p:val>
-                                        </p:tav>
-                                        <p:tav tm="100000">
-                                          <p:val>
-                                            <p:strVal val="#ppt_h"/>
-                                          </p:val>
-                                        </p:tav>
-                                      </p:tavLst>
-                                    </p:anim>
-                                  </p:childTnLst>
-                                </p:cTn>
-                              </p:par>
-                            </p:childTnLst>
-                          </p:cTn>
-                        </p:par>
-                      </p:childTnLst>
-                    </p:cTn>
-                  </p:par>
-                </p:childTnLst>
-              </p:cTn>
-              <p:prevCondLst>
-                <p:cond evt="onPrev" delay="0">
-                  <p:tgtEl>
-                    <p:sldTgt/>
-                  </p:tgtEl>
-                </p:cond>
-              </p:prevCondLst>
-              <p:nextCondLst>
-                <p:cond evt="onNext" delay="0">
-                  <p:tgtEl>
-                    <p:sldTgt/>
-                  </p:tgtEl>
-                </p:cond>
-              </p:nextCondLst>
-            </p:seq>
-          </p:childTnLst>
-        </p:cTn>
-      </p:par>
-    </p:tnLst>
-  </p:timing>
+  <mc:AlternateContent xmlns:mc="http://schemas.openxmlformats.org/markup-compatibility/2006" xmlns:p14="http://schemas.microsoft.com/office/powerpoint/2010/main">
+    <mc:Choice Requires="p14">
+      <p:transition spd="slow" p14:dur="2000">
+        <p:cover dir="lu"/>
+      </p:transition>
+    </mc:Choice>
+    <mc:Fallback xmlns="">
+      <p:transition spd="slow">
+        <p:cover dir="lu"/>
+      </p:transition>
+    </mc:Fallback>
+  </mc:AlternateContent>
 </p:sld>
 </file>
 
@@ -12416,89 +12526,32 @@
 </p:tagLst>
 </file>
 
-<file path=ppt/tags/tag10.xml><?xml version="1.0" encoding="utf-8"?>
+<file path=ppt/tags/tag2.xml><?xml version="1.0" encoding="utf-8"?>
 <p:tagLst xmlns:a="http://schemas.openxmlformats.org/drawingml/2006/main" xmlns:r="http://schemas.openxmlformats.org/officeDocument/2006/relationships" xmlns:p="http://schemas.openxmlformats.org/presentationml/2006/main">
-  <p:tag name="KSO_WM_BEAUTIFY_FLAG" val=""/>
-  <p:tag name="YOO_CHATSHAPE_TYPE" val="YOO_CHATSHAPE_CHILDIMAGE"/>
-  <p:tag name="TAG_CONTENT_INDEX" val="2"/>
-  <p:tag name="TAG_CHATSHAPE_IMAGE_FILE" val="C:\Users\11517\AppData\Roaming\BIYOO\temp\1ed6ebb753584aee951c0b790c40ae55.png"/>
-  <p:tag name="TAG_CHATSHAPE_IMAGE_URL" val="https://download.yoo-ai.com/copydone/20231008/02e2af22-6535-11ee-b6a8-fa163e3b0a47.png"/>
+  <p:tag name="TAG_CONTENT_TYPE" val="1标题1内容1图"/>
+  <p:tag name="YOO_CHATPAGE_TYPE" val="YOO_CHATPAGE_CONTENT"/>
+  <p:tag name="YOO_CHATPPT_CONTENT" val="1"/>
 </p:tagLst>
 </file>
 
-<file path=ppt/tags/tag11.xml><?xml version="1.0" encoding="utf-8"?>
+<file path=ppt/tags/tag3.xml><?xml version="1.0" encoding="utf-8"?>
 <p:tagLst xmlns:a="http://schemas.openxmlformats.org/drawingml/2006/main" xmlns:r="http://schemas.openxmlformats.org/officeDocument/2006/relationships" xmlns:p="http://schemas.openxmlformats.org/presentationml/2006/main">
-  <p:tag name="KSO_WM_BEAUTIFY_FLAG" val=""/>
-  <p:tag name="YOO_CHATSHAPE_TYPE" val="YOO_CHATSHAPE_CHILDIMAGE"/>
-  <p:tag name="TAG_CONTENT_INDEX" val="1"/>
-  <p:tag name="TAG_CHATSHAPE_IMAGE_FILE" val="C:\Users\11517\AppData\Roaming\BIYOO\temp\1ecdb2da0de14cc0888cd1dfac40bd51.png"/>
-  <p:tag name="TAG_CHATSHAPE_IMAGE_URL" val="https://image.yoojober.com/ppt-illustration/ES/295c7599-08f5-11ee-a0a1-b42e99e89dc7.png"/>
+  <p:tag name="YOO_CHATSHAPE_TYPE" val="YOO_CHATSHAPE_IMAGE"/>
+  <p:tag name="TAG_CHATSHAPE_IMAGE_FILE" val="C:\Users\11517\AppData\Roaming\BIYOO\temp\e39184a4328b4052bef5f2e02b7aaf63.png"/>
 </p:tagLst>
 </file>
 
-<file path=ppt/tags/tag12.xml><?xml version="1.0" encoding="utf-8"?>
+<file path=ppt/tags/tag4.xml><?xml version="1.0" encoding="utf-8"?>
 <p:tagLst xmlns:a="http://schemas.openxmlformats.org/drawingml/2006/main" xmlns:r="http://schemas.openxmlformats.org/officeDocument/2006/relationships" xmlns:p="http://schemas.openxmlformats.org/presentationml/2006/main">
   <p:tag name="KSO_WM_BEAUTIFY_FLAG" val=""/>
   <p:tag name="YOO_CHATSHAPE_TYPE" val="YOO_CHATSHAPE_TITLE"/>
 </p:tagLst>
 </file>
 
-<file path=ppt/tags/tag2.xml><?xml version="1.0" encoding="utf-8"?>
-<p:tagLst xmlns:a="http://schemas.openxmlformats.org/drawingml/2006/main" xmlns:r="http://schemas.openxmlformats.org/officeDocument/2006/relationships" xmlns:p="http://schemas.openxmlformats.org/presentationml/2006/main">
-  <p:tag name="TAG_CONTENT_TYPE" val="二级大纲3"/>
-  <p:tag name="YOO_CHATPAGE_TYPE" val="YOO_CHATPAGE_MULTCONTENT"/>
-</p:tagLst>
-</file>
-
-<file path=ppt/tags/tag3.xml><?xml version="1.0" encoding="utf-8"?>
-<p:tagLst xmlns:a="http://schemas.openxmlformats.org/drawingml/2006/main" xmlns:r="http://schemas.openxmlformats.org/officeDocument/2006/relationships" xmlns:p="http://schemas.openxmlformats.org/presentationml/2006/main">
-  <p:tag name="YOO_CHATSHAPE_TYPE" val="YOO_CHATSHAPE_CHILDCONTENT"/>
-  <p:tag name="TAG_CONTENT_INDEX" val="3"/>
-</p:tagLst>
-</file>
-
-<file path=ppt/tags/tag4.xml><?xml version="1.0" encoding="utf-8"?>
-<p:tagLst xmlns:a="http://schemas.openxmlformats.org/drawingml/2006/main" xmlns:r="http://schemas.openxmlformats.org/officeDocument/2006/relationships" xmlns:p="http://schemas.openxmlformats.org/presentationml/2006/main">
-  <p:tag name="YOO_CHATSHAPE_TYPE" val="YOO_CHATSHAPE_CHILDCONTENT"/>
-  <p:tag name="TAG_CONTENT_INDEX" val="2"/>
-</p:tagLst>
-</file>
-
 <file path=ppt/tags/tag5.xml><?xml version="1.0" encoding="utf-8"?>
 <p:tagLst xmlns:a="http://schemas.openxmlformats.org/drawingml/2006/main" xmlns:r="http://schemas.openxmlformats.org/officeDocument/2006/relationships" xmlns:p="http://schemas.openxmlformats.org/presentationml/2006/main">
-  <p:tag name="YOO_CHATSHAPE_TYPE" val="YOO_CHATSHAPE_CHILDCONTENT"/>
-  <p:tag name="TAG_CONTENT_INDEX" val="1"/>
-</p:tagLst>
-</file>
-
-<file path=ppt/tags/tag6.xml><?xml version="1.0" encoding="utf-8"?>
-<p:tagLst xmlns:a="http://schemas.openxmlformats.org/drawingml/2006/main" xmlns:r="http://schemas.openxmlformats.org/officeDocument/2006/relationships" xmlns:p="http://schemas.openxmlformats.org/presentationml/2006/main">
-  <p:tag name="YOO_CHATSHAPE_TYPE" val="YOO_CHATSHAPE_CHILDTITLE"/>
-  <p:tag name="TAG_CONTENT_INDEX" val="3"/>
-</p:tagLst>
-</file>
-
-<file path=ppt/tags/tag7.xml><?xml version="1.0" encoding="utf-8"?>
-<p:tagLst xmlns:a="http://schemas.openxmlformats.org/drawingml/2006/main" xmlns:r="http://schemas.openxmlformats.org/officeDocument/2006/relationships" xmlns:p="http://schemas.openxmlformats.org/presentationml/2006/main">
-  <p:tag name="YOO_CHATSHAPE_TYPE" val="YOO_CHATSHAPE_CHILDTITLE"/>
-  <p:tag name="TAG_CONTENT_INDEX" val="2"/>
-</p:tagLst>
-</file>
-
-<file path=ppt/tags/tag8.xml><?xml version="1.0" encoding="utf-8"?>
-<p:tagLst xmlns:a="http://schemas.openxmlformats.org/drawingml/2006/main" xmlns:r="http://schemas.openxmlformats.org/officeDocument/2006/relationships" xmlns:p="http://schemas.openxmlformats.org/presentationml/2006/main">
-  <p:tag name="YOO_CHATSHAPE_TYPE" val="YOO_CHATSHAPE_CHILDTITLE"/>
-  <p:tag name="TAG_CONTENT_INDEX" val="1"/>
-</p:tagLst>
-</file>
-
-<file path=ppt/tags/tag9.xml><?xml version="1.0" encoding="utf-8"?>
-<p:tagLst xmlns:a="http://schemas.openxmlformats.org/drawingml/2006/main" xmlns:r="http://schemas.openxmlformats.org/officeDocument/2006/relationships" xmlns:p="http://schemas.openxmlformats.org/presentationml/2006/main">
   <p:tag name="KSO_WM_BEAUTIFY_FLAG" val=""/>
-  <p:tag name="YOO_CHATSHAPE_TYPE" val="YOO_CHATSHAPE_CHILDIMAGE"/>
-  <p:tag name="TAG_CONTENT_INDEX" val="3"/>
-  <p:tag name="TAG_CHATSHAPE_IMAGE_FILE" val="C:\Users\11517\AppData\Roaming\BIYOO\temp\747de558a6dc4b43a67be64cff0a95ee.png"/>
-  <p:tag name="TAG_CHATSHAPE_IMAGE_URL" val="https://image.yoojober.com/ppt-illustration/AM/894d26ee-f577-11ed-b686-b42e99e89dc7.png"/>
+  <p:tag name="YOO_CHATSHAPE_TYPE" val="YOO_CHATSHAPE_CONTENT"/>
 </p:tagLst>
 </file>
 

</xml_diff>

<commit_message>
change gradient fill color
</commit_message>
<xml_diff>
--- a/motiongo科技1_sub2_new.pptx
+++ b/motiongo科技1_sub2_new.pptx
@@ -12,7 +12,7 @@
     <p:notesMasterId r:id="rId7"/>
   </p:notesMasterIdLst>
   <p:sldIdLst>
-    <p:sldId id="11090056" r:id="rId6"/>
+    <p:sldId id="11089736" r:id="rId6"/>
   </p:sldIdLst>
   <p:sldSz cx="12192000" cy="6858000"/>
   <p:notesSz cx="6858000" cy="9144000"/>
@@ -10942,10 +10942,10 @@
         <a:gradFill rotWithShape="1">
           <a:gsLst>
             <a:gs pos="0">
-              <a:srgbClr val="FF0000"/>
+              <a:srgbClr val="EEFFFD"/>
             </a:gs>
             <a:gs pos="100000">
-              <a:srgbClr val="00FF00"/>
+              <a:srgbClr val="00BCA7"/>
             </a:gs>
           </a:gsLst>
           <a:lin scaled="0" ang="16200000"/>
@@ -10969,10 +10969,10 @@
       </p:grpSpPr>
       <p:sp>
         <p:nvSpPr>
-          <p:cNvPr id="10" name="任意多边形: 形状 9">
+          <p:cNvPr id="44" name="任意多边形: 形状 43">
             <a:extLst>
               <a:ext uri="{FF2B5EF4-FFF2-40B4-BE49-F238E27FC236}">
-                <a16:creationId xmlns:a16="http://schemas.microsoft.com/office/drawing/2014/main" id="{2E103254-E189-A79A-3E30-259FB4208D29}"/>
+                <a16:creationId xmlns:a16="http://schemas.microsoft.com/office/drawing/2014/main" id="{4DCAA473-0141-4635-4F1E-D918C4009935}"/>
               </a:ext>
             </a:extLst>
           </p:cNvPr>
@@ -10981,7 +10981,7 @@
         </p:nvSpPr>
         <p:spPr>
           <a:xfrm>
-            <a:off x="11529319" y="5893850"/>
+            <a:off x="10709512" y="5620581"/>
             <a:ext cx="662681" cy="964150"/>
           </a:xfrm>
           <a:custGeom>
@@ -11043,18 +11043,16 @@
           <a:gradFill rotWithShape="1">
             <a:gsLst>
               <a:gs pos="0">
-                <a:srgbClr val="FF0000"/>
+                <a:srgbClr val="EEFFFD"/>
               </a:gs>
               <a:gs pos="100000">
-                <a:srgbClr val="00FF00"/>
+                <a:srgbClr val="00BCA7"/>
               </a:gs>
             </a:gsLst>
             <a:lin scaled="0" ang="16200000"/>
           </a:gradFill>
           <a:ln>
-            <a:solidFill>
-              <a:srgbClr val="000000"/>
-            </a:solidFill>
+            <a:noFill/>
           </a:ln>
         </p:spPr>
         <p:style>
@@ -11086,10 +11084,10 @@
       </p:sp>
       <p:sp>
         <p:nvSpPr>
-          <p:cNvPr id="9" name="任意多边形: 形状 8">
+          <p:cNvPr id="43" name="任意多边形: 形状 42">
             <a:extLst>
               <a:ext uri="{FF2B5EF4-FFF2-40B4-BE49-F238E27FC236}">
-                <a16:creationId xmlns:a16="http://schemas.microsoft.com/office/drawing/2014/main" id="{CC25A6A2-C3F9-3C41-4F93-E25EDD5AC2ED}"/>
+                <a16:creationId xmlns:a16="http://schemas.microsoft.com/office/drawing/2014/main" id="{389FA72E-9468-93AF-1653-799DF3409C2F}"/>
               </a:ext>
             </a:extLst>
           </p:cNvPr>
@@ -11098,7 +11096,7 @@
         </p:nvSpPr>
         <p:spPr>
           <a:xfrm>
-            <a:off x="6878746" y="4802253"/>
+            <a:off x="6850275" y="4802253"/>
             <a:ext cx="2207779" cy="2055747"/>
           </a:xfrm>
           <a:custGeom>
@@ -11223,9 +11221,7 @@
             <a:tileRect/>
           </a:gradFill>
           <a:ln>
-            <a:solidFill>
-              <a:srgbClr val="000000"/>
-            </a:solidFill>
+            <a:noFill/>
           </a:ln>
         </p:spPr>
         <p:style>
@@ -11261,10 +11257,10 @@
       </p:sp>
       <p:sp>
         <p:nvSpPr>
-          <p:cNvPr id="8" name="任意多边形: 形状 7">
+          <p:cNvPr id="42" name="任意多边形: 形状 41">
             <a:extLst>
               <a:ext uri="{FF2B5EF4-FFF2-40B4-BE49-F238E27FC236}">
-                <a16:creationId xmlns:a16="http://schemas.microsoft.com/office/drawing/2014/main" id="{3DD16A4E-A29E-C617-646F-11AE3F069908}"/>
+                <a16:creationId xmlns:a16="http://schemas.microsoft.com/office/drawing/2014/main" id="{0DDE12BB-9B3A-78BB-64A2-A841D25A5777}"/>
               </a:ext>
             </a:extLst>
           </p:cNvPr>
@@ -11405,9 +11401,7 @@
             </a:path>
           </a:gradFill>
           <a:ln>
-            <a:solidFill>
-              <a:srgbClr val="000000"/>
-            </a:solidFill>
+            <a:noFill/>
           </a:ln>
         </p:spPr>
         <p:style>
@@ -11439,10 +11433,10 @@
       </p:sp>
       <p:sp>
         <p:nvSpPr>
-          <p:cNvPr id="7" name="任意多边形: 形状 6">
+          <p:cNvPr id="41" name="任意多边形: 形状 40">
             <a:extLst>
               <a:ext uri="{FF2B5EF4-FFF2-40B4-BE49-F238E27FC236}">
-                <a16:creationId xmlns:a16="http://schemas.microsoft.com/office/drawing/2014/main" id="{2B89314D-00EE-1EB9-DEB5-C4C0362EFDCD}"/>
+                <a16:creationId xmlns:a16="http://schemas.microsoft.com/office/drawing/2014/main" id="{1ED9BF16-1F37-3ACD-8ABF-EE008226E0E7}"/>
               </a:ext>
             </a:extLst>
           </p:cNvPr>
@@ -11565,9 +11559,7 @@
             </a:pathLst>
           </a:custGeom>
           <a:ln>
-            <a:solidFill>
-              <a:srgbClr val="000000"/>
-            </a:solidFill>
+            <a:noFill/>
           </a:ln>
         </p:spPr>
         <p:style>
@@ -11603,10 +11595,10 @@
       </p:sp>
       <p:sp>
         <p:nvSpPr>
-          <p:cNvPr id="6" name="任意多边形: 形状 5">
+          <p:cNvPr id="40" name="任意多边形: 形状 39">
             <a:extLst>
               <a:ext uri="{FF2B5EF4-FFF2-40B4-BE49-F238E27FC236}">
-                <a16:creationId xmlns:a16="http://schemas.microsoft.com/office/drawing/2014/main" id="{D9D56249-279F-EE14-E8AF-D2C6FF66AF1D}"/>
+                <a16:creationId xmlns:a16="http://schemas.microsoft.com/office/drawing/2014/main" id="{335C7D47-341F-7055-99F9-B69F1DCEB426}"/>
               </a:ext>
             </a:extLst>
           </p:cNvPr>
@@ -11704,9 +11696,7 @@
             <a:tileRect/>
           </a:gradFill>
           <a:ln>
-            <a:solidFill>
-              <a:srgbClr val="000000"/>
-            </a:solidFill>
+            <a:noFill/>
           </a:ln>
           <a:effectLst/>
         </p:spPr>
@@ -11739,10 +11729,10 @@
       </p:sp>
       <p:sp>
         <p:nvSpPr>
-          <p:cNvPr id="5" name="任意多边形: 形状 4">
+          <p:cNvPr id="39" name="任意多边形: 形状 38">
             <a:extLst>
               <a:ext uri="{FF2B5EF4-FFF2-40B4-BE49-F238E27FC236}">
-                <a16:creationId xmlns:a16="http://schemas.microsoft.com/office/drawing/2014/main" id="{25DC7269-113F-D721-329A-7622D1561A7F}"/>
+                <a16:creationId xmlns:a16="http://schemas.microsoft.com/office/drawing/2014/main" id="{D27766C6-CFBF-F233-6E4F-0EE5CA04DE9E}"/>
               </a:ext>
             </a:extLst>
           </p:cNvPr>
@@ -11857,9 +11847,7 @@
             <a:lin ang="5400000" scaled="0"/>
           </a:gradFill>
           <a:ln>
-            <a:solidFill>
-              <a:srgbClr val="000000"/>
-            </a:solidFill>
+            <a:noFill/>
           </a:ln>
         </p:spPr>
         <p:style>
@@ -11891,10 +11879,10 @@
       </p:sp>
       <p:sp>
         <p:nvSpPr>
-          <p:cNvPr id="4" name="矩形 3">
+          <p:cNvPr id="38" name="矩形 37">
             <a:extLst>
               <a:ext uri="{FF2B5EF4-FFF2-40B4-BE49-F238E27FC236}">
-                <a16:creationId xmlns:a16="http://schemas.microsoft.com/office/drawing/2014/main" id="{18497136-1861-A1D5-995C-143F71B59B00}"/>
+                <a16:creationId xmlns:a16="http://schemas.microsoft.com/office/drawing/2014/main" id="{7D407B0B-4BAC-C581-03F0-5699A13C749E}"/>
               </a:ext>
             </a:extLst>
           </p:cNvPr>
@@ -11903,7 +11891,7 @@
         </p:nvSpPr>
         <p:spPr>
           <a:xfrm>
-            <a:off x="-1" y="0"/>
+            <a:off x="3114675" y="0"/>
             <a:ext cx="12192001" cy="6858000"/>
           </a:xfrm>
           <a:prstGeom prst="rect">
@@ -11912,10 +11900,10 @@
           <a:gradFill rotWithShape="1">
             <a:gsLst>
               <a:gs pos="0">
-                <a:srgbClr val="FF0000"/>
+                <a:srgbClr val="EEFFFD"/>
               </a:gs>
               <a:gs pos="100000">
-                <a:srgbClr val="00FF00"/>
+                <a:srgbClr val="00BCA7"/>
               </a:gs>
             </a:gsLst>
             <a:lin scaled="0" ang="16200000"/>
@@ -11951,7 +11939,78 @@
       </p:sp>
       <p:sp>
         <p:nvSpPr>
-          <p:cNvPr id="12" name="图片"/>
+          <p:cNvPr id="9" name="rectangle-11"/>
+          <p:cNvSpPr/>
+          <p:nvPr/>
+        </p:nvSpPr>
+        <p:spPr>
+          <a:xfrm>
+            <a:off x="3490443" y="1824436"/>
+            <a:ext cx="1724527" cy="523217"/>
+          </a:xfrm>
+          <a:prstGeom prst="roundRect">
+            <a:avLst>
+              <a:gd name="adj" fmla="val 50000"/>
+            </a:avLst>
+          </a:prstGeom>
+          <a:gradFill rotWithShape="1">
+            <a:gsLst>
+              <a:gs pos="0">
+                <a:srgbClr val="EEFFFD"/>
+              </a:gs>
+              <a:gs pos="100000">
+                <a:srgbClr val="00BCA7"/>
+              </a:gs>
+            </a:gsLst>
+            <a:lin scaled="0" ang="16200000"/>
+          </a:gradFill>
+          <a:ln>
+            <a:noFill/>
+          </a:ln>
+          <a:effectLst>
+            <a:outerShdw blurRad="292100" dist="76200" dir="2700000" sx="98000" sy="98000" algn="tl" rotWithShape="0">
+              <a:schemeClr val="accent1">
+                <a:alpha val="28000"/>
+              </a:schemeClr>
+            </a:outerShdw>
+          </a:effectLst>
+        </p:spPr>
+        <p:style>
+          <a:lnRef idx="2">
+            <a:schemeClr val="accent1">
+              <a:shade val="50000"/>
+            </a:schemeClr>
+          </a:lnRef>
+          <a:fillRef idx="1">
+            <a:schemeClr val="accent1"/>
+          </a:fillRef>
+          <a:effectRef idx="0">
+            <a:schemeClr val="accent1"/>
+          </a:effectRef>
+          <a:fontRef idx="minor">
+            <a:schemeClr val="lt1"/>
+          </a:fontRef>
+        </p:style>
+        <p:txBody>
+          <a:bodyPr wrap="square" rtlCol="0" anchor="ctr">
+            <a:noAutofit/>
+          </a:bodyPr>
+          <a:lstStyle/>
+          <a:p>
+            <a:pPr algn="ctr"/>
+            <a:endParaRPr lang="zh-CN" altLang="en-US" sz="1600">
+              <a:solidFill>
+                <a:schemeClr val="tx2"/>
+              </a:solidFill>
+              <a:latin typeface="+mj-ea"/>
+              <a:ea typeface="+mj-ea"/>
+            </a:endParaRPr>
+          </a:p>
+        </p:txBody>
+      </p:sp>
+      <p:sp>
+        <p:nvSpPr>
+          <p:cNvPr id="2" name="关键词1"/>
           <p:cNvSpPr/>
           <p:nvPr>
             <p:custDataLst>
@@ -11961,19 +12020,451 @@
         </p:nvSpPr>
         <p:spPr>
           <a:xfrm>
-            <a:off x="0" y="3908505"/>
-            <a:ext cx="12203512" cy="2949495"/>
+            <a:off x="3673105" y="1893298"/>
+            <a:ext cx="1359201" cy="385492"/>
           </a:xfrm>
           <a:prstGeom prst="rect">
             <a:avLst/>
           </a:prstGeom>
-          <a:blipFill dpi="0" rotWithShape="0">
-            <a:blip r:embed="rId6"/>
-            <a:srcRect/>
-            <a:stretch>
-              <a:fillRect t="-156874" b="-156874"/>
-            </a:stretch>
-          </a:blipFill>
+          <a:noFill/>
+          <a:ln>
+            <a:noFill/>
+          </a:ln>
+          <a:effectLst>
+            <a:outerShdw blurRad="292100" dist="76200" dir="2700000" sx="98000" sy="98000" algn="tl" rotWithShape="0">
+              <a:schemeClr val="accent1">
+                <a:alpha val="28000"/>
+              </a:schemeClr>
+            </a:outerShdw>
+          </a:effectLst>
+        </p:spPr>
+        <p:style>
+          <a:lnRef idx="2">
+            <a:schemeClr val="accent1">
+              <a:shade val="50000"/>
+            </a:schemeClr>
+          </a:lnRef>
+          <a:fillRef idx="1">
+            <a:schemeClr val="accent1"/>
+          </a:fillRef>
+          <a:effectRef idx="0">
+            <a:schemeClr val="accent1"/>
+          </a:effectRef>
+          <a:fontRef idx="minor">
+            <a:schemeClr val="lt1"/>
+          </a:fontRef>
+        </p:style>
+        <p:txBody>
+          <a:bodyPr wrap="square" rtlCol="0" anchor="ctr">
+            <a:normAutofit/>
+          </a:bodyPr>
+          <a:lstStyle/>
+          <a:p>
+            <a:pPr algn="ctr">
+              <a:lnSpc>
+                <a:spcPct val="120000"/>
+              </a:lnSpc>
+            </a:pPr>
+            <a:r>
+              <a:rPr lang="zh-CN" altLang="en-US" sz="1600">
+                <a:solidFill>
+                  <a:srgbClr val="00584E"/>
+                </a:solidFill>
+                <a:latin typeface="+mj-ea"/>
+                <a:ea typeface="+mj-ea"/>
+                <a:sym typeface="思源黑体 CN" panose="020B0500000000000000" pitchFamily="34" charset="-122"/>
+              </a:rPr>
+              <a:t> 科技</a:t>
+            </a:r>
+            <a:endParaRPr lang="zh-CN" altLang="en-US" sz="1600" dirty="0">
+              <a:solidFill>
+                <a:schemeClr val="tx2"/>
+              </a:solidFill>
+              <a:latin typeface="+mj-ea"/>
+              <a:ea typeface="+mj-ea"/>
+              <a:sym typeface="思源黑体 CN" panose="020B0500000000000000" pitchFamily="34" charset="-122"/>
+            </a:endParaRPr>
+          </a:p>
+        </p:txBody>
+      </p:sp>
+      <p:grpSp>
+        <p:nvGrpSpPr>
+          <p:cNvPr id="34" name="组合 33"/>
+          <p:cNvGrpSpPr/>
+          <p:nvPr/>
+        </p:nvGrpSpPr>
+        <p:grpSpPr>
+          <a:xfrm>
+            <a:off x="4065821" y="1973921"/>
+            <a:ext cx="3990551" cy="3990550"/>
+            <a:chOff x="3251827" y="548004"/>
+            <a:chExt cx="5761991" cy="5761991"/>
+          </a:xfrm>
+        </p:grpSpPr>
+        <p:sp>
+          <p:nvSpPr>
+            <p:cNvPr id="30" name="椭圆 29"/>
+            <p:cNvSpPr/>
+            <p:nvPr>
+              <p:custDataLst>
+                <p:tags r:id="rId20"/>
+              </p:custDataLst>
+            </p:nvPr>
+          </p:nvSpPr>
+          <p:spPr>
+            <a:xfrm rot="2629861">
+              <a:off x="3251827" y="548004"/>
+              <a:ext cx="5761990" cy="5761990"/>
+            </a:xfrm>
+            <a:prstGeom prst="ellipse">
+              <a:avLst/>
+            </a:prstGeom>
+            <a:noFill/>
+            <a:ln>
+              <a:gradFill>
+                <a:gsLst>
+                  <a:gs pos="0">
+                    <a:schemeClr val="accent1">
+                      <a:alpha val="70000"/>
+                    </a:schemeClr>
+                  </a:gs>
+                  <a:gs pos="4000">
+                    <a:schemeClr val="accent1">
+                      <a:alpha val="0"/>
+                    </a:schemeClr>
+                  </a:gs>
+                </a:gsLst>
+                <a:lin ang="5400000" scaled="1"/>
+              </a:gradFill>
+              <a:prstDash val="dash"/>
+            </a:ln>
+          </p:spPr>
+          <p:style>
+            <a:lnRef idx="2">
+              <a:schemeClr val="accent1">
+                <a:shade val="50000"/>
+              </a:schemeClr>
+            </a:lnRef>
+            <a:fillRef idx="1">
+              <a:schemeClr val="accent1"/>
+            </a:fillRef>
+            <a:effectRef idx="0">
+              <a:schemeClr val="accent1"/>
+            </a:effectRef>
+            <a:fontRef idx="minor">
+              <a:schemeClr val="lt1"/>
+            </a:fontRef>
+          </p:style>
+          <p:txBody>
+            <a:bodyPr wrap="square" rtlCol="0" anchor="ctr">
+              <a:normAutofit/>
+            </a:bodyPr>
+            <a:lstStyle/>
+            <a:p>
+              <a:pPr algn="ctr"/>
+              <a:endParaRPr lang="zh-CN" altLang="en-US"/>
+            </a:p>
+          </p:txBody>
+        </p:sp>
+        <p:sp>
+          <p:nvSpPr>
+            <p:cNvPr id="31" name="椭圆 30"/>
+            <p:cNvSpPr/>
+            <p:nvPr>
+              <p:custDataLst>
+                <p:tags r:id="rId21"/>
+              </p:custDataLst>
+            </p:nvPr>
+          </p:nvSpPr>
+          <p:spPr>
+            <a:xfrm rot="2629861" flipV="1">
+              <a:off x="3251827" y="548004"/>
+              <a:ext cx="5761990" cy="5761990"/>
+            </a:xfrm>
+            <a:prstGeom prst="ellipse">
+              <a:avLst/>
+            </a:prstGeom>
+            <a:noFill/>
+            <a:ln>
+              <a:gradFill>
+                <a:gsLst>
+                  <a:gs pos="0">
+                    <a:schemeClr val="accent1">
+                      <a:alpha val="70000"/>
+                    </a:schemeClr>
+                  </a:gs>
+                  <a:gs pos="4000">
+                    <a:schemeClr val="accent1">
+                      <a:alpha val="0"/>
+                    </a:schemeClr>
+                  </a:gs>
+                </a:gsLst>
+                <a:lin ang="5400000" scaled="1"/>
+              </a:gradFill>
+              <a:prstDash val="dash"/>
+            </a:ln>
+          </p:spPr>
+          <p:style>
+            <a:lnRef idx="2">
+              <a:schemeClr val="accent1">
+                <a:shade val="50000"/>
+              </a:schemeClr>
+            </a:lnRef>
+            <a:fillRef idx="1">
+              <a:schemeClr val="accent1"/>
+            </a:fillRef>
+            <a:effectRef idx="0">
+              <a:schemeClr val="accent1"/>
+            </a:effectRef>
+            <a:fontRef idx="minor">
+              <a:schemeClr val="lt1"/>
+            </a:fontRef>
+          </p:style>
+          <p:txBody>
+            <a:bodyPr wrap="square" rtlCol="0" anchor="ctr">
+              <a:normAutofit/>
+            </a:bodyPr>
+            <a:lstStyle/>
+            <a:p>
+              <a:pPr algn="ctr"/>
+              <a:endParaRPr lang="zh-CN" altLang="en-US"/>
+            </a:p>
+          </p:txBody>
+        </p:sp>
+        <p:sp>
+          <p:nvSpPr>
+            <p:cNvPr id="32" name="椭圆 31"/>
+            <p:cNvSpPr/>
+            <p:nvPr>
+              <p:custDataLst>
+                <p:tags r:id="rId22"/>
+              </p:custDataLst>
+            </p:nvPr>
+          </p:nvSpPr>
+          <p:spPr>
+            <a:xfrm rot="8029861">
+              <a:off x="3251827" y="548004"/>
+              <a:ext cx="5761990" cy="5761990"/>
+            </a:xfrm>
+            <a:prstGeom prst="ellipse">
+              <a:avLst/>
+            </a:prstGeom>
+            <a:noFill/>
+            <a:ln>
+              <a:gradFill>
+                <a:gsLst>
+                  <a:gs pos="0">
+                    <a:schemeClr val="accent1">
+                      <a:alpha val="70000"/>
+                    </a:schemeClr>
+                  </a:gs>
+                  <a:gs pos="4000">
+                    <a:schemeClr val="accent1">
+                      <a:alpha val="0"/>
+                    </a:schemeClr>
+                  </a:gs>
+                </a:gsLst>
+                <a:lin ang="5400000" scaled="1"/>
+              </a:gradFill>
+              <a:prstDash val="dash"/>
+            </a:ln>
+          </p:spPr>
+          <p:style>
+            <a:lnRef idx="2">
+              <a:schemeClr val="accent1">
+                <a:shade val="50000"/>
+              </a:schemeClr>
+            </a:lnRef>
+            <a:fillRef idx="1">
+              <a:schemeClr val="accent1"/>
+            </a:fillRef>
+            <a:effectRef idx="0">
+              <a:schemeClr val="accent1"/>
+            </a:effectRef>
+            <a:fontRef idx="minor">
+              <a:schemeClr val="lt1"/>
+            </a:fontRef>
+          </p:style>
+          <p:txBody>
+            <a:bodyPr wrap="square" rtlCol="0" anchor="ctr">
+              <a:normAutofit/>
+            </a:bodyPr>
+            <a:lstStyle/>
+            <a:p>
+              <a:pPr algn="ctr"/>
+              <a:endParaRPr lang="zh-CN" altLang="en-US"/>
+            </a:p>
+          </p:txBody>
+        </p:sp>
+        <p:sp>
+          <p:nvSpPr>
+            <p:cNvPr id="33" name="椭圆 32"/>
+            <p:cNvSpPr/>
+            <p:nvPr>
+              <p:custDataLst>
+                <p:tags r:id="rId23"/>
+              </p:custDataLst>
+            </p:nvPr>
+          </p:nvSpPr>
+          <p:spPr>
+            <a:xfrm rot="8029861" flipV="1">
+              <a:off x="3251828" y="548005"/>
+              <a:ext cx="5761990" cy="5761990"/>
+            </a:xfrm>
+            <a:prstGeom prst="ellipse">
+              <a:avLst/>
+            </a:prstGeom>
+            <a:noFill/>
+            <a:ln>
+              <a:gradFill>
+                <a:gsLst>
+                  <a:gs pos="0">
+                    <a:schemeClr val="accent1">
+                      <a:alpha val="70000"/>
+                    </a:schemeClr>
+                  </a:gs>
+                  <a:gs pos="4000">
+                    <a:schemeClr val="accent1">
+                      <a:alpha val="0"/>
+                    </a:schemeClr>
+                  </a:gs>
+                </a:gsLst>
+                <a:lin ang="5400000" scaled="1"/>
+              </a:gradFill>
+              <a:prstDash val="dash"/>
+            </a:ln>
+          </p:spPr>
+          <p:style>
+            <a:lnRef idx="2">
+              <a:schemeClr val="accent1">
+                <a:shade val="50000"/>
+              </a:schemeClr>
+            </a:lnRef>
+            <a:fillRef idx="1">
+              <a:schemeClr val="accent1"/>
+            </a:fillRef>
+            <a:effectRef idx="0">
+              <a:schemeClr val="accent1"/>
+            </a:effectRef>
+            <a:fontRef idx="minor">
+              <a:schemeClr val="lt1"/>
+            </a:fontRef>
+          </p:style>
+          <p:txBody>
+            <a:bodyPr wrap="square" rtlCol="0" anchor="ctr">
+              <a:normAutofit/>
+            </a:bodyPr>
+            <a:lstStyle/>
+            <a:p>
+              <a:pPr algn="ctr"/>
+              <a:endParaRPr lang="zh-CN" altLang="en-US" dirty="0"/>
+            </a:p>
+          </p:txBody>
+        </p:sp>
+      </p:grpSp>
+      <p:sp>
+        <p:nvSpPr>
+          <p:cNvPr id="14" name="椭圆 13"/>
+          <p:cNvSpPr/>
+          <p:nvPr/>
+        </p:nvSpPr>
+        <p:spPr>
+          <a:xfrm>
+            <a:off x="4901171" y="2802166"/>
+            <a:ext cx="2273907" cy="2273908"/>
+          </a:xfrm>
+          <a:prstGeom prst="ellipse">
+            <a:avLst/>
+          </a:prstGeom>
+          <a:noFill/>
+          <a:ln cap="rnd">
+            <a:gradFill flip="none" rotWithShape="1">
+              <a:gsLst>
+                <a:gs pos="10000">
+                  <a:schemeClr val="accent1">
+                    <a:lumMod val="60000"/>
+                    <a:lumOff val="40000"/>
+                    <a:alpha val="0"/>
+                  </a:schemeClr>
+                </a:gs>
+                <a:gs pos="49000">
+                  <a:schemeClr val="accent1">
+                    <a:lumMod val="60000"/>
+                    <a:lumOff val="40000"/>
+                  </a:schemeClr>
+                </a:gs>
+              </a:gsLst>
+              <a:lin ang="0" scaled="1"/>
+              <a:tileRect/>
+            </a:gradFill>
+            <a:prstDash val="solid"/>
+          </a:ln>
+        </p:spPr>
+        <p:style>
+          <a:lnRef idx="2">
+            <a:schemeClr val="accent1">
+              <a:shade val="50000"/>
+            </a:schemeClr>
+          </a:lnRef>
+          <a:fillRef idx="1">
+            <a:schemeClr val="accent1"/>
+          </a:fillRef>
+          <a:effectRef idx="0">
+            <a:schemeClr val="accent1"/>
+          </a:effectRef>
+          <a:fontRef idx="minor">
+            <a:schemeClr val="lt1"/>
+          </a:fontRef>
+        </p:style>
+        <p:txBody>
+          <a:bodyPr wrap="square" rtlCol="0" anchor="ctr">
+            <a:normAutofit/>
+          </a:bodyPr>
+          <a:lstStyle/>
+          <a:p>
+            <a:pPr algn="ctr"/>
+            <a:endParaRPr lang="zh-CN" altLang="en-US">
+              <a:latin typeface="+mj-ea"/>
+              <a:ea typeface="+mj-ea"/>
+            </a:endParaRPr>
+          </a:p>
+        </p:txBody>
+      </p:sp>
+      <p:sp>
+        <p:nvSpPr>
+          <p:cNvPr id="16" name="圆: 空心 15"/>
+          <p:cNvSpPr/>
+          <p:nvPr/>
+        </p:nvSpPr>
+        <p:spPr>
+          <a:xfrm>
+            <a:off x="4329897" y="2226823"/>
+            <a:ext cx="3416456" cy="3416457"/>
+          </a:xfrm>
+          <a:prstGeom prst="donut">
+            <a:avLst>
+              <a:gd name="adj" fmla="val 8088"/>
+            </a:avLst>
+          </a:prstGeom>
+          <a:gradFill>
+            <a:gsLst>
+              <a:gs pos="0">
+                <a:schemeClr val="accent1">
+                  <a:lumMod val="30000"/>
+                  <a:lumOff val="70000"/>
+                  <a:alpha val="44000"/>
+                </a:schemeClr>
+              </a:gs>
+              <a:gs pos="100000">
+                <a:schemeClr val="accent1">
+                  <a:lumMod val="20000"/>
+                  <a:lumOff val="80000"/>
+                  <a:alpha val="0"/>
+                </a:schemeClr>
+              </a:gs>
+            </a:gsLst>
+            <a:lin ang="18900000" scaled="1"/>
+          </a:gradFill>
           <a:ln>
             <a:noFill/>
           </a:ln>
@@ -11995,34 +12486,1308 @@
           </a:fontRef>
         </p:style>
         <p:txBody>
-          <a:bodyPr rtlCol="0" anchor="ctr"/>
+          <a:bodyPr wrap="square" rtlCol="0" anchor="ctr">
+            <a:normAutofit/>
+          </a:bodyPr>
           <a:lstStyle/>
           <a:p>
             <a:pPr algn="ctr"/>
-            <a:endParaRPr lang="zh-CN" altLang="en-US"/>
-          </a:p>
-        </p:txBody>
-      </p:sp>
-      <p:sp>
-        <p:nvSpPr>
-          <p:cNvPr id="2" name="标题">
+            <a:endParaRPr lang="zh-CN" altLang="en-US" dirty="0">
+              <a:solidFill>
+                <a:schemeClr val="tx1"/>
+              </a:solidFill>
+              <a:latin typeface="+mj-ea"/>
+              <a:ea typeface="+mj-ea"/>
+            </a:endParaRPr>
+          </a:p>
+        </p:txBody>
+      </p:sp>
+      <p:sp>
+        <p:nvSpPr>
+          <p:cNvPr id="15" name="椭圆 14"/>
+          <p:cNvSpPr/>
+          <p:nvPr/>
+        </p:nvSpPr>
+        <p:spPr>
+          <a:xfrm>
+            <a:off x="4608427" y="2509422"/>
+            <a:ext cx="2859396" cy="2859397"/>
+          </a:xfrm>
+          <a:prstGeom prst="ellipse">
+            <a:avLst/>
+          </a:prstGeom>
+          <a:gradFill rotWithShape="1">
+            <a:gsLst>
+              <a:gs pos="0">
+                <a:srgbClr val="EEFFFD"/>
+              </a:gs>
+              <a:gs pos="100000">
+                <a:srgbClr val="00BCA7"/>
+              </a:gs>
+            </a:gsLst>
+            <a:lin scaled="0" ang="16200000"/>
+          </a:gradFill>
+          <a:ln>
+            <a:noFill/>
+          </a:ln>
+          <a:effectLst>
+            <a:outerShdw blurRad="368300" dist="127000" dir="2400000" sx="98000" sy="98000" algn="tl" rotWithShape="0">
+              <a:schemeClr val="accent1">
+                <a:alpha val="40000"/>
+              </a:schemeClr>
+            </a:outerShdw>
+          </a:effectLst>
+        </p:spPr>
+        <p:style>
+          <a:lnRef idx="2">
+            <a:schemeClr val="accent1">
+              <a:shade val="50000"/>
+            </a:schemeClr>
+          </a:lnRef>
+          <a:fillRef idx="1">
+            <a:schemeClr val="accent1"/>
+          </a:fillRef>
+          <a:effectRef idx="0">
+            <a:schemeClr val="accent1"/>
+          </a:effectRef>
+          <a:fontRef idx="minor">
+            <a:schemeClr val="lt1"/>
+          </a:fontRef>
+        </p:style>
+        <p:txBody>
+          <a:bodyPr wrap="square" rtlCol="0" anchor="ctr">
+            <a:normAutofit/>
+          </a:bodyPr>
+          <a:lstStyle/>
+          <a:p>
+            <a:pPr algn="ctr"/>
+            <a:endParaRPr lang="zh-CN" altLang="en-US">
+              <a:latin typeface="+mj-ea"/>
+              <a:ea typeface="+mj-ea"/>
+            </a:endParaRPr>
+          </a:p>
+        </p:txBody>
+      </p:sp>
+      <p:sp>
+        <p:nvSpPr>
+          <p:cNvPr id="64" name="椭圆 63"/>
+          <p:cNvSpPr/>
+          <p:nvPr/>
+        </p:nvSpPr>
+        <p:spPr>
+          <a:xfrm>
+            <a:off x="5121258" y="3022253"/>
+            <a:ext cx="1833734" cy="1833735"/>
+          </a:xfrm>
+          <a:prstGeom prst="ellipse">
+            <a:avLst/>
+          </a:prstGeom>
+          <a:gradFill rotWithShape="1">
+            <a:gsLst>
+              <a:gs pos="0">
+                <a:srgbClr val="EEFFFD"/>
+              </a:gs>
+              <a:gs pos="100000">
+                <a:srgbClr val="00BCA7"/>
+              </a:gs>
+            </a:gsLst>
+            <a:lin scaled="0" ang="16200000"/>
+          </a:gradFill>
+          <a:ln>
+            <a:noFill/>
+          </a:ln>
+          <a:effectLst>
+            <a:outerShdw blurRad="368300" dist="127000" dir="2400000" sx="98000" sy="98000" algn="tl" rotWithShape="0">
+              <a:schemeClr val="accent1">
+                <a:alpha val="40000"/>
+              </a:schemeClr>
+            </a:outerShdw>
+          </a:effectLst>
+        </p:spPr>
+        <p:style>
+          <a:lnRef idx="2">
+            <a:schemeClr val="accent1">
+              <a:shade val="50000"/>
+            </a:schemeClr>
+          </a:lnRef>
+          <a:fillRef idx="1">
+            <a:schemeClr val="accent1"/>
+          </a:fillRef>
+          <a:effectRef idx="0">
+            <a:schemeClr val="accent1"/>
+          </a:effectRef>
+          <a:fontRef idx="minor">
+            <a:schemeClr val="lt1"/>
+          </a:fontRef>
+        </p:style>
+        <p:txBody>
+          <a:bodyPr wrap="square" rtlCol="0" anchor="ctr">
+            <a:normAutofit/>
+          </a:bodyPr>
+          <a:lstStyle/>
+          <a:p>
+            <a:pPr algn="ctr"/>
+            <a:endParaRPr lang="zh-CN" altLang="en-US" dirty="0">
+              <a:latin typeface="+mj-ea"/>
+              <a:ea typeface="+mj-ea"/>
+            </a:endParaRPr>
+          </a:p>
+        </p:txBody>
+      </p:sp>
+      <p:sp>
+        <p:nvSpPr>
+          <p:cNvPr id="4" name="rectangle-11">
             <a:extLst>
               <a:ext uri="{FF2B5EF4-FFF2-40B4-BE49-F238E27FC236}">
-                <a16:creationId xmlns:a16="http://schemas.microsoft.com/office/drawing/2014/main" id="{E5B56C06-2655-1113-F2B8-349BD84B478D}"/>
+                <a16:creationId xmlns:a16="http://schemas.microsoft.com/office/drawing/2014/main" id="{43AA78A2-EB75-3C3A-1DC1-5E2750AAA6D0}"/>
+              </a:ext>
+            </a:extLst>
+          </p:cNvPr>
+          <p:cNvSpPr/>
+          <p:nvPr/>
+        </p:nvSpPr>
+        <p:spPr>
+          <a:xfrm>
+            <a:off x="2613922" y="2968722"/>
+            <a:ext cx="1724527" cy="523217"/>
+          </a:xfrm>
+          <a:prstGeom prst="roundRect">
+            <a:avLst>
+              <a:gd name="adj" fmla="val 50000"/>
+            </a:avLst>
+          </a:prstGeom>
+          <a:gradFill rotWithShape="1">
+            <a:gsLst>
+              <a:gs pos="0">
+                <a:srgbClr val="EEFFFD"/>
+              </a:gs>
+              <a:gs pos="100000">
+                <a:srgbClr val="00BCA7"/>
+              </a:gs>
+            </a:gsLst>
+            <a:lin scaled="0" ang="16200000"/>
+          </a:gradFill>
+          <a:ln>
+            <a:noFill/>
+          </a:ln>
+          <a:effectLst>
+            <a:outerShdw blurRad="292100" dist="76200" dir="2700000" sx="98000" sy="98000" algn="tl" rotWithShape="0">
+              <a:schemeClr val="accent1">
+                <a:alpha val="28000"/>
+              </a:schemeClr>
+            </a:outerShdw>
+          </a:effectLst>
+        </p:spPr>
+        <p:style>
+          <a:lnRef idx="2">
+            <a:schemeClr val="accent1">
+              <a:shade val="50000"/>
+            </a:schemeClr>
+          </a:lnRef>
+          <a:fillRef idx="1">
+            <a:schemeClr val="accent1"/>
+          </a:fillRef>
+          <a:effectRef idx="0">
+            <a:schemeClr val="accent1"/>
+          </a:effectRef>
+          <a:fontRef idx="minor">
+            <a:schemeClr val="lt1"/>
+          </a:fontRef>
+        </p:style>
+        <p:txBody>
+          <a:bodyPr wrap="square" rtlCol="0" anchor="ctr">
+            <a:noAutofit/>
+          </a:bodyPr>
+          <a:lstStyle/>
+          <a:p>
+            <a:pPr algn="ctr"/>
+            <a:endParaRPr lang="zh-CN" altLang="en-US" sz="1600">
+              <a:solidFill>
+                <a:schemeClr val="tx2"/>
+              </a:solidFill>
+              <a:latin typeface="+mj-ea"/>
+              <a:ea typeface="+mj-ea"/>
+            </a:endParaRPr>
+          </a:p>
+        </p:txBody>
+      </p:sp>
+      <p:sp>
+        <p:nvSpPr>
+          <p:cNvPr id="6" name="关键词2">
+            <a:extLst>
+              <a:ext uri="{FF2B5EF4-FFF2-40B4-BE49-F238E27FC236}">
+                <a16:creationId xmlns:a16="http://schemas.microsoft.com/office/drawing/2014/main" id="{4BB0C31B-42C8-F7BD-78C2-F31AB343E817}"/>
+              </a:ext>
+            </a:extLst>
+          </p:cNvPr>
+          <p:cNvSpPr/>
+          <p:nvPr>
+            <p:custDataLst>
+              <p:tags r:id="rId3"/>
+            </p:custDataLst>
+          </p:nvPr>
+        </p:nvSpPr>
+        <p:spPr>
+          <a:xfrm>
+            <a:off x="2796584" y="3037584"/>
+            <a:ext cx="1359201" cy="385492"/>
+          </a:xfrm>
+          <a:prstGeom prst="rect">
+            <a:avLst/>
+          </a:prstGeom>
+          <a:noFill/>
+          <a:ln>
+            <a:noFill/>
+          </a:ln>
+          <a:effectLst>
+            <a:outerShdw blurRad="292100" dist="76200" dir="2700000" sx="98000" sy="98000" algn="tl" rotWithShape="0">
+              <a:schemeClr val="accent1">
+                <a:alpha val="28000"/>
+              </a:schemeClr>
+            </a:outerShdw>
+          </a:effectLst>
+        </p:spPr>
+        <p:style>
+          <a:lnRef idx="2">
+            <a:schemeClr val="accent1">
+              <a:shade val="50000"/>
+            </a:schemeClr>
+          </a:lnRef>
+          <a:fillRef idx="1">
+            <a:schemeClr val="accent1"/>
+          </a:fillRef>
+          <a:effectRef idx="0">
+            <a:schemeClr val="accent1"/>
+          </a:effectRef>
+          <a:fontRef idx="minor">
+            <a:schemeClr val="lt1"/>
+          </a:fontRef>
+        </p:style>
+        <p:txBody>
+          <a:bodyPr wrap="square" rtlCol="0" anchor="ctr">
+            <a:normAutofit fontScale="85000" lnSpcReduction="10000"/>
+          </a:bodyPr>
+          <a:lstStyle/>
+          <a:p>
+            <a:pPr algn="ctr">
+              <a:lnSpc>
+                <a:spcPct val="120000"/>
+              </a:lnSpc>
+            </a:pPr>
+            <a:r>
+              <a:rPr lang="zh-CN" altLang="en-US" sz="1600">
+                <a:solidFill>
+                  <a:srgbClr val="00584E"/>
+                </a:solidFill>
+                <a:latin typeface="+mj-ea"/>
+                <a:ea typeface="+mj-ea"/>
+                <a:sym typeface="思源黑体 CN" panose="020B0500000000000000" pitchFamily="34" charset="-122"/>
+              </a:rPr>
+              <a:t> 商业模式创新</a:t>
+            </a:r>
+            <a:endParaRPr lang="zh-CN" altLang="en-US" sz="1600" dirty="0">
+              <a:solidFill>
+                <a:schemeClr val="tx2"/>
+              </a:solidFill>
+              <a:latin typeface="+mj-ea"/>
+              <a:ea typeface="+mj-ea"/>
+              <a:sym typeface="思源黑体 CN" panose="020B0500000000000000" pitchFamily="34" charset="-122"/>
+            </a:endParaRPr>
+          </a:p>
+        </p:txBody>
+      </p:sp>
+      <p:sp>
+        <p:nvSpPr>
+          <p:cNvPr id="7" name="rectangle-11">
+            <a:extLst>
+              <a:ext uri="{FF2B5EF4-FFF2-40B4-BE49-F238E27FC236}">
+                <a16:creationId xmlns:a16="http://schemas.microsoft.com/office/drawing/2014/main" id="{C185B8D2-3554-5DEE-5821-745570AE06E4}"/>
+              </a:ext>
+            </a:extLst>
+          </p:cNvPr>
+          <p:cNvSpPr/>
+          <p:nvPr/>
+        </p:nvSpPr>
+        <p:spPr>
+          <a:xfrm>
+            <a:off x="2605369" y="4280982"/>
+            <a:ext cx="1724527" cy="523217"/>
+          </a:xfrm>
+          <a:prstGeom prst="roundRect">
+            <a:avLst>
+              <a:gd name="adj" fmla="val 50000"/>
+            </a:avLst>
+          </a:prstGeom>
+          <a:gradFill rotWithShape="1">
+            <a:gsLst>
+              <a:gs pos="0">
+                <a:srgbClr val="EEFFFD"/>
+              </a:gs>
+              <a:gs pos="100000">
+                <a:srgbClr val="00BCA7"/>
+              </a:gs>
+            </a:gsLst>
+            <a:lin scaled="0" ang="16200000"/>
+          </a:gradFill>
+          <a:ln>
+            <a:noFill/>
+          </a:ln>
+          <a:effectLst>
+            <a:outerShdw blurRad="292100" dist="76200" dir="2700000" sx="98000" sy="98000" algn="tl" rotWithShape="0">
+              <a:schemeClr val="accent1">
+                <a:alpha val="28000"/>
+              </a:schemeClr>
+            </a:outerShdw>
+          </a:effectLst>
+        </p:spPr>
+        <p:style>
+          <a:lnRef idx="2">
+            <a:schemeClr val="accent1">
+              <a:shade val="50000"/>
+            </a:schemeClr>
+          </a:lnRef>
+          <a:fillRef idx="1">
+            <a:schemeClr val="accent1"/>
+          </a:fillRef>
+          <a:effectRef idx="0">
+            <a:schemeClr val="accent1"/>
+          </a:effectRef>
+          <a:fontRef idx="minor">
+            <a:schemeClr val="lt1"/>
+          </a:fontRef>
+        </p:style>
+        <p:txBody>
+          <a:bodyPr wrap="square" rtlCol="0" anchor="ctr">
+            <a:noAutofit/>
+          </a:bodyPr>
+          <a:lstStyle/>
+          <a:p>
+            <a:pPr algn="ctr"/>
+            <a:endParaRPr lang="zh-CN" altLang="en-US" sz="1600">
+              <a:solidFill>
+                <a:schemeClr val="tx2"/>
+              </a:solidFill>
+              <a:latin typeface="+mj-ea"/>
+              <a:ea typeface="+mj-ea"/>
+            </a:endParaRPr>
+          </a:p>
+        </p:txBody>
+      </p:sp>
+      <p:sp>
+        <p:nvSpPr>
+          <p:cNvPr id="8" name="关键词3">
+            <a:extLst>
+              <a:ext uri="{FF2B5EF4-FFF2-40B4-BE49-F238E27FC236}">
+                <a16:creationId xmlns:a16="http://schemas.microsoft.com/office/drawing/2014/main" id="{0860085C-B7A6-2D6E-B8D3-99470D3E887A}"/>
+              </a:ext>
+            </a:extLst>
+          </p:cNvPr>
+          <p:cNvSpPr/>
+          <p:nvPr>
+            <p:custDataLst>
+              <p:tags r:id="rId4"/>
+            </p:custDataLst>
+          </p:nvPr>
+        </p:nvSpPr>
+        <p:spPr>
+          <a:xfrm>
+            <a:off x="2788031" y="4349844"/>
+            <a:ext cx="1359201" cy="385492"/>
+          </a:xfrm>
+          <a:prstGeom prst="rect">
+            <a:avLst/>
+          </a:prstGeom>
+          <a:noFill/>
+          <a:ln>
+            <a:noFill/>
+          </a:ln>
+          <a:effectLst>
+            <a:outerShdw blurRad="292100" dist="76200" dir="2700000" sx="98000" sy="98000" algn="tl" rotWithShape="0">
+              <a:schemeClr val="accent1">
+                <a:alpha val="28000"/>
+              </a:schemeClr>
+            </a:outerShdw>
+          </a:effectLst>
+        </p:spPr>
+        <p:style>
+          <a:lnRef idx="2">
+            <a:schemeClr val="accent1">
+              <a:shade val="50000"/>
+            </a:schemeClr>
+          </a:lnRef>
+          <a:fillRef idx="1">
+            <a:schemeClr val="accent1"/>
+          </a:fillRef>
+          <a:effectRef idx="0">
+            <a:schemeClr val="accent1"/>
+          </a:effectRef>
+          <a:fontRef idx="minor">
+            <a:schemeClr val="lt1"/>
+          </a:fontRef>
+        </p:style>
+        <p:txBody>
+          <a:bodyPr wrap="square" rtlCol="0" anchor="ctr">
+            <a:normAutofit fontScale="77500" lnSpcReduction="20000"/>
+          </a:bodyPr>
+          <a:lstStyle/>
+          <a:p>
+            <a:pPr algn="ctr">
+              <a:lnSpc>
+                <a:spcPct val="120000"/>
+              </a:lnSpc>
+            </a:pPr>
+            <a:r>
+              <a:rPr lang="zh-CN" altLang="en-US" sz="1600">
+                <a:solidFill>
+                  <a:srgbClr val="00584E"/>
+                </a:solidFill>
+                <a:latin typeface="+mj-ea"/>
+                <a:ea typeface="+mj-ea"/>
+                <a:sym typeface="思源黑体 CN" panose="020B0500000000000000" pitchFamily="34" charset="-122"/>
+              </a:rPr>
+              <a:t> 人力和物质资源</a:t>
+            </a:r>
+            <a:endParaRPr lang="zh-CN" altLang="en-US" sz="1600" dirty="0">
+              <a:solidFill>
+                <a:schemeClr val="tx2"/>
+              </a:solidFill>
+              <a:latin typeface="+mj-ea"/>
+              <a:ea typeface="+mj-ea"/>
+              <a:sym typeface="思源黑体 CN" panose="020B0500000000000000" pitchFamily="34" charset="-122"/>
+            </a:endParaRPr>
+          </a:p>
+        </p:txBody>
+      </p:sp>
+      <p:sp>
+        <p:nvSpPr>
+          <p:cNvPr id="10" name="rectangle-11">
+            <a:extLst>
+              <a:ext uri="{FF2B5EF4-FFF2-40B4-BE49-F238E27FC236}">
+                <a16:creationId xmlns:a16="http://schemas.microsoft.com/office/drawing/2014/main" id="{55226C50-7C7D-DDF1-FC06-D187E4676B18}"/>
+              </a:ext>
+            </a:extLst>
+          </p:cNvPr>
+          <p:cNvSpPr/>
+          <p:nvPr/>
+        </p:nvSpPr>
+        <p:spPr>
+          <a:xfrm>
+            <a:off x="3368739" y="5494131"/>
+            <a:ext cx="1724527" cy="523217"/>
+          </a:xfrm>
+          <a:prstGeom prst="roundRect">
+            <a:avLst>
+              <a:gd name="adj" fmla="val 50000"/>
+            </a:avLst>
+          </a:prstGeom>
+          <a:gradFill rotWithShape="1">
+            <a:gsLst>
+              <a:gs pos="0">
+                <a:srgbClr val="EEFFFD"/>
+              </a:gs>
+              <a:gs pos="100000">
+                <a:srgbClr val="00BCA7"/>
+              </a:gs>
+            </a:gsLst>
+            <a:lin scaled="0" ang="16200000"/>
+          </a:gradFill>
+          <a:ln>
+            <a:noFill/>
+          </a:ln>
+          <a:effectLst>
+            <a:outerShdw blurRad="292100" dist="76200" dir="2700000" sx="98000" sy="98000" algn="tl" rotWithShape="0">
+              <a:schemeClr val="accent1">
+                <a:alpha val="28000"/>
+              </a:schemeClr>
+            </a:outerShdw>
+          </a:effectLst>
+        </p:spPr>
+        <p:style>
+          <a:lnRef idx="2">
+            <a:schemeClr val="accent1">
+              <a:shade val="50000"/>
+            </a:schemeClr>
+          </a:lnRef>
+          <a:fillRef idx="1">
+            <a:schemeClr val="accent1"/>
+          </a:fillRef>
+          <a:effectRef idx="0">
+            <a:schemeClr val="accent1"/>
+          </a:effectRef>
+          <a:fontRef idx="minor">
+            <a:schemeClr val="lt1"/>
+          </a:fontRef>
+        </p:style>
+        <p:txBody>
+          <a:bodyPr wrap="square" rtlCol="0" anchor="ctr">
+            <a:noAutofit/>
+          </a:bodyPr>
+          <a:lstStyle/>
+          <a:p>
+            <a:pPr algn="ctr"/>
+            <a:endParaRPr lang="zh-CN" altLang="en-US" sz="1600">
+              <a:solidFill>
+                <a:schemeClr val="tx2"/>
+              </a:solidFill>
+              <a:latin typeface="+mj-ea"/>
+              <a:ea typeface="+mj-ea"/>
+            </a:endParaRPr>
+          </a:p>
+        </p:txBody>
+      </p:sp>
+      <p:sp>
+        <p:nvSpPr>
+          <p:cNvPr id="17" name="关键词4">
+            <a:extLst>
+              <a:ext uri="{FF2B5EF4-FFF2-40B4-BE49-F238E27FC236}">
+                <a16:creationId xmlns:a16="http://schemas.microsoft.com/office/drawing/2014/main" id="{387E0130-1CE9-7BD8-64F9-818C93B41176}"/>
+              </a:ext>
+            </a:extLst>
+          </p:cNvPr>
+          <p:cNvSpPr/>
+          <p:nvPr>
+            <p:custDataLst>
+              <p:tags r:id="rId5"/>
+            </p:custDataLst>
+          </p:nvPr>
+        </p:nvSpPr>
+        <p:spPr>
+          <a:xfrm>
+            <a:off x="3551401" y="5562993"/>
+            <a:ext cx="1359201" cy="385492"/>
+          </a:xfrm>
+          <a:prstGeom prst="rect">
+            <a:avLst/>
+          </a:prstGeom>
+          <a:noFill/>
+          <a:ln>
+            <a:noFill/>
+          </a:ln>
+          <a:effectLst>
+            <a:outerShdw blurRad="292100" dist="76200" dir="2700000" sx="98000" sy="98000" algn="tl" rotWithShape="0">
+              <a:schemeClr val="accent1">
+                <a:alpha val="28000"/>
+              </a:schemeClr>
+            </a:outerShdw>
+          </a:effectLst>
+        </p:spPr>
+        <p:style>
+          <a:lnRef idx="2">
+            <a:schemeClr val="accent1">
+              <a:shade val="50000"/>
+            </a:schemeClr>
+          </a:lnRef>
+          <a:fillRef idx="1">
+            <a:schemeClr val="accent1"/>
+          </a:fillRef>
+          <a:effectRef idx="0">
+            <a:schemeClr val="accent1"/>
+          </a:effectRef>
+          <a:fontRef idx="minor">
+            <a:schemeClr val="lt1"/>
+          </a:fontRef>
+        </p:style>
+        <p:txBody>
+          <a:bodyPr wrap="square" rtlCol="0" anchor="ctr">
+            <a:normAutofit/>
+          </a:bodyPr>
+          <a:lstStyle/>
+          <a:p>
+            <a:pPr algn="ctr">
+              <a:lnSpc>
+                <a:spcPct val="120000"/>
+              </a:lnSpc>
+            </a:pPr>
+            <a:r>
+              <a:rPr lang="zh-CN" altLang="en-US" sz="1600">
+                <a:solidFill>
+                  <a:srgbClr val="00584E"/>
+                </a:solidFill>
+                <a:latin typeface="+mj-ea"/>
+                <a:ea typeface="+mj-ea"/>
+                <a:sym typeface="思源黑体 CN" panose="020B0500000000000000" pitchFamily="34" charset="-122"/>
+              </a:rPr>
+              <a:t> 技术</a:t>
+            </a:r>
+            <a:endParaRPr lang="zh-CN" altLang="en-US" sz="1600" dirty="0">
+              <a:solidFill>
+                <a:schemeClr val="tx2"/>
+              </a:solidFill>
+              <a:latin typeface="+mj-ea"/>
+              <a:ea typeface="+mj-ea"/>
+              <a:sym typeface="思源黑体 CN" panose="020B0500000000000000" pitchFamily="34" charset="-122"/>
+            </a:endParaRPr>
+          </a:p>
+        </p:txBody>
+      </p:sp>
+      <p:sp>
+        <p:nvSpPr>
+          <p:cNvPr id="18" name="rectangle-11">
+            <a:extLst>
+              <a:ext uri="{FF2B5EF4-FFF2-40B4-BE49-F238E27FC236}">
+                <a16:creationId xmlns:a16="http://schemas.microsoft.com/office/drawing/2014/main" id="{B16FA4BE-D49D-E8E4-B547-6ADB6D6B540B}"/>
+              </a:ext>
+            </a:extLst>
+          </p:cNvPr>
+          <p:cNvSpPr/>
+          <p:nvPr/>
+        </p:nvSpPr>
+        <p:spPr>
+          <a:xfrm>
+            <a:off x="6789120" y="1809104"/>
+            <a:ext cx="1724527" cy="523217"/>
+          </a:xfrm>
+          <a:prstGeom prst="roundRect">
+            <a:avLst>
+              <a:gd name="adj" fmla="val 50000"/>
+            </a:avLst>
+          </a:prstGeom>
+          <a:gradFill rotWithShape="1">
+            <a:gsLst>
+              <a:gs pos="0">
+                <a:srgbClr val="EEFFFD"/>
+              </a:gs>
+              <a:gs pos="100000">
+                <a:srgbClr val="00BCA7"/>
+              </a:gs>
+            </a:gsLst>
+            <a:lin scaled="0" ang="16200000"/>
+          </a:gradFill>
+          <a:ln>
+            <a:noFill/>
+          </a:ln>
+          <a:effectLst>
+            <a:outerShdw blurRad="292100" dist="76200" dir="2700000" sx="98000" sy="98000" algn="tl" rotWithShape="0">
+              <a:schemeClr val="accent1">
+                <a:alpha val="28000"/>
+              </a:schemeClr>
+            </a:outerShdw>
+          </a:effectLst>
+        </p:spPr>
+        <p:style>
+          <a:lnRef idx="2">
+            <a:schemeClr val="accent1">
+              <a:shade val="50000"/>
+            </a:schemeClr>
+          </a:lnRef>
+          <a:fillRef idx="1">
+            <a:schemeClr val="accent1"/>
+          </a:fillRef>
+          <a:effectRef idx="0">
+            <a:schemeClr val="accent1"/>
+          </a:effectRef>
+          <a:fontRef idx="minor">
+            <a:schemeClr val="lt1"/>
+          </a:fontRef>
+        </p:style>
+        <p:txBody>
+          <a:bodyPr wrap="square" rtlCol="0" anchor="ctr">
+            <a:noAutofit/>
+          </a:bodyPr>
+          <a:lstStyle/>
+          <a:p>
+            <a:pPr algn="ctr"/>
+            <a:endParaRPr lang="zh-CN" altLang="en-US" sz="1600">
+              <a:solidFill>
+                <a:schemeClr val="tx2"/>
+              </a:solidFill>
+              <a:latin typeface="+mj-ea"/>
+              <a:ea typeface="+mj-ea"/>
+            </a:endParaRPr>
+          </a:p>
+        </p:txBody>
+      </p:sp>
+      <p:sp>
+        <p:nvSpPr>
+          <p:cNvPr id="19" name="关键词5">
+            <a:extLst>
+              <a:ext uri="{FF2B5EF4-FFF2-40B4-BE49-F238E27FC236}">
+                <a16:creationId xmlns:a16="http://schemas.microsoft.com/office/drawing/2014/main" id="{002EE750-2D0B-F14F-35F0-77BCA387AF01}"/>
+              </a:ext>
+            </a:extLst>
+          </p:cNvPr>
+          <p:cNvSpPr/>
+          <p:nvPr>
+            <p:custDataLst>
+              <p:tags r:id="rId6"/>
+            </p:custDataLst>
+          </p:nvPr>
+        </p:nvSpPr>
+        <p:spPr>
+          <a:xfrm>
+            <a:off x="6971782" y="1877966"/>
+            <a:ext cx="1359201" cy="385492"/>
+          </a:xfrm>
+          <a:prstGeom prst="rect">
+            <a:avLst/>
+          </a:prstGeom>
+          <a:noFill/>
+          <a:ln>
+            <a:noFill/>
+          </a:ln>
+          <a:effectLst>
+            <a:outerShdw blurRad="292100" dist="76200" dir="2700000" sx="98000" sy="98000" algn="tl" rotWithShape="0">
+              <a:schemeClr val="accent1">
+                <a:alpha val="28000"/>
+              </a:schemeClr>
+            </a:outerShdw>
+          </a:effectLst>
+        </p:spPr>
+        <p:style>
+          <a:lnRef idx="2">
+            <a:schemeClr val="accent1">
+              <a:shade val="50000"/>
+            </a:schemeClr>
+          </a:lnRef>
+          <a:fillRef idx="1">
+            <a:schemeClr val="accent1"/>
+          </a:fillRef>
+          <a:effectRef idx="0">
+            <a:schemeClr val="accent1"/>
+          </a:effectRef>
+          <a:fontRef idx="minor">
+            <a:schemeClr val="lt1"/>
+          </a:fontRef>
+        </p:style>
+        <p:txBody>
+          <a:bodyPr wrap="square" rtlCol="0" anchor="ctr">
+            <a:normAutofit fontScale="70000" lnSpcReduction="20000"/>
+          </a:bodyPr>
+          <a:lstStyle/>
+          <a:p>
+            <a:pPr algn="ctr">
+              <a:lnSpc>
+                <a:spcPct val="120000"/>
+              </a:lnSpc>
+            </a:pPr>
+            <a:r>
+              <a:rPr lang="zh-CN" altLang="en-US" sz="1600">
+                <a:solidFill>
+                  <a:srgbClr val="00584E"/>
+                </a:solidFill>
+                <a:latin typeface="+mj-ea"/>
+                <a:ea typeface="+mj-ea"/>
+                <a:sym typeface="思源黑体 CN" panose="020B0500000000000000" pitchFamily="34" charset="-122"/>
+              </a:rPr>
+              <a:t>数据和数字化手段</a:t>
+            </a:r>
+            <a:endParaRPr lang="zh-CN" altLang="en-US" sz="1600" dirty="0">
+              <a:solidFill>
+                <a:schemeClr val="tx2"/>
+              </a:solidFill>
+              <a:latin typeface="+mj-ea"/>
+              <a:ea typeface="+mj-ea"/>
+              <a:sym typeface="思源黑体 CN" panose="020B0500000000000000" pitchFamily="34" charset="-122"/>
+            </a:endParaRPr>
+          </a:p>
+        </p:txBody>
+      </p:sp>
+      <p:sp>
+        <p:nvSpPr>
+          <p:cNvPr id="20" name="rectangle-11">
+            <a:extLst>
+              <a:ext uri="{FF2B5EF4-FFF2-40B4-BE49-F238E27FC236}">
+                <a16:creationId xmlns:a16="http://schemas.microsoft.com/office/drawing/2014/main" id="{76696D11-645E-BAB0-9018-822F1A21CDA9}"/>
+              </a:ext>
+            </a:extLst>
+          </p:cNvPr>
+          <p:cNvSpPr/>
+          <p:nvPr/>
+        </p:nvSpPr>
+        <p:spPr>
+          <a:xfrm>
+            <a:off x="7808042" y="2989238"/>
+            <a:ext cx="1724527" cy="523217"/>
+          </a:xfrm>
+          <a:prstGeom prst="roundRect">
+            <a:avLst>
+              <a:gd name="adj" fmla="val 50000"/>
+            </a:avLst>
+          </a:prstGeom>
+          <a:gradFill rotWithShape="1">
+            <a:gsLst>
+              <a:gs pos="0">
+                <a:srgbClr val="EEFFFD"/>
+              </a:gs>
+              <a:gs pos="100000">
+                <a:srgbClr val="00BCA7"/>
+              </a:gs>
+            </a:gsLst>
+            <a:lin scaled="0" ang="16200000"/>
+          </a:gradFill>
+          <a:ln>
+            <a:noFill/>
+          </a:ln>
+          <a:effectLst>
+            <a:outerShdw blurRad="292100" dist="76200" dir="2700000" sx="98000" sy="98000" algn="tl" rotWithShape="0">
+              <a:schemeClr val="accent1">
+                <a:alpha val="28000"/>
+              </a:schemeClr>
+            </a:outerShdw>
+          </a:effectLst>
+        </p:spPr>
+        <p:style>
+          <a:lnRef idx="2">
+            <a:schemeClr val="accent1">
+              <a:shade val="50000"/>
+            </a:schemeClr>
+          </a:lnRef>
+          <a:fillRef idx="1">
+            <a:schemeClr val="accent1"/>
+          </a:fillRef>
+          <a:effectRef idx="0">
+            <a:schemeClr val="accent1"/>
+          </a:effectRef>
+          <a:fontRef idx="minor">
+            <a:schemeClr val="lt1"/>
+          </a:fontRef>
+        </p:style>
+        <p:txBody>
+          <a:bodyPr wrap="square" rtlCol="0" anchor="ctr">
+            <a:noAutofit/>
+          </a:bodyPr>
+          <a:lstStyle/>
+          <a:p>
+            <a:pPr algn="ctr"/>
+            <a:endParaRPr lang="zh-CN" altLang="en-US" sz="1600">
+              <a:solidFill>
+                <a:schemeClr val="tx2"/>
+              </a:solidFill>
+              <a:latin typeface="+mj-ea"/>
+              <a:ea typeface="+mj-ea"/>
+            </a:endParaRPr>
+          </a:p>
+        </p:txBody>
+      </p:sp>
+      <p:sp>
+        <p:nvSpPr>
+          <p:cNvPr id="21" name="关键词6">
+            <a:extLst>
+              <a:ext uri="{FF2B5EF4-FFF2-40B4-BE49-F238E27FC236}">
+                <a16:creationId xmlns:a16="http://schemas.microsoft.com/office/drawing/2014/main" id="{F89AD833-FE8A-CF56-C704-F3F4EB483DEE}"/>
+              </a:ext>
+            </a:extLst>
+          </p:cNvPr>
+          <p:cNvSpPr/>
+          <p:nvPr>
+            <p:custDataLst>
+              <p:tags r:id="rId7"/>
+            </p:custDataLst>
+          </p:nvPr>
+        </p:nvSpPr>
+        <p:spPr>
+          <a:xfrm>
+            <a:off x="7990704" y="3058100"/>
+            <a:ext cx="1359201" cy="385492"/>
+          </a:xfrm>
+          <a:prstGeom prst="rect">
+            <a:avLst/>
+          </a:prstGeom>
+          <a:noFill/>
+          <a:ln>
+            <a:noFill/>
+          </a:ln>
+          <a:effectLst>
+            <a:outerShdw blurRad="292100" dist="76200" dir="2700000" sx="98000" sy="98000" algn="tl" rotWithShape="0">
+              <a:schemeClr val="accent1">
+                <a:alpha val="28000"/>
+              </a:schemeClr>
+            </a:outerShdw>
+          </a:effectLst>
+        </p:spPr>
+        <p:style>
+          <a:lnRef idx="2">
+            <a:schemeClr val="accent1">
+              <a:shade val="50000"/>
+            </a:schemeClr>
+          </a:lnRef>
+          <a:fillRef idx="1">
+            <a:schemeClr val="accent1"/>
+          </a:fillRef>
+          <a:effectRef idx="0">
+            <a:schemeClr val="accent1"/>
+          </a:effectRef>
+          <a:fontRef idx="minor">
+            <a:schemeClr val="lt1"/>
+          </a:fontRef>
+        </p:style>
+        <p:txBody>
+          <a:bodyPr wrap="square" rtlCol="0" anchor="ctr">
+            <a:normAutofit/>
+          </a:bodyPr>
+          <a:lstStyle/>
+          <a:p>
+            <a:pPr algn="ctr">
+              <a:lnSpc>
+                <a:spcPct val="120000"/>
+              </a:lnSpc>
+            </a:pPr>
+            <a:r>
+              <a:rPr lang="zh-CN" altLang="en-US" sz="1600">
+                <a:solidFill>
+                  <a:srgbClr val="00584E"/>
+                </a:solidFill>
+                <a:latin typeface="+mj-ea"/>
+                <a:ea typeface="+mj-ea"/>
+                <a:sym typeface="思源黑体 CN" panose="020B0500000000000000" pitchFamily="34" charset="-122"/>
+              </a:rPr>
+              <a:t> 智能化生产</a:t>
+            </a:r>
+            <a:endParaRPr lang="zh-CN" altLang="en-US" sz="1600" dirty="0">
+              <a:solidFill>
+                <a:schemeClr val="tx2"/>
+              </a:solidFill>
+              <a:latin typeface="+mj-ea"/>
+              <a:ea typeface="+mj-ea"/>
+              <a:sym typeface="思源黑体 CN" panose="020B0500000000000000" pitchFamily="34" charset="-122"/>
+            </a:endParaRPr>
+          </a:p>
+        </p:txBody>
+      </p:sp>
+      <p:sp>
+        <p:nvSpPr>
+          <p:cNvPr id="22" name="rectangle-11">
+            <a:extLst>
+              <a:ext uri="{FF2B5EF4-FFF2-40B4-BE49-F238E27FC236}">
+                <a16:creationId xmlns:a16="http://schemas.microsoft.com/office/drawing/2014/main" id="{2C0C6246-ABCB-63CC-655B-8BD9D96CF9D2}"/>
+              </a:ext>
+            </a:extLst>
+          </p:cNvPr>
+          <p:cNvSpPr/>
+          <p:nvPr/>
+        </p:nvSpPr>
+        <p:spPr>
+          <a:xfrm>
+            <a:off x="7892922" y="4275087"/>
+            <a:ext cx="1724527" cy="523217"/>
+          </a:xfrm>
+          <a:prstGeom prst="roundRect">
+            <a:avLst>
+              <a:gd name="adj" fmla="val 50000"/>
+            </a:avLst>
+          </a:prstGeom>
+          <a:gradFill rotWithShape="1">
+            <a:gsLst>
+              <a:gs pos="0">
+                <a:srgbClr val="EEFFFD"/>
+              </a:gs>
+              <a:gs pos="100000">
+                <a:srgbClr val="00BCA7"/>
+              </a:gs>
+            </a:gsLst>
+            <a:lin scaled="0" ang="16200000"/>
+          </a:gradFill>
+          <a:ln>
+            <a:noFill/>
+          </a:ln>
+          <a:effectLst>
+            <a:outerShdw blurRad="292100" dist="76200" dir="2700000" sx="98000" sy="98000" algn="tl" rotWithShape="0">
+              <a:schemeClr val="accent1">
+                <a:alpha val="28000"/>
+              </a:schemeClr>
+            </a:outerShdw>
+          </a:effectLst>
+        </p:spPr>
+        <p:style>
+          <a:lnRef idx="2">
+            <a:schemeClr val="accent1">
+              <a:shade val="50000"/>
+            </a:schemeClr>
+          </a:lnRef>
+          <a:fillRef idx="1">
+            <a:schemeClr val="accent1"/>
+          </a:fillRef>
+          <a:effectRef idx="0">
+            <a:schemeClr val="accent1"/>
+          </a:effectRef>
+          <a:fontRef idx="minor">
+            <a:schemeClr val="lt1"/>
+          </a:fontRef>
+        </p:style>
+        <p:txBody>
+          <a:bodyPr wrap="square" rtlCol="0" anchor="ctr">
+            <a:noAutofit/>
+          </a:bodyPr>
+          <a:lstStyle/>
+          <a:p>
+            <a:pPr algn="ctr"/>
+            <a:endParaRPr lang="zh-CN" altLang="en-US" sz="1600">
+              <a:solidFill>
+                <a:schemeClr val="tx2"/>
+              </a:solidFill>
+              <a:latin typeface="+mj-ea"/>
+              <a:ea typeface="+mj-ea"/>
+            </a:endParaRPr>
+          </a:p>
+        </p:txBody>
+      </p:sp>
+      <p:sp>
+        <p:nvSpPr>
+          <p:cNvPr id="23" name="关键词7">
+            <a:extLst>
+              <a:ext uri="{FF2B5EF4-FFF2-40B4-BE49-F238E27FC236}">
+                <a16:creationId xmlns:a16="http://schemas.microsoft.com/office/drawing/2014/main" id="{D96FCEC7-1B4E-9391-8E6F-2922DE3329C0}"/>
+              </a:ext>
+            </a:extLst>
+          </p:cNvPr>
+          <p:cNvSpPr/>
+          <p:nvPr>
+            <p:custDataLst>
+              <p:tags r:id="rId8"/>
+            </p:custDataLst>
+          </p:nvPr>
+        </p:nvSpPr>
+        <p:spPr>
+          <a:xfrm>
+            <a:off x="8075584" y="4343949"/>
+            <a:ext cx="1359201" cy="385492"/>
+          </a:xfrm>
+          <a:prstGeom prst="rect">
+            <a:avLst/>
+          </a:prstGeom>
+          <a:noFill/>
+          <a:ln>
+            <a:noFill/>
+          </a:ln>
+          <a:effectLst>
+            <a:outerShdw blurRad="292100" dist="76200" dir="2700000" sx="98000" sy="98000" algn="tl" rotWithShape="0">
+              <a:schemeClr val="accent1">
+                <a:alpha val="28000"/>
+              </a:schemeClr>
+            </a:outerShdw>
+          </a:effectLst>
+        </p:spPr>
+        <p:style>
+          <a:lnRef idx="2">
+            <a:schemeClr val="accent1">
+              <a:shade val="50000"/>
+            </a:schemeClr>
+          </a:lnRef>
+          <a:fillRef idx="1">
+            <a:schemeClr val="accent1"/>
+          </a:fillRef>
+          <a:effectRef idx="0">
+            <a:schemeClr val="accent1"/>
+          </a:effectRef>
+          <a:fontRef idx="minor">
+            <a:schemeClr val="lt1"/>
+          </a:fontRef>
+        </p:style>
+        <p:txBody>
+          <a:bodyPr wrap="square" rtlCol="0" anchor="ctr">
+            <a:normAutofit fontScale="70000" lnSpcReduction="20000"/>
+          </a:bodyPr>
+          <a:lstStyle/>
+          <a:p>
+            <a:pPr algn="ctr">
+              <a:lnSpc>
+                <a:spcPct val="120000"/>
+              </a:lnSpc>
+            </a:pPr>
+            <a:r>
+              <a:rPr lang="zh-CN" altLang="en-US" sz="1600">
+                <a:solidFill>
+                  <a:srgbClr val="00584E"/>
+                </a:solidFill>
+                <a:latin typeface="+mj-ea"/>
+                <a:ea typeface="+mj-ea"/>
+                <a:sym typeface="思源黑体 CN" panose="020B0500000000000000" pitchFamily="34" charset="-122"/>
+              </a:rPr>
+              <a:t> 大数据和人工智能</a:t>
+            </a:r>
+            <a:endParaRPr lang="zh-CN" altLang="en-US" sz="1600" dirty="0">
+              <a:solidFill>
+                <a:schemeClr val="tx2"/>
+              </a:solidFill>
+              <a:latin typeface="+mj-ea"/>
+              <a:ea typeface="+mj-ea"/>
+              <a:sym typeface="思源黑体 CN" panose="020B0500000000000000" pitchFamily="34" charset="-122"/>
+            </a:endParaRPr>
+          </a:p>
+        </p:txBody>
+      </p:sp>
+      <p:sp>
+        <p:nvSpPr>
+          <p:cNvPr id="24" name="rectangle-11">
+            <a:extLst>
+              <a:ext uri="{FF2B5EF4-FFF2-40B4-BE49-F238E27FC236}">
+                <a16:creationId xmlns:a16="http://schemas.microsoft.com/office/drawing/2014/main" id="{E5450602-04D7-F587-1565-9EC0FF753D74}"/>
+              </a:ext>
+            </a:extLst>
+          </p:cNvPr>
+          <p:cNvSpPr/>
+          <p:nvPr/>
+        </p:nvSpPr>
+        <p:spPr>
+          <a:xfrm>
+            <a:off x="6910957" y="5494131"/>
+            <a:ext cx="1724527" cy="523217"/>
+          </a:xfrm>
+          <a:prstGeom prst="roundRect">
+            <a:avLst>
+              <a:gd name="adj" fmla="val 50000"/>
+            </a:avLst>
+          </a:prstGeom>
+          <a:gradFill rotWithShape="1">
+            <a:gsLst>
+              <a:gs pos="0">
+                <a:srgbClr val="EEFFFD"/>
+              </a:gs>
+              <a:gs pos="100000">
+                <a:srgbClr val="00BCA7"/>
+              </a:gs>
+            </a:gsLst>
+            <a:lin scaled="0" ang="16200000"/>
+          </a:gradFill>
+          <a:ln>
+            <a:noFill/>
+          </a:ln>
+          <a:effectLst>
+            <a:outerShdw blurRad="292100" dist="76200" dir="2700000" sx="98000" sy="98000" algn="tl" rotWithShape="0">
+              <a:schemeClr val="accent1">
+                <a:alpha val="28000"/>
+              </a:schemeClr>
+            </a:outerShdw>
+          </a:effectLst>
+        </p:spPr>
+        <p:style>
+          <a:lnRef idx="2">
+            <a:schemeClr val="accent1">
+              <a:shade val="50000"/>
+            </a:schemeClr>
+          </a:lnRef>
+          <a:fillRef idx="1">
+            <a:schemeClr val="accent1"/>
+          </a:fillRef>
+          <a:effectRef idx="0">
+            <a:schemeClr val="accent1"/>
+          </a:effectRef>
+          <a:fontRef idx="minor">
+            <a:schemeClr val="lt1"/>
+          </a:fontRef>
+        </p:style>
+        <p:txBody>
+          <a:bodyPr wrap="square" rtlCol="0" anchor="ctr">
+            <a:noAutofit/>
+          </a:bodyPr>
+          <a:lstStyle/>
+          <a:p>
+            <a:pPr algn="ctr"/>
+            <a:endParaRPr lang="zh-CN" altLang="en-US" sz="1600">
+              <a:solidFill>
+                <a:schemeClr val="tx2"/>
+              </a:solidFill>
+              <a:latin typeface="+mj-ea"/>
+              <a:ea typeface="+mj-ea"/>
+            </a:endParaRPr>
+          </a:p>
+        </p:txBody>
+      </p:sp>
+      <p:sp>
+        <p:nvSpPr>
+          <p:cNvPr id="26" name="关键词8">
+            <a:extLst>
+              <a:ext uri="{FF2B5EF4-FFF2-40B4-BE49-F238E27FC236}">
+                <a16:creationId xmlns:a16="http://schemas.microsoft.com/office/drawing/2014/main" id="{D14361E3-9A52-B0EB-C1CC-1237576A8839}"/>
+              </a:ext>
+            </a:extLst>
+          </p:cNvPr>
+          <p:cNvSpPr/>
+          <p:nvPr>
+            <p:custDataLst>
+              <p:tags r:id="rId9"/>
+            </p:custDataLst>
+          </p:nvPr>
+        </p:nvSpPr>
+        <p:spPr>
+          <a:xfrm>
+            <a:off x="7093619" y="5562993"/>
+            <a:ext cx="1359201" cy="385492"/>
+          </a:xfrm>
+          <a:prstGeom prst="rect">
+            <a:avLst/>
+          </a:prstGeom>
+          <a:noFill/>
+          <a:ln>
+            <a:noFill/>
+          </a:ln>
+          <a:effectLst>
+            <a:outerShdw blurRad="292100" dist="76200" dir="2700000" sx="98000" sy="98000" algn="tl" rotWithShape="0">
+              <a:schemeClr val="accent1">
+                <a:alpha val="28000"/>
+              </a:schemeClr>
+            </a:outerShdw>
+          </a:effectLst>
+        </p:spPr>
+        <p:style>
+          <a:lnRef idx="2">
+            <a:schemeClr val="accent1">
+              <a:shade val="50000"/>
+            </a:schemeClr>
+          </a:lnRef>
+          <a:fillRef idx="1">
+            <a:schemeClr val="accent1"/>
+          </a:fillRef>
+          <a:effectRef idx="0">
+            <a:schemeClr val="accent1"/>
+          </a:effectRef>
+          <a:fontRef idx="minor">
+            <a:schemeClr val="lt1"/>
+          </a:fontRef>
+        </p:style>
+        <p:txBody>
+          <a:bodyPr wrap="square" rtlCol="0" anchor="ctr">
+            <a:normAutofit/>
+          </a:bodyPr>
+          <a:lstStyle/>
+          <a:p>
+            <a:pPr algn="ctr">
+              <a:lnSpc>
+                <a:spcPct val="120000"/>
+              </a:lnSpc>
+            </a:pPr>
+            <a:r>
+              <a:rPr lang="zh-CN" altLang="en-US" sz="1600">
+                <a:solidFill>
+                  <a:srgbClr val="00584E"/>
+                </a:solidFill>
+                <a:latin typeface="+mj-ea"/>
+                <a:ea typeface="+mj-ea"/>
+                <a:sym typeface="思源黑体 CN" panose="020B0500000000000000" pitchFamily="34" charset="-122"/>
+              </a:rPr>
+              <a:t> 数字化营销</a:t>
+            </a:r>
+            <a:endParaRPr lang="zh-CN" altLang="en-US" sz="1600" dirty="0">
+              <a:solidFill>
+                <a:schemeClr val="tx2"/>
+              </a:solidFill>
+              <a:latin typeface="+mj-ea"/>
+              <a:ea typeface="+mj-ea"/>
+              <a:sym typeface="思源黑体 CN" panose="020B0500000000000000" pitchFamily="34" charset="-122"/>
+            </a:endParaRPr>
+          </a:p>
+        </p:txBody>
+      </p:sp>
+      <p:sp>
+        <p:nvSpPr>
+          <p:cNvPr id="35" name="标题">
+            <a:extLst>
+              <a:ext uri="{FF2B5EF4-FFF2-40B4-BE49-F238E27FC236}">
+                <a16:creationId xmlns:a16="http://schemas.microsoft.com/office/drawing/2014/main" id="{5D39437C-2A2A-843B-F38B-AC8A1A694786}"/>
               </a:ext>
             </a:extLst>
           </p:cNvPr>
           <p:cNvSpPr txBox="1"/>
           <p:nvPr>
             <p:custDataLst>
-              <p:tags r:id="rId3"/>
+              <p:tags r:id="rId10"/>
             </p:custDataLst>
           </p:nvPr>
         </p:nvSpPr>
         <p:spPr>
           <a:xfrm>
-            <a:off x="377129" y="381124"/>
-            <a:ext cx="11441213" cy="750885"/>
+            <a:off x="273975" y="238391"/>
+            <a:ext cx="11669372" cy="720348"/>
           </a:xfrm>
           <a:prstGeom prst="rect">
             <a:avLst/>
@@ -12030,7 +13795,7 @@
           <a:noFill/>
         </p:spPr>
         <p:txBody>
-          <a:bodyPr wrap="square" rtlCol="0" anchor="b" anchorCtr="0">
+          <a:bodyPr wrap="square" rtlCol="0" anchor="ctr" anchorCtr="0">
             <a:normAutofit/>
           </a:bodyPr>
           <a:lstStyle/>
@@ -12067,7 +13832,43 @@
                 <a:cs typeface="微软雅黑" panose="020B0503020204020204" charset="-122"/>
                 <a:sym typeface="思源黑体 CN" panose="020B0500000000000000" pitchFamily="34" charset="-122"/>
               </a:rPr>
-              <a:t>科技发展现状大纲</a:t>
+              <a:t>科技对商业的影响 </a:t>
+            </a:r>
+            <a:r>
+              <a:rPr lang="en-US" altLang="zh-CN" sz="3200" b="1" noProof="0">
+                <a:ln>
+                  <a:noFill/>
+                </a:ln>
+                <a:solidFill>
+                  <a:srgbClr val="000000"/>
+                </a:solidFill>
+                <a:effectLst/>
+                <a:uLnTx/>
+                <a:uFillTx/>
+                <a:latin typeface="+mj-ea"/>
+                <a:ea typeface="+mj-ea"/>
+                <a:cs typeface="微软雅黑" panose="020B0503020204020204" charset="-122"/>
+                <a:sym typeface="思源黑体 CN" panose="020B0500000000000000" pitchFamily="34" charset="-122"/>
+              </a:rPr>
+              <a:t>- </a:t>
+            </a:r>
+            <a:r>
+              <a:rPr lang="zh-CN" altLang="en-US" sz="3200" b="1" noProof="0">
+                <a:ln>
+                  <a:noFill/>
+                </a:ln>
+                <a:solidFill>
+                  <a:srgbClr val="000000"/>
+                </a:solidFill>
+                <a:effectLst/>
+                <a:uLnTx/>
+                <a:uFillTx/>
+                <a:latin typeface="+mj-ea"/>
+                <a:ea typeface="+mj-ea"/>
+                <a:cs typeface="微软雅黑" panose="020B0503020204020204" charset="-122"/>
+                <a:sym typeface="思源黑体 CN" panose="020B0500000000000000" pitchFamily="34" charset="-122"/>
+              </a:rPr>
+              <a:t>趋势分析</a:t>
             </a:r>
             <a:endParaRPr lang="zh-CN" altLang="en-US" sz="3200" b="1" dirty="0">
               <a:latin typeface="+mj-ea"/>
@@ -12080,75 +13881,40 @@
       </p:sp>
       <p:sp>
         <p:nvSpPr>
-          <p:cNvPr id="3" name="内容">
+          <p:cNvPr id="3" name="关键词1-简述">
             <a:extLst>
               <a:ext uri="{FF2B5EF4-FFF2-40B4-BE49-F238E27FC236}">
-                <a16:creationId xmlns:a16="http://schemas.microsoft.com/office/drawing/2014/main" id="{4F81AFAB-C7AE-FA9E-D0F4-E661252501B9}"/>
+                <a16:creationId xmlns:a16="http://schemas.microsoft.com/office/drawing/2014/main" id="{02A15B6D-88A4-DCCA-6163-9D8237A71C91}"/>
               </a:ext>
             </a:extLst>
           </p:cNvPr>
           <p:cNvSpPr txBox="1"/>
           <p:nvPr>
             <p:custDataLst>
-              <p:tags r:id="rId4"/>
+              <p:tags r:id="rId11"/>
             </p:custDataLst>
           </p:nvPr>
         </p:nvSpPr>
         <p:spPr>
           <a:xfrm>
-            <a:off x="397273" y="1275997"/>
-            <a:ext cx="11420479" cy="1586047"/>
+            <a:off x="1231785" y="1655916"/>
+            <a:ext cx="1962212" cy="720348"/>
           </a:xfrm>
           <a:prstGeom prst="rect">
             <a:avLst/>
           </a:prstGeom>
           <a:noFill/>
-          <a:ln>
-            <a:noFill/>
-          </a:ln>
+          <a:effectLst/>
         </p:spPr>
         <p:txBody>
-          <a:bodyPr spcFirstLastPara="1" wrap="square" lIns="60950" tIns="30466" rIns="60950" bIns="30466" anchor="t" anchorCtr="0">
+          <a:bodyPr wrap="square" lIns="75895" tIns="37948" rIns="75895" bIns="37948" rtlCol="0" anchor="ctr" anchorCtr="0">
             <a:normAutofit/>
           </a:bodyPr>
           <a:lstStyle/>
           <a:p>
-            <a:pPr marL="228600" marR="0" lvl="0" indent="-228600" algn="just" defTabSz="914400" rtl="0" eaLnBrk="1" fontAlgn="ctr" latinLnBrk="0" hangingPunct="1">
-              <a:lnSpc>
-                <a:spcPct val="130000"/>
-              </a:lnSpc>
-              <a:spcBef>
-                <a:spcPts val="750"/>
-              </a:spcBef>
-              <a:spcAft>
-                <a:spcPts val="250"/>
-              </a:spcAft>
-              <a:buClrTx/>
-              <a:buSzTx/>
-              <a:buFontTx/>
-              <a:buAutoNum type="arabicPeriod"/>
-              <a:defRPr/>
-            </a:pPr>
-            <a:r>
-              <a:rPr kumimoji="0" lang="zh-CN" altLang="en-US" sz="1200" b="1" i="0" u="none" strike="noStrike" kern="1200" cap="none" spc="0" normalizeH="0" baseline="0" noProof="0" dirty="0">
-                <a:ln>
-                  <a:noFill/>
-                </a:ln>
-                <a:solidFill>
-                  <a:srgbClr val="00BCA7"/>
-                </a:solidFill>
-                <a:effectLst/>
-                <a:uLnTx/>
-                <a:uFillTx/>
-                <a:latin typeface="+mj-ea"/>
-                <a:ea typeface="+mj-ea"/>
-                <a:cs typeface="+mn-ea"/>
-                <a:sym typeface="思源黑体 CN" panose="020B0500000000000000" pitchFamily="34" charset="-122"/>
-              </a:rPr>
-              <a:t>人工智能</a:t>
-            </a:r>
-            <a:r>
-              <a:rPr kumimoji="0" lang="zh-CN" altLang="en-US" sz="1200" i="0" u="none" strike="noStrike" kern="1200" cap="none" spc="0" normalizeH="0" baseline="0" noProof="0" dirty="0">
+            <a:pPr algn="ctr"/>
+            <a:r>
+              <a:rPr kumimoji="0" lang="zh-CN" altLang="en-US" sz="1400" b="0" i="0" u="none" strike="noStrike" kern="1200" cap="none" spc="0" normalizeH="0" baseline="0" noProof="0">
                 <a:ln>
                   <a:noFill/>
                 </a:ln>
@@ -12163,10 +13929,51 @@
                 <a:cs typeface="+mn-ea"/>
                 <a:sym typeface="思源黑体 CN" panose="020B0500000000000000" pitchFamily="34" charset="-122"/>
               </a:rPr>
-              <a:t>：</a:t>
-            </a:r>
-            <a:r>
-              <a:rPr kumimoji="0" lang="en-US" altLang="zh-CN" sz="1200" i="0" u="none" strike="noStrike" kern="1200" cap="none" spc="0" normalizeH="0" baseline="0" noProof="0" dirty="0">
+              <a:t>科技是推动社会发展的重要力量，让我们的生活变得更加便利和高效</a:t>
+            </a:r>
+            <a:endParaRPr lang="zh-CN" altLang="en-US" sz="1400" dirty="0">
+              <a:latin typeface="+mj-ea"/>
+              <a:ea typeface="+mj-ea"/>
+            </a:endParaRPr>
+          </a:p>
+        </p:txBody>
+      </p:sp>
+      <p:sp>
+        <p:nvSpPr>
+          <p:cNvPr id="11" name="关键词2-简述">
+            <a:extLst>
+              <a:ext uri="{FF2B5EF4-FFF2-40B4-BE49-F238E27FC236}">
+                <a16:creationId xmlns:a16="http://schemas.microsoft.com/office/drawing/2014/main" id="{3796F3BC-5CB8-B702-6854-5D384483D4CC}"/>
+              </a:ext>
+            </a:extLst>
+          </p:cNvPr>
+          <p:cNvSpPr txBox="1"/>
+          <p:nvPr>
+            <p:custDataLst>
+              <p:tags r:id="rId12"/>
+            </p:custDataLst>
+          </p:nvPr>
+        </p:nvSpPr>
+        <p:spPr>
+          <a:xfrm>
+            <a:off x="445124" y="2835550"/>
+            <a:ext cx="1962212" cy="720348"/>
+          </a:xfrm>
+          <a:prstGeom prst="rect">
+            <a:avLst/>
+          </a:prstGeom>
+          <a:noFill/>
+          <a:effectLst/>
+        </p:spPr>
+        <p:txBody>
+          <a:bodyPr wrap="square" lIns="75895" tIns="37948" rIns="75895" bIns="37948" rtlCol="0" anchor="ctr" anchorCtr="0">
+            <a:normAutofit/>
+          </a:bodyPr>
+          <a:lstStyle/>
+          <a:p>
+            <a:pPr algn="ctr"/>
+            <a:r>
+              <a:rPr kumimoji="0" lang="zh-CN" altLang="en-US" sz="1400" b="0" i="0" u="none" strike="noStrike" kern="1200" cap="none" spc="0" normalizeH="0" baseline="0" noProof="0">
                 <a:ln>
                   <a:noFill/>
                 </a:ln>
@@ -12181,10 +13988,51 @@
                 <a:cs typeface="+mn-ea"/>
                 <a:sym typeface="思源黑体 CN" panose="020B0500000000000000" pitchFamily="34" charset="-122"/>
               </a:rPr>
-              <a:t>AI</a:t>
-            </a:r>
-            <a:r>
-              <a:rPr kumimoji="0" lang="zh-CN" altLang="en-US" sz="1200" i="0" u="none" strike="noStrike" kern="1200" cap="none" spc="0" normalizeH="0" baseline="0" noProof="0" dirty="0">
+              <a:t>商业模式创新是推动企业持续增长和成功的关键因素之一</a:t>
+            </a:r>
+            <a:endParaRPr lang="zh-CN" altLang="en-US" sz="1400" dirty="0">
+              <a:latin typeface="+mj-ea"/>
+              <a:ea typeface="+mj-ea"/>
+            </a:endParaRPr>
+          </a:p>
+        </p:txBody>
+      </p:sp>
+      <p:sp>
+        <p:nvSpPr>
+          <p:cNvPr id="25" name="关键词3-简述">
+            <a:extLst>
+              <a:ext uri="{FF2B5EF4-FFF2-40B4-BE49-F238E27FC236}">
+                <a16:creationId xmlns:a16="http://schemas.microsoft.com/office/drawing/2014/main" id="{39D84B7D-0C57-4DE4-FE17-3A2E5BF4ED7E}"/>
+              </a:ext>
+            </a:extLst>
+          </p:cNvPr>
+          <p:cNvSpPr txBox="1"/>
+          <p:nvPr>
+            <p:custDataLst>
+              <p:tags r:id="rId13"/>
+            </p:custDataLst>
+          </p:nvPr>
+        </p:nvSpPr>
+        <p:spPr>
+          <a:xfrm>
+            <a:off x="388595" y="4176521"/>
+            <a:ext cx="1962212" cy="720348"/>
+          </a:xfrm>
+          <a:prstGeom prst="rect">
+            <a:avLst/>
+          </a:prstGeom>
+          <a:noFill/>
+          <a:effectLst/>
+        </p:spPr>
+        <p:txBody>
+          <a:bodyPr wrap="square" lIns="75895" tIns="37948" rIns="75895" bIns="37948" rtlCol="0" anchor="ctr" anchorCtr="0">
+            <a:normAutofit/>
+          </a:bodyPr>
+          <a:lstStyle/>
+          <a:p>
+            <a:pPr algn="ctr"/>
+            <a:r>
+              <a:rPr kumimoji="0" lang="zh-CN" altLang="en-US" sz="1400" b="0" i="0" u="none" strike="noStrike" kern="1200" cap="none" spc="0" normalizeH="0" baseline="0" noProof="0">
                 <a:ln>
                   <a:noFill/>
                 </a:ln>
@@ -12199,10 +14047,51 @@
                 <a:cs typeface="+mn-ea"/>
                 <a:sym typeface="思源黑体 CN" panose="020B0500000000000000" pitchFamily="34" charset="-122"/>
               </a:rPr>
-              <a:t>在商业中的应用越来越广泛，如自然语言处理、计算机视觉、深度学习等。</a:t>
-            </a:r>
-            <a:r>
-              <a:rPr kumimoji="0" lang="en-US" altLang="zh-CN" sz="1200" i="0" u="none" strike="noStrike" kern="1200" cap="none" spc="0" normalizeH="0" baseline="0" noProof="0" dirty="0">
+              <a:t>人力和物质资源是推动社会发展和进步的重要驱动力</a:t>
+            </a:r>
+            <a:endParaRPr lang="zh-CN" altLang="en-US" sz="1400" dirty="0">
+              <a:latin typeface="+mj-ea"/>
+              <a:ea typeface="+mj-ea"/>
+            </a:endParaRPr>
+          </a:p>
+        </p:txBody>
+      </p:sp>
+      <p:sp>
+        <p:nvSpPr>
+          <p:cNvPr id="27" name="关键词4-简述">
+            <a:extLst>
+              <a:ext uri="{FF2B5EF4-FFF2-40B4-BE49-F238E27FC236}">
+                <a16:creationId xmlns:a16="http://schemas.microsoft.com/office/drawing/2014/main" id="{3D643262-D9D7-EC8C-84DC-C784191713CC}"/>
+              </a:ext>
+            </a:extLst>
+          </p:cNvPr>
+          <p:cNvSpPr txBox="1"/>
+          <p:nvPr>
+            <p:custDataLst>
+              <p:tags r:id="rId14"/>
+            </p:custDataLst>
+          </p:nvPr>
+        </p:nvSpPr>
+        <p:spPr>
+          <a:xfrm>
+            <a:off x="1122932" y="5432255"/>
+            <a:ext cx="1962212" cy="720348"/>
+          </a:xfrm>
+          <a:prstGeom prst="rect">
+            <a:avLst/>
+          </a:prstGeom>
+          <a:noFill/>
+          <a:effectLst/>
+        </p:spPr>
+        <p:txBody>
+          <a:bodyPr wrap="square" lIns="75895" tIns="37948" rIns="75895" bIns="37948" rtlCol="0" anchor="ctr" anchorCtr="0">
+            <a:normAutofit/>
+          </a:bodyPr>
+          <a:lstStyle/>
+          <a:p>
+            <a:pPr algn="ctr"/>
+            <a:r>
+              <a:rPr kumimoji="0" lang="zh-CN" altLang="en-US" sz="1400" b="0" i="0" u="none" strike="noStrike" kern="1200" cap="none" spc="0" normalizeH="0" baseline="0" noProof="0">
                 <a:ln>
                   <a:noFill/>
                 </a:ln>
@@ -12217,10 +14106,51 @@
                 <a:cs typeface="+mn-ea"/>
                 <a:sym typeface="思源黑体 CN" panose="020B0500000000000000" pitchFamily="34" charset="-122"/>
               </a:rPr>
-              <a:t>AI</a:t>
-            </a:r>
-            <a:r>
-              <a:rPr kumimoji="0" lang="zh-CN" altLang="en-US" sz="1200" i="0" u="none" strike="noStrike" kern="1200" cap="none" spc="0" normalizeH="0" baseline="0" noProof="0" dirty="0">
+              <a:t>技术是推动社会发展的重要力量，让我们的生活变得更加便利和高效</a:t>
+            </a:r>
+            <a:endParaRPr lang="zh-CN" altLang="en-US" sz="1400" dirty="0">
+              <a:latin typeface="+mj-ea"/>
+              <a:ea typeface="+mj-ea"/>
+            </a:endParaRPr>
+          </a:p>
+        </p:txBody>
+      </p:sp>
+      <p:sp>
+        <p:nvSpPr>
+          <p:cNvPr id="28" name="关键词5-简述">
+            <a:extLst>
+              <a:ext uri="{FF2B5EF4-FFF2-40B4-BE49-F238E27FC236}">
+                <a16:creationId xmlns:a16="http://schemas.microsoft.com/office/drawing/2014/main" id="{B81A6942-91F1-2C0B-F61B-E779BD538021}"/>
+              </a:ext>
+            </a:extLst>
+          </p:cNvPr>
+          <p:cNvSpPr txBox="1"/>
+          <p:nvPr>
+            <p:custDataLst>
+              <p:tags r:id="rId15"/>
+            </p:custDataLst>
+          </p:nvPr>
+        </p:nvSpPr>
+        <p:spPr>
+          <a:xfrm>
+            <a:off x="8764877" y="1655916"/>
+            <a:ext cx="1962212" cy="720348"/>
+          </a:xfrm>
+          <a:prstGeom prst="rect">
+            <a:avLst/>
+          </a:prstGeom>
+          <a:noFill/>
+          <a:effectLst/>
+        </p:spPr>
+        <p:txBody>
+          <a:bodyPr wrap="square" lIns="75895" tIns="37948" rIns="75895" bIns="37948" rtlCol="0" anchor="ctr" anchorCtr="0">
+            <a:normAutofit/>
+          </a:bodyPr>
+          <a:lstStyle/>
+          <a:p>
+            <a:pPr algn="ctr"/>
+            <a:r>
+              <a:rPr kumimoji="0" lang="zh-CN" altLang="en-US" sz="1400" b="0" i="0" u="none" strike="noStrike" kern="1200" cap="none" spc="0" normalizeH="0" baseline="0" noProof="0">
                 <a:ln>
                   <a:noFill/>
                 </a:ln>
@@ -12235,10 +14165,51 @@
                 <a:cs typeface="+mn-ea"/>
                 <a:sym typeface="思源黑体 CN" panose="020B0500000000000000" pitchFamily="34" charset="-122"/>
               </a:rPr>
-              <a:t>技术在语音识别、智能客服、自动驾驶等领域有显著应用。</a:t>
-            </a:r>
-            <a:r>
-              <a:rPr kumimoji="0" lang="zh-CN" altLang="en-US" sz="1200" b="0" i="0" u="none" strike="noStrike" kern="1200" cap="none" spc="0" normalizeH="0" baseline="0" noProof="0" dirty="0">
+              <a:t>数据为先，数字化手段助腾飞</a:t>
+            </a:r>
+            <a:endParaRPr lang="zh-CN" altLang="en-US" sz="1400" dirty="0">
+              <a:latin typeface="+mj-ea"/>
+              <a:ea typeface="+mj-ea"/>
+            </a:endParaRPr>
+          </a:p>
+        </p:txBody>
+      </p:sp>
+      <p:sp>
+        <p:nvSpPr>
+          <p:cNvPr id="29" name="关键词6-简述">
+            <a:extLst>
+              <a:ext uri="{FF2B5EF4-FFF2-40B4-BE49-F238E27FC236}">
+                <a16:creationId xmlns:a16="http://schemas.microsoft.com/office/drawing/2014/main" id="{97EAFA40-CD6D-895C-762F-61AC146C5862}"/>
+              </a:ext>
+            </a:extLst>
+          </p:cNvPr>
+          <p:cNvSpPr txBox="1"/>
+          <p:nvPr>
+            <p:custDataLst>
+              <p:tags r:id="rId16"/>
+            </p:custDataLst>
+          </p:nvPr>
+        </p:nvSpPr>
+        <p:spPr>
+          <a:xfrm>
+            <a:off x="9817912" y="2835550"/>
+            <a:ext cx="1962212" cy="720348"/>
+          </a:xfrm>
+          <a:prstGeom prst="rect">
+            <a:avLst/>
+          </a:prstGeom>
+          <a:noFill/>
+          <a:effectLst/>
+        </p:spPr>
+        <p:txBody>
+          <a:bodyPr wrap="square" lIns="75895" tIns="37948" rIns="75895" bIns="37948" rtlCol="0" anchor="ctr" anchorCtr="0">
+            <a:normAutofit/>
+          </a:bodyPr>
+          <a:lstStyle/>
+          <a:p>
+            <a:pPr algn="ctr"/>
+            <a:r>
+              <a:rPr kumimoji="0" lang="zh-CN" altLang="en-US" sz="1400" b="0" i="0" u="none" strike="noStrike" kern="1200" cap="none" spc="0" normalizeH="0" baseline="0" noProof="0">
                 <a:ln>
                   <a:noFill/>
                 </a:ln>
@@ -12253,47 +14224,51 @@
                 <a:cs typeface="+mn-ea"/>
                 <a:sym typeface="思源黑体 CN" panose="020B0500000000000000" pitchFamily="34" charset="-122"/>
               </a:rPr>
-              <a:t>
-</a:t>
-            </a:r>
-            <a:r>
-              <a:rPr kumimoji="0" lang="en-US" altLang="zh-CN" sz="1200" b="1" i="0" u="none" strike="noStrike" kern="1200" cap="none" spc="0" normalizeH="0" baseline="0" noProof="0" dirty="0">
-                <a:ln>
-                  <a:noFill/>
-                </a:ln>
-                <a:solidFill>
-                  <a:srgbClr val="00BCA7"/>
-                </a:solidFill>
-                <a:effectLst/>
-                <a:uLnTx/>
-                <a:uFillTx/>
-                <a:latin typeface="+mj-ea"/>
-                <a:ea typeface="+mj-ea"/>
-                <a:cs typeface="+mn-ea"/>
-                <a:sym typeface="思源黑体 CN" panose="020B0500000000000000" pitchFamily="34" charset="-122"/>
-              </a:rPr>
-              <a:t>2. </a:t>
-            </a:r>
-            <a:r>
-              <a:rPr kumimoji="0" lang="zh-CN" altLang="en-US" sz="1200" b="1" i="0" u="none" strike="noStrike" kern="1200" cap="none" spc="0" normalizeH="0" baseline="0" noProof="0" dirty="0">
-                <a:ln>
-                  <a:noFill/>
-                </a:ln>
-                <a:solidFill>
-                  <a:srgbClr val="00BCA7"/>
-                </a:solidFill>
-                <a:effectLst/>
-                <a:uLnTx/>
-                <a:uFillTx/>
-                <a:latin typeface="+mj-ea"/>
-                <a:ea typeface="+mj-ea"/>
-                <a:cs typeface="+mn-ea"/>
-                <a:sym typeface="思源黑体 CN" panose="020B0500000000000000" pitchFamily="34" charset="-122"/>
-              </a:rPr>
-              <a:t>物联网</a:t>
-            </a:r>
-            <a:r>
-              <a:rPr kumimoji="0" lang="zh-CN" altLang="en-US" sz="1200" i="0" u="none" strike="noStrike" kern="1200" cap="none" spc="0" normalizeH="0" baseline="0" noProof="0" dirty="0">
+              <a:t>智能化生产引领未来生产方式变革</a:t>
+            </a:r>
+            <a:endParaRPr lang="zh-CN" altLang="en-US" sz="1400" dirty="0">
+              <a:latin typeface="+mj-ea"/>
+              <a:ea typeface="+mj-ea"/>
+            </a:endParaRPr>
+          </a:p>
+        </p:txBody>
+      </p:sp>
+      <p:sp>
+        <p:nvSpPr>
+          <p:cNvPr id="36" name="关键词7-简述">
+            <a:extLst>
+              <a:ext uri="{FF2B5EF4-FFF2-40B4-BE49-F238E27FC236}">
+                <a16:creationId xmlns:a16="http://schemas.microsoft.com/office/drawing/2014/main" id="{7428CF6E-FB4E-2297-8C7E-380D50D02490}"/>
+              </a:ext>
+            </a:extLst>
+          </p:cNvPr>
+          <p:cNvSpPr txBox="1"/>
+          <p:nvPr>
+            <p:custDataLst>
+              <p:tags r:id="rId17"/>
+            </p:custDataLst>
+          </p:nvPr>
+        </p:nvSpPr>
+        <p:spPr>
+          <a:xfrm>
+            <a:off x="9809761" y="4176521"/>
+            <a:ext cx="1962212" cy="720348"/>
+          </a:xfrm>
+          <a:prstGeom prst="rect">
+            <a:avLst/>
+          </a:prstGeom>
+          <a:noFill/>
+          <a:effectLst/>
+        </p:spPr>
+        <p:txBody>
+          <a:bodyPr wrap="square" lIns="75895" tIns="37948" rIns="75895" bIns="37948" rtlCol="0" anchor="ctr" anchorCtr="0">
+            <a:normAutofit/>
+          </a:bodyPr>
+          <a:lstStyle/>
+          <a:p>
+            <a:pPr algn="ctr"/>
+            <a:r>
+              <a:rPr kumimoji="0" lang="zh-CN" altLang="en-US" sz="1400" b="0" i="0" u="none" strike="noStrike" kern="1200" cap="none" spc="0" normalizeH="0" baseline="0" noProof="0">
                 <a:ln>
                   <a:noFill/>
                 </a:ln>
@@ -12308,10 +14283,51 @@
                 <a:cs typeface="+mn-ea"/>
                 <a:sym typeface="思源黑体 CN" panose="020B0500000000000000" pitchFamily="34" charset="-122"/>
               </a:rPr>
-              <a:t>：随着</a:t>
-            </a:r>
-            <a:r>
-              <a:rPr kumimoji="0" lang="en-US" altLang="zh-CN" sz="1200" i="0" u="none" strike="noStrike" kern="1200" cap="none" spc="0" normalizeH="0" baseline="0" noProof="0" dirty="0">
+              <a:t>大数据和人工智能的发展，让我们的生活变得更加智能、便捷</a:t>
+            </a:r>
+            <a:endParaRPr lang="zh-CN" altLang="en-US" sz="1400" dirty="0">
+              <a:latin typeface="+mj-ea"/>
+              <a:ea typeface="+mj-ea"/>
+            </a:endParaRPr>
+          </a:p>
+        </p:txBody>
+      </p:sp>
+      <p:sp>
+        <p:nvSpPr>
+          <p:cNvPr id="37" name="关键词8-简述">
+            <a:extLst>
+              <a:ext uri="{FF2B5EF4-FFF2-40B4-BE49-F238E27FC236}">
+                <a16:creationId xmlns:a16="http://schemas.microsoft.com/office/drawing/2014/main" id="{E373852E-4D5F-3775-339B-971B5BD5FDDF}"/>
+              </a:ext>
+            </a:extLst>
+          </p:cNvPr>
+          <p:cNvSpPr txBox="1"/>
+          <p:nvPr>
+            <p:custDataLst>
+              <p:tags r:id="rId18"/>
+            </p:custDataLst>
+          </p:nvPr>
+        </p:nvSpPr>
+        <p:spPr>
+          <a:xfrm>
+            <a:off x="8927490" y="5432255"/>
+            <a:ext cx="1962212" cy="720348"/>
+          </a:xfrm>
+          <a:prstGeom prst="rect">
+            <a:avLst/>
+          </a:prstGeom>
+          <a:noFill/>
+          <a:effectLst/>
+        </p:spPr>
+        <p:txBody>
+          <a:bodyPr wrap="square" lIns="75895" tIns="37948" rIns="75895" bIns="37948" rtlCol="0" anchor="ctr" anchorCtr="0">
+            <a:normAutofit fontScale="92500" lnSpcReduction="20000"/>
+          </a:bodyPr>
+          <a:lstStyle/>
+          <a:p>
+            <a:pPr algn="ctr"/>
+            <a:r>
+              <a:rPr kumimoji="0" lang="zh-CN" altLang="en-US" sz="1400" b="0" i="0" u="none" strike="noStrike" kern="1200" cap="none" spc="0" normalizeH="0" baseline="0" noProof="0">
                 <a:ln>
                   <a:noFill/>
                 </a:ln>
@@ -12326,193 +14342,66 @@
                 <a:cs typeface="+mn-ea"/>
                 <a:sym typeface="思源黑体 CN" panose="020B0500000000000000" pitchFamily="34" charset="-122"/>
               </a:rPr>
-              <a:t>5G</a:t>
-            </a:r>
-            <a:r>
-              <a:rPr kumimoji="0" lang="zh-CN" altLang="en-US" sz="1200" i="0" u="none" strike="noStrike" kern="1200" cap="none" spc="0" normalizeH="0" baseline="0" noProof="0" dirty="0">
-                <a:ln>
-                  <a:noFill/>
-                </a:ln>
-                <a:solidFill>
-                  <a:srgbClr val="00584E"/>
-                </a:solidFill>
-                <a:effectLst/>
-                <a:uLnTx/>
-                <a:uFillTx/>
-                <a:latin typeface="+mj-ea"/>
-                <a:ea typeface="+mj-ea"/>
-                <a:cs typeface="+mn-ea"/>
-                <a:sym typeface="思源黑体 CN" panose="020B0500000000000000" pitchFamily="34" charset="-122"/>
-              </a:rPr>
-              <a:t>网络的普及，物联网技术在智能家居、智能物流、智慧城市等领域得到了广泛应用。</a:t>
-            </a:r>
-            <a:r>
-              <a:rPr kumimoji="0" lang="zh-CN" altLang="en-US" sz="1200" b="0" i="0" u="none" strike="noStrike" kern="1200" cap="none" spc="0" normalizeH="0" baseline="0" noProof="0" dirty="0">
-                <a:ln>
-                  <a:noFill/>
-                </a:ln>
-                <a:solidFill>
-                  <a:srgbClr val="00584E"/>
-                </a:solidFill>
-                <a:effectLst/>
-                <a:uLnTx/>
-                <a:uFillTx/>
-                <a:latin typeface="+mj-ea"/>
-                <a:ea typeface="+mj-ea"/>
-                <a:cs typeface="+mn-ea"/>
-                <a:sym typeface="思源黑体 CN" panose="020B0500000000000000" pitchFamily="34" charset="-122"/>
-              </a:rPr>
-              <a:t>
-</a:t>
-            </a:r>
-            <a:r>
-              <a:rPr kumimoji="0" lang="en-US" altLang="zh-CN" sz="1200" b="1" i="0" u="none" strike="noStrike" kern="1200" cap="none" spc="0" normalizeH="0" baseline="0" noProof="0" dirty="0">
-                <a:ln>
-                  <a:noFill/>
-                </a:ln>
-                <a:solidFill>
-                  <a:srgbClr val="00BCA7"/>
-                </a:solidFill>
-                <a:effectLst/>
-                <a:uLnTx/>
-                <a:uFillTx/>
-                <a:latin typeface="+mj-ea"/>
-                <a:ea typeface="+mj-ea"/>
-                <a:cs typeface="+mn-ea"/>
-                <a:sym typeface="思源黑体 CN" panose="020B0500000000000000" pitchFamily="34" charset="-122"/>
-              </a:rPr>
-              <a:t>3. </a:t>
-            </a:r>
-            <a:r>
-              <a:rPr kumimoji="0" lang="zh-CN" altLang="en-US" sz="1200" b="1" i="0" u="none" strike="noStrike" kern="1200" cap="none" spc="0" normalizeH="0" baseline="0" noProof="0" dirty="0">
-                <a:ln>
-                  <a:noFill/>
-                </a:ln>
-                <a:solidFill>
-                  <a:srgbClr val="00BCA7"/>
-                </a:solidFill>
-                <a:effectLst/>
-                <a:uLnTx/>
-                <a:uFillTx/>
-                <a:latin typeface="+mj-ea"/>
-                <a:ea typeface="+mj-ea"/>
-                <a:cs typeface="+mn-ea"/>
-                <a:sym typeface="思源黑体 CN" panose="020B0500000000000000" pitchFamily="34" charset="-122"/>
-              </a:rPr>
-              <a:t>区块链技术</a:t>
-            </a:r>
-            <a:r>
-              <a:rPr kumimoji="0" lang="zh-CN" altLang="en-US" sz="1200" i="0" u="none" strike="noStrike" kern="1200" cap="none" spc="0" normalizeH="0" baseline="0" noProof="0" dirty="0">
-                <a:ln>
-                  <a:noFill/>
-                </a:ln>
-                <a:solidFill>
-                  <a:srgbClr val="00584E"/>
-                </a:solidFill>
-                <a:effectLst/>
-                <a:uLnTx/>
-                <a:uFillTx/>
-                <a:latin typeface="+mj-ea"/>
-                <a:ea typeface="+mj-ea"/>
-                <a:cs typeface="+mn-ea"/>
-                <a:sym typeface="思源黑体 CN" panose="020B0500000000000000" pitchFamily="34" charset="-122"/>
-              </a:rPr>
-              <a:t>：区块链技术的去中心化、不可篡改特性使其在数字货币、供应链管理、投票系统等领域具有巨大潜力</a:t>
-            </a:r>
-            <a:endParaRPr kumimoji="0" lang="en-US" altLang="zh-CN" sz="1200" i="0" u="none" strike="noStrike" kern="1200" cap="none" spc="0" normalizeH="0" baseline="0" noProof="0" dirty="0">
-              <a:ln>
-                <a:noFill/>
-              </a:ln>
-              <a:solidFill>
-                <a:schemeClr val="bg2"/>
-              </a:solidFill>
-              <a:effectLst/>
-              <a:uLnTx/>
-              <a:uFillTx/>
+              <a:t>数字化营销是利用数字技术和网络平台，实现精准营销和高效市场覆盖的重要手段</a:t>
+            </a:r>
+            <a:endParaRPr lang="zh-CN" altLang="en-US" sz="1400" dirty="0">
               <a:latin typeface="+mj-ea"/>
               <a:ea typeface="+mj-ea"/>
-              <a:cs typeface="+mn-ea"/>
-              <a:sym typeface="思源黑体 CN" panose="020B0500000000000000" pitchFamily="34" charset="-122"/>
             </a:endParaRPr>
           </a:p>
-          <a:p>
-            <a:pPr marL="228600" marR="0" lvl="0" indent="-228600" algn="just" defTabSz="914400" rtl="0" eaLnBrk="1" fontAlgn="ctr" latinLnBrk="0" hangingPunct="1">
-              <a:lnSpc>
-                <a:spcPct val="130000"/>
-              </a:lnSpc>
-              <a:spcBef>
-                <a:spcPts val="750"/>
-              </a:spcBef>
-              <a:spcAft>
-                <a:spcPts val="250"/>
-              </a:spcAft>
-              <a:buClrTx/>
-              <a:buSzTx/>
-              <a:buFontTx/>
-              <a:buAutoNum type="arabicPeriod"/>
-              <a:defRPr/>
-            </a:pPr>
-            <a:r>
-              <a:rPr lang="en-US" altLang="zh-CN" sz="1200" dirty="0">
-                <a:solidFill>
-                  <a:srgbClr val="00584E"/>
-                </a:solidFill>
-                <a:latin typeface="+mj-ea"/>
-                <a:ea typeface="+mj-ea"/>
-                <a:cs typeface="+mn-ea"/>
-                <a:sym typeface="思源黑体 CN" panose="020B0500000000000000" pitchFamily="34" charset="-122"/>
-              </a:rPr>
-              <a:t>4.</a:t>
-            </a:r>
-            <a:r>
-              <a:rPr lang="zh-CN" altLang="en-US" sz="1200" dirty="0">
-                <a:solidFill>
-                  <a:srgbClr val="00584E"/>
-                </a:solidFill>
-                <a:latin typeface="+mj-ea"/>
-                <a:ea typeface="+mj-ea"/>
-                <a:cs typeface="+mn-ea"/>
-                <a:sym typeface="思源黑体 CN" panose="020B0500000000000000" pitchFamily="34" charset="-122"/>
-              </a:rPr>
-              <a:t>第三方分段收费吗：大司马</a:t>
-            </a:r>
-            <a:endParaRPr lang="en-US" altLang="zh-CN" sz="1200" dirty="0">
-              <a:solidFill>
-                <a:schemeClr val="bg2"/>
-              </a:solidFill>
-              <a:latin typeface="+mj-ea"/>
-              <a:ea typeface="+mj-ea"/>
-              <a:cs typeface="+mn-ea"/>
-              <a:sym typeface="思源黑体 CN" panose="020B0500000000000000" pitchFamily="34" charset="-122"/>
-            </a:endParaRPr>
-          </a:p>
-        </p:txBody>
-      </p:sp>
+        </p:txBody>
+      </p:sp>
+      <p:pic>
+        <p:nvPicPr>
+          <p:cNvPr id="13" name="图形 12">
+            <a:extLst>
+              <a:ext uri="{FF2B5EF4-FFF2-40B4-BE49-F238E27FC236}">
+                <a16:creationId xmlns:a16="http://schemas.microsoft.com/office/drawing/2014/main" id="{9BBA18C2-4F7E-B584-DC3B-37D21134EA2A}"/>
+              </a:ext>
+            </a:extLst>
+          </p:cNvPr>
+          <p:cNvPicPr>
+            <a:picLocks/>
+          </p:cNvPicPr>
+          <p:nvPr>
+            <p:custDataLst>
+              <p:tags r:id="rId19"/>
+            </p:custDataLst>
+          </p:nvPr>
+        </p:nvPicPr>
+        <p:blipFill>
+          <a:blip r:embed="rId25">
+            <a:extLst>
+              <a:ext uri="{28A0092B-C50C-407E-A947-70E740481C1C}">
+                <a14:useLocalDpi xmlns:a14="http://schemas.microsoft.com/office/drawing/2010/main" val="0"/>
+              </a:ext>
+              <a:ext uri="{96DAC541-7B7A-43D3-8B79-37D633B846F1}">
+                <asvg:svgBlip xmlns:asvg="http://schemas.microsoft.com/office/drawing/2016/SVG/main" r:embed="rId26"/>
+              </a:ext>
+            </a:extLst>
+          </a:blip>
+          <a:stretch>
+            <a:fillRect/>
+          </a:stretch>
+        </p:blipFill>
+        <p:spPr>
+          <a:xfrm>
+            <a:off x="5602620" y="3529850"/>
+            <a:ext cx="871010" cy="853463"/>
+          </a:xfrm>
+          <a:prstGeom prst="rect">
+            <a:avLst/>
+          </a:prstGeom>
+        </p:spPr>
+      </p:pic>
     </p:spTree>
     <p:custDataLst>
       <p:tags r:id="rId1"/>
     </p:custDataLst>
-    <p:extLst>
-      <p:ext uri="{BB962C8B-B14F-4D97-AF65-F5344CB8AC3E}">
-        <p14:creationId xmlns:p14="http://schemas.microsoft.com/office/powerpoint/2010/main" val="668566479"/>
-      </p:ext>
-    </p:extLst>
   </p:cSld>
   <p:clrMapOvr>
     <a:masterClrMapping/>
   </p:clrMapOvr>
-  <mc:AlternateContent xmlns:mc="http://schemas.openxmlformats.org/markup-compatibility/2006" xmlns:p14="http://schemas.microsoft.com/office/powerpoint/2010/main">
-    <mc:Choice Requires="p14">
-      <p:transition spd="slow" p14:dur="2000">
-        <p:cover dir="lu"/>
-      </p:transition>
-    </mc:Choice>
-    <mc:Fallback xmlns="">
-      <p:transition spd="slow">
-        <p:cover dir="lu"/>
-      </p:transition>
-    </mc:Fallback>
-  </mc:AlternateContent>
 </p:sld>
 </file>
 
@@ -12526,32 +14415,144 @@
 </p:tagLst>
 </file>
 
-<file path=ppt/tags/tag2.xml><?xml version="1.0" encoding="utf-8"?>
+<file path=ppt/tags/tag10.xml><?xml version="1.0" encoding="utf-8"?>
 <p:tagLst xmlns:a="http://schemas.openxmlformats.org/drawingml/2006/main" xmlns:r="http://schemas.openxmlformats.org/officeDocument/2006/relationships" xmlns:p="http://schemas.openxmlformats.org/presentationml/2006/main">
-  <p:tag name="TAG_CONTENT_TYPE" val="1标题1内容1图"/>
-  <p:tag name="YOO_CHATPAGE_TYPE" val="YOO_CHATPAGE_CONTENT"/>
-  <p:tag name="YOO_CHATPPT_CONTENT" val="1"/>
+  <p:tag name="YOO_CHATSHAPE_TYPE" val="YOO_CHATSHAPE_KEYWORD"/>
 </p:tagLst>
 </file>
 
-<file path=ppt/tags/tag3.xml><?xml version="1.0" encoding="utf-8"?>
-<p:tagLst xmlns:a="http://schemas.openxmlformats.org/drawingml/2006/main" xmlns:r="http://schemas.openxmlformats.org/officeDocument/2006/relationships" xmlns:p="http://schemas.openxmlformats.org/presentationml/2006/main">
-  <p:tag name="YOO_CHATSHAPE_TYPE" val="YOO_CHATSHAPE_IMAGE"/>
-  <p:tag name="TAG_CHATSHAPE_IMAGE_FILE" val="C:\Users\11517\AppData\Roaming\BIYOO\temp\e39184a4328b4052bef5f2e02b7aaf63.png"/>
-</p:tagLst>
-</file>
-
-<file path=ppt/tags/tag4.xml><?xml version="1.0" encoding="utf-8"?>
+<file path=ppt/tags/tag11.xml><?xml version="1.0" encoding="utf-8"?>
 <p:tagLst xmlns:a="http://schemas.openxmlformats.org/drawingml/2006/main" xmlns:r="http://schemas.openxmlformats.org/officeDocument/2006/relationships" xmlns:p="http://schemas.openxmlformats.org/presentationml/2006/main">
   <p:tag name="KSO_WM_BEAUTIFY_FLAG" val=""/>
   <p:tag name="YOO_CHATSHAPE_TYPE" val="YOO_CHATSHAPE_TITLE"/>
 </p:tagLst>
 </file>
 
+<file path=ppt/tags/tag12.xml><?xml version="1.0" encoding="utf-8"?>
+<p:tagLst xmlns:a="http://schemas.openxmlformats.org/drawingml/2006/main" xmlns:r="http://schemas.openxmlformats.org/officeDocument/2006/relationships" xmlns:p="http://schemas.openxmlformats.org/presentationml/2006/main">
+  <p:tag name="YOO_CHATSHAPE_TYPE" val="YOO_CHATSHAPE_DECORATION_TEXT"/>
+</p:tagLst>
+</file>
+
+<file path=ppt/tags/tag13.xml><?xml version="1.0" encoding="utf-8"?>
+<p:tagLst xmlns:a="http://schemas.openxmlformats.org/drawingml/2006/main" xmlns:r="http://schemas.openxmlformats.org/officeDocument/2006/relationships" xmlns:p="http://schemas.openxmlformats.org/presentationml/2006/main">
+  <p:tag name="YOO_CHATSHAPE_TYPE" val="YOO_CHATSHAPE_DECORATION_TEXT"/>
+</p:tagLst>
+</file>
+
+<file path=ppt/tags/tag14.xml><?xml version="1.0" encoding="utf-8"?>
+<p:tagLst xmlns:a="http://schemas.openxmlformats.org/drawingml/2006/main" xmlns:r="http://schemas.openxmlformats.org/officeDocument/2006/relationships" xmlns:p="http://schemas.openxmlformats.org/presentationml/2006/main">
+  <p:tag name="YOO_CHATSHAPE_TYPE" val="YOO_CHATSHAPE_DECORATION_TEXT"/>
+</p:tagLst>
+</file>
+
+<file path=ppt/tags/tag15.xml><?xml version="1.0" encoding="utf-8"?>
+<p:tagLst xmlns:a="http://schemas.openxmlformats.org/drawingml/2006/main" xmlns:r="http://schemas.openxmlformats.org/officeDocument/2006/relationships" xmlns:p="http://schemas.openxmlformats.org/presentationml/2006/main">
+  <p:tag name="YOO_CHATSHAPE_TYPE" val="YOO_CHATSHAPE_DECORATION_TEXT"/>
+</p:tagLst>
+</file>
+
+<file path=ppt/tags/tag16.xml><?xml version="1.0" encoding="utf-8"?>
+<p:tagLst xmlns:a="http://schemas.openxmlformats.org/drawingml/2006/main" xmlns:r="http://schemas.openxmlformats.org/officeDocument/2006/relationships" xmlns:p="http://schemas.openxmlformats.org/presentationml/2006/main">
+  <p:tag name="YOO_CHATSHAPE_TYPE" val="YOO_CHATSHAPE_DECORATION_TEXT"/>
+</p:tagLst>
+</file>
+
+<file path=ppt/tags/tag17.xml><?xml version="1.0" encoding="utf-8"?>
+<p:tagLst xmlns:a="http://schemas.openxmlformats.org/drawingml/2006/main" xmlns:r="http://schemas.openxmlformats.org/officeDocument/2006/relationships" xmlns:p="http://schemas.openxmlformats.org/presentationml/2006/main">
+  <p:tag name="YOO_CHATSHAPE_TYPE" val="YOO_CHATSHAPE_DECORATION_TEXT"/>
+</p:tagLst>
+</file>
+
+<file path=ppt/tags/tag18.xml><?xml version="1.0" encoding="utf-8"?>
+<p:tagLst xmlns:a="http://schemas.openxmlformats.org/drawingml/2006/main" xmlns:r="http://schemas.openxmlformats.org/officeDocument/2006/relationships" xmlns:p="http://schemas.openxmlformats.org/presentationml/2006/main">
+  <p:tag name="YOO_CHATSHAPE_TYPE" val="YOO_CHATSHAPE_DECORATION_TEXT"/>
+</p:tagLst>
+</file>
+
+<file path=ppt/tags/tag19.xml><?xml version="1.0" encoding="utf-8"?>
+<p:tagLst xmlns:a="http://schemas.openxmlformats.org/drawingml/2006/main" xmlns:r="http://schemas.openxmlformats.org/officeDocument/2006/relationships" xmlns:p="http://schemas.openxmlformats.org/presentationml/2006/main">
+  <p:tag name="YOO_CHATSHAPE_TYPE" val="YOO_CHATSHAPE_DECORATION_TEXT"/>
+</p:tagLst>
+</file>
+
+<file path=ppt/tags/tag2.xml><?xml version="1.0" encoding="utf-8"?>
+<p:tagLst xmlns:a="http://schemas.openxmlformats.org/drawingml/2006/main" xmlns:r="http://schemas.openxmlformats.org/officeDocument/2006/relationships" xmlns:p="http://schemas.openxmlformats.org/presentationml/2006/main">
+  <p:tag name="TAG_CONTENT_TYPE" val="1标题n关键词"/>
+  <p:tag name="YOO_CHATPAGE_TYPE" val="YOO_CHATPAGE_CONTENT"/>
+  <p:tag name="YOO_CHATPPT_CONTENT" val="1"/>
+</p:tagLst>
+</file>
+
+<file path=ppt/tags/tag20.xml><?xml version="1.0" encoding="utf-8"?>
+<p:tagLst xmlns:a="http://schemas.openxmlformats.org/drawingml/2006/main" xmlns:r="http://schemas.openxmlformats.org/officeDocument/2006/relationships" xmlns:p="http://schemas.openxmlformats.org/presentationml/2006/main">
+  <p:tag name="YOO_CHATSHAPE_ICON_CODE" val="&lt;svg width=&quot;48&quot; height=&quot;48&quot; viewBox=&quot;0 0 48 48&quot; fill=&quot;none&quot; xmlns=&quot;http://www.w3.org/2000/svg&quot;&gt;&#10;&lt;path d=&quot;M36 19H12&quot; stroke=&quot;black&quot; stroke-width=&quot;4&quot; stroke-linecap=&quot;round&quot; stroke-linejoin=&quot;round&quot;/&gt;&#10;&lt;path d=&quot;M42 9H6&quot; stroke=&quot;black&quot; stroke-width=&quot;4&quot; stroke-linecap=&quot;round&quot; stroke-linejoin=&quot;round&quot;/&gt;&#10;&lt;path d=&quot;M42 29H6&quot; stroke=&quot;black&quot; stroke-width=&quot;4&quot; stroke-linecap=&quot;round&quot; stroke-linejoin=&quot;round&quot;/&gt;&#10;&lt;path d=&quot;M36 39H12&quot; stroke=&quot;black&quot; stroke-width=&quot;4&quot; stroke-linecap=&quot;round&quot; stroke-linejoin=&quot;round&quot;/&gt;&#10;&lt;/svg&gt;"/>
+</p:tagLst>
+</file>
+
+<file path=ppt/tags/tag21.xml><?xml version="1.0" encoding="utf-8"?>
+<p:tagLst xmlns:a="http://schemas.openxmlformats.org/drawingml/2006/main" xmlns:r="http://schemas.openxmlformats.org/officeDocument/2006/relationships" xmlns:p="http://schemas.openxmlformats.org/presentationml/2006/main">
+  <p:tag name="KSO_WM_BEAUTIFY_FLAG" val=""/>
+</p:tagLst>
+</file>
+
+<file path=ppt/tags/tag22.xml><?xml version="1.0" encoding="utf-8"?>
+<p:tagLst xmlns:a="http://schemas.openxmlformats.org/drawingml/2006/main" xmlns:r="http://schemas.openxmlformats.org/officeDocument/2006/relationships" xmlns:p="http://schemas.openxmlformats.org/presentationml/2006/main">
+  <p:tag name="KSO_WM_BEAUTIFY_FLAG" val=""/>
+</p:tagLst>
+</file>
+
+<file path=ppt/tags/tag23.xml><?xml version="1.0" encoding="utf-8"?>
+<p:tagLst xmlns:a="http://schemas.openxmlformats.org/drawingml/2006/main" xmlns:r="http://schemas.openxmlformats.org/officeDocument/2006/relationships" xmlns:p="http://schemas.openxmlformats.org/presentationml/2006/main">
+  <p:tag name="KSO_WM_BEAUTIFY_FLAG" val=""/>
+</p:tagLst>
+</file>
+
+<file path=ppt/tags/tag24.xml><?xml version="1.0" encoding="utf-8"?>
+<p:tagLst xmlns:a="http://schemas.openxmlformats.org/drawingml/2006/main" xmlns:r="http://schemas.openxmlformats.org/officeDocument/2006/relationships" xmlns:p="http://schemas.openxmlformats.org/presentationml/2006/main">
+  <p:tag name="KSO_WM_BEAUTIFY_FLAG" val=""/>
+</p:tagLst>
+</file>
+
+<file path=ppt/tags/tag3.xml><?xml version="1.0" encoding="utf-8"?>
+<p:tagLst xmlns:a="http://schemas.openxmlformats.org/drawingml/2006/main" xmlns:r="http://schemas.openxmlformats.org/officeDocument/2006/relationships" xmlns:p="http://schemas.openxmlformats.org/presentationml/2006/main">
+  <p:tag name="YOO_CHATSHAPE_TYPE" val="YOO_CHATSHAPE_KEYWORD"/>
+</p:tagLst>
+</file>
+
+<file path=ppt/tags/tag4.xml><?xml version="1.0" encoding="utf-8"?>
+<p:tagLst xmlns:a="http://schemas.openxmlformats.org/drawingml/2006/main" xmlns:r="http://schemas.openxmlformats.org/officeDocument/2006/relationships" xmlns:p="http://schemas.openxmlformats.org/presentationml/2006/main">
+  <p:tag name="YOO_CHATSHAPE_TYPE" val="YOO_CHATSHAPE_KEYWORD"/>
+</p:tagLst>
+</file>
+
 <file path=ppt/tags/tag5.xml><?xml version="1.0" encoding="utf-8"?>
 <p:tagLst xmlns:a="http://schemas.openxmlformats.org/drawingml/2006/main" xmlns:r="http://schemas.openxmlformats.org/officeDocument/2006/relationships" xmlns:p="http://schemas.openxmlformats.org/presentationml/2006/main">
-  <p:tag name="KSO_WM_BEAUTIFY_FLAG" val=""/>
-  <p:tag name="YOO_CHATSHAPE_TYPE" val="YOO_CHATSHAPE_CONTENT"/>
+  <p:tag name="YOO_CHATSHAPE_TYPE" val="YOO_CHATSHAPE_KEYWORD"/>
+</p:tagLst>
+</file>
+
+<file path=ppt/tags/tag6.xml><?xml version="1.0" encoding="utf-8"?>
+<p:tagLst xmlns:a="http://schemas.openxmlformats.org/drawingml/2006/main" xmlns:r="http://schemas.openxmlformats.org/officeDocument/2006/relationships" xmlns:p="http://schemas.openxmlformats.org/presentationml/2006/main">
+  <p:tag name="YOO_CHATSHAPE_TYPE" val="YOO_CHATSHAPE_KEYWORD"/>
+</p:tagLst>
+</file>
+
+<file path=ppt/tags/tag7.xml><?xml version="1.0" encoding="utf-8"?>
+<p:tagLst xmlns:a="http://schemas.openxmlformats.org/drawingml/2006/main" xmlns:r="http://schemas.openxmlformats.org/officeDocument/2006/relationships" xmlns:p="http://schemas.openxmlformats.org/presentationml/2006/main">
+  <p:tag name="YOO_CHATSHAPE_TYPE" val="YOO_CHATSHAPE_KEYWORD"/>
+</p:tagLst>
+</file>
+
+<file path=ppt/tags/tag8.xml><?xml version="1.0" encoding="utf-8"?>
+<p:tagLst xmlns:a="http://schemas.openxmlformats.org/drawingml/2006/main" xmlns:r="http://schemas.openxmlformats.org/officeDocument/2006/relationships" xmlns:p="http://schemas.openxmlformats.org/presentationml/2006/main">
+  <p:tag name="YOO_CHATSHAPE_TYPE" val="YOO_CHATSHAPE_KEYWORD"/>
+</p:tagLst>
+</file>
+
+<file path=ppt/tags/tag9.xml><?xml version="1.0" encoding="utf-8"?>
+<p:tagLst xmlns:a="http://schemas.openxmlformats.org/drawingml/2006/main" xmlns:r="http://schemas.openxmlformats.org/officeDocument/2006/relationships" xmlns:p="http://schemas.openxmlformats.org/presentationml/2006/main">
+  <p:tag name="YOO_CHATSHAPE_TYPE" val="YOO_CHATSHAPE_KEYWORD"/>
 </p:tagLst>
 </file>
 

</xml_diff>